<commit_message>
le bon commit du projet
</commit_message>
<xml_diff>
--- a/Présentation du titre pro/Dossier Professionnel v1.pptx
+++ b/Présentation du titre pro/Dossier Professionnel v1.pptx
@@ -6,7 +6,7 @@
     <p:sldMasterId id="2147483661" r:id="rId2"/>
   </p:sldMasterIdLst>
   <p:notesMasterIdLst>
-    <p:notesMasterId r:id="rId34"/>
+    <p:notesMasterId r:id="rId43"/>
   </p:notesMasterIdLst>
   <p:sldIdLst>
     <p:sldId id="256" r:id="rId3"/>
@@ -40,6 +40,15 @@
     <p:sldId id="272" r:id="rId31"/>
     <p:sldId id="275" r:id="rId32"/>
     <p:sldId id="281" r:id="rId33"/>
+    <p:sldId id="299" r:id="rId34"/>
+    <p:sldId id="300" r:id="rId35"/>
+    <p:sldId id="301" r:id="rId36"/>
+    <p:sldId id="302" r:id="rId37"/>
+    <p:sldId id="303" r:id="rId38"/>
+    <p:sldId id="304" r:id="rId39"/>
+    <p:sldId id="305" r:id="rId40"/>
+    <p:sldId id="306" r:id="rId41"/>
+    <p:sldId id="307" r:id="rId42"/>
   </p:sldIdLst>
   <p:sldSz cx="12192000" cy="6858000"/>
   <p:notesSz cx="6858000" cy="9144000"/>
@@ -2803,7 +2812,23 @@
             </a:r>
             <a:r>
               <a:rPr lang="fr-FR" baseline="0" dirty="0" smtClean="0"/>
-              <a:t> le planning des jours ou nous sommes en projet fils rouge je me concentre exclusivement sur les priorités les détails c’est pour plus tard …</a:t>
+              <a:t> le planning des jours ou nous sommes en projet fils rouge je me concentre exclusivement sur les priorités les détails c’est pour plus tard </a:t>
+            </a:r>
+            <a:r>
+              <a:rPr lang="fr-FR" baseline="0" dirty="0" smtClean="0"/>
+              <a:t>…</a:t>
+            </a:r>
+          </a:p>
+          <a:p>
+            <a:r>
+              <a:rPr lang="fr-FR" dirty="0" smtClean="0"/>
+              <a:t>stage 23 mai - 29 Juillet</a:t>
+            </a:r>
+          </a:p>
+          <a:p>
+            <a:r>
+              <a:rPr lang="fr-FR" dirty="0" smtClean="0"/>
+              <a:t>fin formation 13 septembre</a:t>
             </a:r>
             <a:endParaRPr lang="fr-FR" dirty="0"/>
           </a:p>
@@ -3351,8 +3376,13 @@
           <a:p>
             <a:r>
               <a:rPr lang="fr-FR" dirty="0" smtClean="0"/>
-              <a:t>Modèle Conceptuel des Données</a:t>
-            </a:r>
+              <a:t>Modèle Conceptuel des </a:t>
+            </a:r>
+            <a:r>
+              <a:rPr lang="fr-FR" dirty="0" smtClean="0"/>
+              <a:t>Données modéliser des objet a stocker aussi appeler attribut </a:t>
+            </a:r>
+            <a:endParaRPr lang="fr-FR" dirty="0" smtClean="0"/>
           </a:p>
           <a:p>
             <a:r>
@@ -3416,6 +3446,29 @@
             <a:r>
               <a:rPr lang="fr-FR" dirty="0" smtClean="0"/>
               <a:t>Pour établir le Modèle Logique des Données j’ai utilisé le mcd préalablement créé pour mettre en valeur les relation entre les entité.</a:t>
+            </a:r>
+          </a:p>
+          <a:p>
+            <a:pPr marL="0" marR="0" indent="0" algn="l" defTabSz="914400" rtl="0" eaLnBrk="1" fontAlgn="auto" latinLnBrk="0" hangingPunct="1">
+              <a:lnSpc>
+                <a:spcPct val="100000"/>
+              </a:lnSpc>
+              <a:spcBef>
+                <a:spcPts val="0"/>
+              </a:spcBef>
+              <a:spcAft>
+                <a:spcPts val="0"/>
+              </a:spcAft>
+              <a:buClrTx/>
+              <a:buSzTx/>
+              <a:buFontTx/>
+              <a:buNone/>
+              <a:tabLst/>
+              <a:defRPr/>
+            </a:pPr>
+            <a:r>
+              <a:rPr lang="fr-FR" dirty="0" smtClean="0"/>
+              <a:t>Modélisation des table </a:t>
             </a:r>
           </a:p>
           <a:p>
@@ -4558,6 +4611,814 @@
 </p:notes>
 </file>
 
+<file path=ppt/notesSlides/notesSlide32.xml><?xml version="1.0" encoding="utf-8"?>
+<p:notes xmlns:a="http://schemas.openxmlformats.org/drawingml/2006/main" xmlns:r="http://schemas.openxmlformats.org/officeDocument/2006/relationships" xmlns:p="http://schemas.openxmlformats.org/presentationml/2006/main">
+  <p:cSld>
+    <p:spTree>
+      <p:nvGrpSpPr>
+        <p:cNvPr id="1" name=""/>
+        <p:cNvGrpSpPr/>
+        <p:nvPr/>
+      </p:nvGrpSpPr>
+      <p:grpSpPr>
+        <a:xfrm>
+          <a:off x="0" y="0"/>
+          <a:ext cx="0" cy="0"/>
+          <a:chOff x="0" y="0"/>
+          <a:chExt cx="0" cy="0"/>
+        </a:xfrm>
+      </p:grpSpPr>
+      <p:sp>
+        <p:nvSpPr>
+          <p:cNvPr id="2" name="Espace réservé de l'image des diapositives 1"/>
+          <p:cNvSpPr>
+            <a:spLocks noGrp="1" noRot="1" noChangeAspect="1"/>
+          </p:cNvSpPr>
+          <p:nvPr>
+            <p:ph type="sldImg"/>
+          </p:nvPr>
+        </p:nvSpPr>
+        <p:spPr>
+          <a:xfrm>
+            <a:off x="217488" y="812800"/>
+            <a:ext cx="7124700" cy="4008438"/>
+          </a:xfrm>
+        </p:spPr>
+      </p:sp>
+      <p:sp>
+        <p:nvSpPr>
+          <p:cNvPr id="3" name="Espace réservé des commentaires 2"/>
+          <p:cNvSpPr>
+            <a:spLocks noGrp="1"/>
+          </p:cNvSpPr>
+          <p:nvPr>
+            <p:ph type="body" idx="1"/>
+          </p:nvPr>
+        </p:nvSpPr>
+        <p:spPr/>
+        <p:txBody>
+          <a:bodyPr/>
+          <a:lstStyle/>
+          <a:p>
+            <a:r>
+              <a:rPr lang="fr-FR" smtClean="0"/>
+              <a:t> </a:t>
+            </a:r>
+            <a:endParaRPr lang="fr-FR" dirty="0" smtClean="0"/>
+          </a:p>
+          <a:p>
+            <a:endParaRPr lang="fr-FR" dirty="0"/>
+          </a:p>
+        </p:txBody>
+      </p:sp>
+      <p:sp>
+        <p:nvSpPr>
+          <p:cNvPr id="4" name="Espace réservé du numéro de diapositive 3"/>
+          <p:cNvSpPr>
+            <a:spLocks noGrp="1"/>
+          </p:cNvSpPr>
+          <p:nvPr>
+            <p:ph type="sldNum" idx="10"/>
+          </p:nvPr>
+        </p:nvSpPr>
+        <p:spPr/>
+        <p:txBody>
+          <a:bodyPr/>
+          <a:lstStyle/>
+          <a:p>
+            <a:pPr algn="r"/>
+            <a:fld id="{4C8961B9-9BF0-44A4-A706-205F40A8B952}" type="slidenum">
+              <a:rPr lang="fr-FR" sz="1400" b="0" strike="noStrike" spc="-1" smtClean="0">
+                <a:latin typeface="Times New Roman"/>
+              </a:rPr>
+              <a:t>32</a:t>
+            </a:fld>
+            <a:endParaRPr lang="fr-FR" sz="1400" b="0" strike="noStrike" spc="-1">
+              <a:latin typeface="Times New Roman"/>
+            </a:endParaRPr>
+          </a:p>
+        </p:txBody>
+      </p:sp>
+    </p:spTree>
+    <p:extLst>
+      <p:ext uri="{BB962C8B-B14F-4D97-AF65-F5344CB8AC3E}">
+        <p14:creationId xmlns:p14="http://schemas.microsoft.com/office/powerpoint/2010/main" val="3907528022"/>
+      </p:ext>
+    </p:extLst>
+  </p:cSld>
+  <p:clrMapOvr>
+    <a:masterClrMapping/>
+  </p:clrMapOvr>
+</p:notes>
+</file>
+
+<file path=ppt/notesSlides/notesSlide33.xml><?xml version="1.0" encoding="utf-8"?>
+<p:notes xmlns:a="http://schemas.openxmlformats.org/drawingml/2006/main" xmlns:r="http://schemas.openxmlformats.org/officeDocument/2006/relationships" xmlns:p="http://schemas.openxmlformats.org/presentationml/2006/main">
+  <p:cSld>
+    <p:spTree>
+      <p:nvGrpSpPr>
+        <p:cNvPr id="1" name=""/>
+        <p:cNvGrpSpPr/>
+        <p:nvPr/>
+      </p:nvGrpSpPr>
+      <p:grpSpPr>
+        <a:xfrm>
+          <a:off x="0" y="0"/>
+          <a:ext cx="0" cy="0"/>
+          <a:chOff x="0" y="0"/>
+          <a:chExt cx="0" cy="0"/>
+        </a:xfrm>
+      </p:grpSpPr>
+      <p:sp>
+        <p:nvSpPr>
+          <p:cNvPr id="2" name="Espace réservé de l'image des diapositives 1"/>
+          <p:cNvSpPr>
+            <a:spLocks noGrp="1" noRot="1" noChangeAspect="1"/>
+          </p:cNvSpPr>
+          <p:nvPr>
+            <p:ph type="sldImg"/>
+          </p:nvPr>
+        </p:nvSpPr>
+        <p:spPr>
+          <a:xfrm>
+            <a:off x="217488" y="812800"/>
+            <a:ext cx="7124700" cy="4008438"/>
+          </a:xfrm>
+        </p:spPr>
+      </p:sp>
+      <p:sp>
+        <p:nvSpPr>
+          <p:cNvPr id="3" name="Espace réservé des commentaires 2"/>
+          <p:cNvSpPr>
+            <a:spLocks noGrp="1"/>
+          </p:cNvSpPr>
+          <p:nvPr>
+            <p:ph type="body" idx="1"/>
+          </p:nvPr>
+        </p:nvSpPr>
+        <p:spPr/>
+        <p:txBody>
+          <a:bodyPr/>
+          <a:lstStyle/>
+          <a:p>
+            <a:r>
+              <a:rPr lang="fr-FR" smtClean="0"/>
+              <a:t> </a:t>
+            </a:r>
+            <a:endParaRPr lang="fr-FR" dirty="0" smtClean="0"/>
+          </a:p>
+          <a:p>
+            <a:endParaRPr lang="fr-FR" dirty="0"/>
+          </a:p>
+        </p:txBody>
+      </p:sp>
+      <p:sp>
+        <p:nvSpPr>
+          <p:cNvPr id="4" name="Espace réservé du numéro de diapositive 3"/>
+          <p:cNvSpPr>
+            <a:spLocks noGrp="1"/>
+          </p:cNvSpPr>
+          <p:nvPr>
+            <p:ph type="sldNum" idx="10"/>
+          </p:nvPr>
+        </p:nvSpPr>
+        <p:spPr/>
+        <p:txBody>
+          <a:bodyPr/>
+          <a:lstStyle/>
+          <a:p>
+            <a:pPr algn="r"/>
+            <a:fld id="{4C8961B9-9BF0-44A4-A706-205F40A8B952}" type="slidenum">
+              <a:rPr lang="fr-FR" sz="1400" b="0" strike="noStrike" spc="-1" smtClean="0">
+                <a:latin typeface="Times New Roman"/>
+              </a:rPr>
+              <a:t>33</a:t>
+            </a:fld>
+            <a:endParaRPr lang="fr-FR" sz="1400" b="0" strike="noStrike" spc="-1">
+              <a:latin typeface="Times New Roman"/>
+            </a:endParaRPr>
+          </a:p>
+        </p:txBody>
+      </p:sp>
+    </p:spTree>
+    <p:extLst>
+      <p:ext uri="{BB962C8B-B14F-4D97-AF65-F5344CB8AC3E}">
+        <p14:creationId xmlns:p14="http://schemas.microsoft.com/office/powerpoint/2010/main" val="1775862669"/>
+      </p:ext>
+    </p:extLst>
+  </p:cSld>
+  <p:clrMapOvr>
+    <a:masterClrMapping/>
+  </p:clrMapOvr>
+</p:notes>
+</file>
+
+<file path=ppt/notesSlides/notesSlide34.xml><?xml version="1.0" encoding="utf-8"?>
+<p:notes xmlns:a="http://schemas.openxmlformats.org/drawingml/2006/main" xmlns:r="http://schemas.openxmlformats.org/officeDocument/2006/relationships" xmlns:p="http://schemas.openxmlformats.org/presentationml/2006/main">
+  <p:cSld>
+    <p:spTree>
+      <p:nvGrpSpPr>
+        <p:cNvPr id="1" name=""/>
+        <p:cNvGrpSpPr/>
+        <p:nvPr/>
+      </p:nvGrpSpPr>
+      <p:grpSpPr>
+        <a:xfrm>
+          <a:off x="0" y="0"/>
+          <a:ext cx="0" cy="0"/>
+          <a:chOff x="0" y="0"/>
+          <a:chExt cx="0" cy="0"/>
+        </a:xfrm>
+      </p:grpSpPr>
+      <p:sp>
+        <p:nvSpPr>
+          <p:cNvPr id="2" name="Espace réservé de l'image des diapositives 1"/>
+          <p:cNvSpPr>
+            <a:spLocks noGrp="1" noRot="1" noChangeAspect="1"/>
+          </p:cNvSpPr>
+          <p:nvPr>
+            <p:ph type="sldImg"/>
+          </p:nvPr>
+        </p:nvSpPr>
+        <p:spPr>
+          <a:xfrm>
+            <a:off x="217488" y="812800"/>
+            <a:ext cx="7124700" cy="4008438"/>
+          </a:xfrm>
+        </p:spPr>
+      </p:sp>
+      <p:sp>
+        <p:nvSpPr>
+          <p:cNvPr id="3" name="Espace réservé des commentaires 2"/>
+          <p:cNvSpPr>
+            <a:spLocks noGrp="1"/>
+          </p:cNvSpPr>
+          <p:nvPr>
+            <p:ph type="body" idx="1"/>
+          </p:nvPr>
+        </p:nvSpPr>
+        <p:spPr/>
+        <p:txBody>
+          <a:bodyPr/>
+          <a:lstStyle/>
+          <a:p>
+            <a:r>
+              <a:rPr lang="fr-FR" smtClean="0"/>
+              <a:t> </a:t>
+            </a:r>
+            <a:endParaRPr lang="fr-FR" dirty="0" smtClean="0"/>
+          </a:p>
+          <a:p>
+            <a:endParaRPr lang="fr-FR" dirty="0"/>
+          </a:p>
+        </p:txBody>
+      </p:sp>
+      <p:sp>
+        <p:nvSpPr>
+          <p:cNvPr id="4" name="Espace réservé du numéro de diapositive 3"/>
+          <p:cNvSpPr>
+            <a:spLocks noGrp="1"/>
+          </p:cNvSpPr>
+          <p:nvPr>
+            <p:ph type="sldNum" idx="10"/>
+          </p:nvPr>
+        </p:nvSpPr>
+        <p:spPr/>
+        <p:txBody>
+          <a:bodyPr/>
+          <a:lstStyle/>
+          <a:p>
+            <a:pPr algn="r"/>
+            <a:fld id="{4C8961B9-9BF0-44A4-A706-205F40A8B952}" type="slidenum">
+              <a:rPr lang="fr-FR" sz="1400" b="0" strike="noStrike" spc="-1" smtClean="0">
+                <a:latin typeface="Times New Roman"/>
+              </a:rPr>
+              <a:t>34</a:t>
+            </a:fld>
+            <a:endParaRPr lang="fr-FR" sz="1400" b="0" strike="noStrike" spc="-1">
+              <a:latin typeface="Times New Roman"/>
+            </a:endParaRPr>
+          </a:p>
+        </p:txBody>
+      </p:sp>
+    </p:spTree>
+    <p:extLst>
+      <p:ext uri="{BB962C8B-B14F-4D97-AF65-F5344CB8AC3E}">
+        <p14:creationId xmlns:p14="http://schemas.microsoft.com/office/powerpoint/2010/main" val="3632931389"/>
+      </p:ext>
+    </p:extLst>
+  </p:cSld>
+  <p:clrMapOvr>
+    <a:masterClrMapping/>
+  </p:clrMapOvr>
+</p:notes>
+</file>
+
+<file path=ppt/notesSlides/notesSlide35.xml><?xml version="1.0" encoding="utf-8"?>
+<p:notes xmlns:a="http://schemas.openxmlformats.org/drawingml/2006/main" xmlns:r="http://schemas.openxmlformats.org/officeDocument/2006/relationships" xmlns:p="http://schemas.openxmlformats.org/presentationml/2006/main">
+  <p:cSld>
+    <p:spTree>
+      <p:nvGrpSpPr>
+        <p:cNvPr id="1" name=""/>
+        <p:cNvGrpSpPr/>
+        <p:nvPr/>
+      </p:nvGrpSpPr>
+      <p:grpSpPr>
+        <a:xfrm>
+          <a:off x="0" y="0"/>
+          <a:ext cx="0" cy="0"/>
+          <a:chOff x="0" y="0"/>
+          <a:chExt cx="0" cy="0"/>
+        </a:xfrm>
+      </p:grpSpPr>
+      <p:sp>
+        <p:nvSpPr>
+          <p:cNvPr id="2" name="Espace réservé de l'image des diapositives 1"/>
+          <p:cNvSpPr>
+            <a:spLocks noGrp="1" noRot="1" noChangeAspect="1"/>
+          </p:cNvSpPr>
+          <p:nvPr>
+            <p:ph type="sldImg"/>
+          </p:nvPr>
+        </p:nvSpPr>
+        <p:spPr>
+          <a:xfrm>
+            <a:off x="217488" y="812800"/>
+            <a:ext cx="7124700" cy="4008438"/>
+          </a:xfrm>
+        </p:spPr>
+      </p:sp>
+      <p:sp>
+        <p:nvSpPr>
+          <p:cNvPr id="3" name="Espace réservé des commentaires 2"/>
+          <p:cNvSpPr>
+            <a:spLocks noGrp="1"/>
+          </p:cNvSpPr>
+          <p:nvPr>
+            <p:ph type="body" idx="1"/>
+          </p:nvPr>
+        </p:nvSpPr>
+        <p:spPr/>
+        <p:txBody>
+          <a:bodyPr/>
+          <a:lstStyle/>
+          <a:p>
+            <a:r>
+              <a:rPr lang="fr-FR" smtClean="0"/>
+              <a:t> </a:t>
+            </a:r>
+            <a:endParaRPr lang="fr-FR" dirty="0" smtClean="0"/>
+          </a:p>
+          <a:p>
+            <a:endParaRPr lang="fr-FR" dirty="0"/>
+          </a:p>
+        </p:txBody>
+      </p:sp>
+      <p:sp>
+        <p:nvSpPr>
+          <p:cNvPr id="4" name="Espace réservé du numéro de diapositive 3"/>
+          <p:cNvSpPr>
+            <a:spLocks noGrp="1"/>
+          </p:cNvSpPr>
+          <p:nvPr>
+            <p:ph type="sldNum" idx="10"/>
+          </p:nvPr>
+        </p:nvSpPr>
+        <p:spPr/>
+        <p:txBody>
+          <a:bodyPr/>
+          <a:lstStyle/>
+          <a:p>
+            <a:pPr algn="r"/>
+            <a:fld id="{4C8961B9-9BF0-44A4-A706-205F40A8B952}" type="slidenum">
+              <a:rPr lang="fr-FR" sz="1400" b="0" strike="noStrike" spc="-1" smtClean="0">
+                <a:latin typeface="Times New Roman"/>
+              </a:rPr>
+              <a:t>35</a:t>
+            </a:fld>
+            <a:endParaRPr lang="fr-FR" sz="1400" b="0" strike="noStrike" spc="-1">
+              <a:latin typeface="Times New Roman"/>
+            </a:endParaRPr>
+          </a:p>
+        </p:txBody>
+      </p:sp>
+    </p:spTree>
+    <p:extLst>
+      <p:ext uri="{BB962C8B-B14F-4D97-AF65-F5344CB8AC3E}">
+        <p14:creationId xmlns:p14="http://schemas.microsoft.com/office/powerpoint/2010/main" val="455324869"/>
+      </p:ext>
+    </p:extLst>
+  </p:cSld>
+  <p:clrMapOvr>
+    <a:masterClrMapping/>
+  </p:clrMapOvr>
+</p:notes>
+</file>
+
+<file path=ppt/notesSlides/notesSlide36.xml><?xml version="1.0" encoding="utf-8"?>
+<p:notes xmlns:a="http://schemas.openxmlformats.org/drawingml/2006/main" xmlns:r="http://schemas.openxmlformats.org/officeDocument/2006/relationships" xmlns:p="http://schemas.openxmlformats.org/presentationml/2006/main">
+  <p:cSld>
+    <p:spTree>
+      <p:nvGrpSpPr>
+        <p:cNvPr id="1" name=""/>
+        <p:cNvGrpSpPr/>
+        <p:nvPr/>
+      </p:nvGrpSpPr>
+      <p:grpSpPr>
+        <a:xfrm>
+          <a:off x="0" y="0"/>
+          <a:ext cx="0" cy="0"/>
+          <a:chOff x="0" y="0"/>
+          <a:chExt cx="0" cy="0"/>
+        </a:xfrm>
+      </p:grpSpPr>
+      <p:sp>
+        <p:nvSpPr>
+          <p:cNvPr id="2" name="Espace réservé de l'image des diapositives 1"/>
+          <p:cNvSpPr>
+            <a:spLocks noGrp="1" noRot="1" noChangeAspect="1"/>
+          </p:cNvSpPr>
+          <p:nvPr>
+            <p:ph type="sldImg"/>
+          </p:nvPr>
+        </p:nvSpPr>
+        <p:spPr>
+          <a:xfrm>
+            <a:off x="217488" y="812800"/>
+            <a:ext cx="7124700" cy="4008438"/>
+          </a:xfrm>
+        </p:spPr>
+      </p:sp>
+      <p:sp>
+        <p:nvSpPr>
+          <p:cNvPr id="3" name="Espace réservé des commentaires 2"/>
+          <p:cNvSpPr>
+            <a:spLocks noGrp="1"/>
+          </p:cNvSpPr>
+          <p:nvPr>
+            <p:ph type="body" idx="1"/>
+          </p:nvPr>
+        </p:nvSpPr>
+        <p:spPr/>
+        <p:txBody>
+          <a:bodyPr/>
+          <a:lstStyle/>
+          <a:p>
+            <a:r>
+              <a:rPr lang="fr-FR" smtClean="0"/>
+              <a:t> </a:t>
+            </a:r>
+            <a:endParaRPr lang="fr-FR" dirty="0" smtClean="0"/>
+          </a:p>
+          <a:p>
+            <a:endParaRPr lang="fr-FR" dirty="0"/>
+          </a:p>
+        </p:txBody>
+      </p:sp>
+      <p:sp>
+        <p:nvSpPr>
+          <p:cNvPr id="4" name="Espace réservé du numéro de diapositive 3"/>
+          <p:cNvSpPr>
+            <a:spLocks noGrp="1"/>
+          </p:cNvSpPr>
+          <p:nvPr>
+            <p:ph type="sldNum" idx="10"/>
+          </p:nvPr>
+        </p:nvSpPr>
+        <p:spPr/>
+        <p:txBody>
+          <a:bodyPr/>
+          <a:lstStyle/>
+          <a:p>
+            <a:pPr algn="r"/>
+            <a:fld id="{4C8961B9-9BF0-44A4-A706-205F40A8B952}" type="slidenum">
+              <a:rPr lang="fr-FR" sz="1400" b="0" strike="noStrike" spc="-1" smtClean="0">
+                <a:latin typeface="Times New Roman"/>
+              </a:rPr>
+              <a:t>36</a:t>
+            </a:fld>
+            <a:endParaRPr lang="fr-FR" sz="1400" b="0" strike="noStrike" spc="-1">
+              <a:latin typeface="Times New Roman"/>
+            </a:endParaRPr>
+          </a:p>
+        </p:txBody>
+      </p:sp>
+    </p:spTree>
+    <p:extLst>
+      <p:ext uri="{BB962C8B-B14F-4D97-AF65-F5344CB8AC3E}">
+        <p14:creationId xmlns:p14="http://schemas.microsoft.com/office/powerpoint/2010/main" val="2265272668"/>
+      </p:ext>
+    </p:extLst>
+  </p:cSld>
+  <p:clrMapOvr>
+    <a:masterClrMapping/>
+  </p:clrMapOvr>
+</p:notes>
+</file>
+
+<file path=ppt/notesSlides/notesSlide37.xml><?xml version="1.0" encoding="utf-8"?>
+<p:notes xmlns:a="http://schemas.openxmlformats.org/drawingml/2006/main" xmlns:r="http://schemas.openxmlformats.org/officeDocument/2006/relationships" xmlns:p="http://schemas.openxmlformats.org/presentationml/2006/main">
+  <p:cSld>
+    <p:spTree>
+      <p:nvGrpSpPr>
+        <p:cNvPr id="1" name=""/>
+        <p:cNvGrpSpPr/>
+        <p:nvPr/>
+      </p:nvGrpSpPr>
+      <p:grpSpPr>
+        <a:xfrm>
+          <a:off x="0" y="0"/>
+          <a:ext cx="0" cy="0"/>
+          <a:chOff x="0" y="0"/>
+          <a:chExt cx="0" cy="0"/>
+        </a:xfrm>
+      </p:grpSpPr>
+      <p:sp>
+        <p:nvSpPr>
+          <p:cNvPr id="2" name="Espace réservé de l'image des diapositives 1"/>
+          <p:cNvSpPr>
+            <a:spLocks noGrp="1" noRot="1" noChangeAspect="1"/>
+          </p:cNvSpPr>
+          <p:nvPr>
+            <p:ph type="sldImg"/>
+          </p:nvPr>
+        </p:nvSpPr>
+        <p:spPr>
+          <a:xfrm>
+            <a:off x="217488" y="812800"/>
+            <a:ext cx="7124700" cy="4008438"/>
+          </a:xfrm>
+        </p:spPr>
+      </p:sp>
+      <p:sp>
+        <p:nvSpPr>
+          <p:cNvPr id="3" name="Espace réservé des commentaires 2"/>
+          <p:cNvSpPr>
+            <a:spLocks noGrp="1"/>
+          </p:cNvSpPr>
+          <p:nvPr>
+            <p:ph type="body" idx="1"/>
+          </p:nvPr>
+        </p:nvSpPr>
+        <p:spPr/>
+        <p:txBody>
+          <a:bodyPr/>
+          <a:lstStyle/>
+          <a:p>
+            <a:r>
+              <a:rPr lang="fr-FR" smtClean="0"/>
+              <a:t> </a:t>
+            </a:r>
+            <a:endParaRPr lang="fr-FR" dirty="0" smtClean="0"/>
+          </a:p>
+          <a:p>
+            <a:endParaRPr lang="fr-FR" dirty="0"/>
+          </a:p>
+        </p:txBody>
+      </p:sp>
+      <p:sp>
+        <p:nvSpPr>
+          <p:cNvPr id="4" name="Espace réservé du numéro de diapositive 3"/>
+          <p:cNvSpPr>
+            <a:spLocks noGrp="1"/>
+          </p:cNvSpPr>
+          <p:nvPr>
+            <p:ph type="sldNum" idx="10"/>
+          </p:nvPr>
+        </p:nvSpPr>
+        <p:spPr/>
+        <p:txBody>
+          <a:bodyPr/>
+          <a:lstStyle/>
+          <a:p>
+            <a:pPr algn="r"/>
+            <a:fld id="{4C8961B9-9BF0-44A4-A706-205F40A8B952}" type="slidenum">
+              <a:rPr lang="fr-FR" sz="1400" b="0" strike="noStrike" spc="-1" smtClean="0">
+                <a:latin typeface="Times New Roman"/>
+              </a:rPr>
+              <a:t>37</a:t>
+            </a:fld>
+            <a:endParaRPr lang="fr-FR" sz="1400" b="0" strike="noStrike" spc="-1">
+              <a:latin typeface="Times New Roman"/>
+            </a:endParaRPr>
+          </a:p>
+        </p:txBody>
+      </p:sp>
+    </p:spTree>
+    <p:extLst>
+      <p:ext uri="{BB962C8B-B14F-4D97-AF65-F5344CB8AC3E}">
+        <p14:creationId xmlns:p14="http://schemas.microsoft.com/office/powerpoint/2010/main" val="2705653615"/>
+      </p:ext>
+    </p:extLst>
+  </p:cSld>
+  <p:clrMapOvr>
+    <a:masterClrMapping/>
+  </p:clrMapOvr>
+</p:notes>
+</file>
+
+<file path=ppt/notesSlides/notesSlide38.xml><?xml version="1.0" encoding="utf-8"?>
+<p:notes xmlns:a="http://schemas.openxmlformats.org/drawingml/2006/main" xmlns:r="http://schemas.openxmlformats.org/officeDocument/2006/relationships" xmlns:p="http://schemas.openxmlformats.org/presentationml/2006/main">
+  <p:cSld>
+    <p:spTree>
+      <p:nvGrpSpPr>
+        <p:cNvPr id="1" name=""/>
+        <p:cNvGrpSpPr/>
+        <p:nvPr/>
+      </p:nvGrpSpPr>
+      <p:grpSpPr>
+        <a:xfrm>
+          <a:off x="0" y="0"/>
+          <a:ext cx="0" cy="0"/>
+          <a:chOff x="0" y="0"/>
+          <a:chExt cx="0" cy="0"/>
+        </a:xfrm>
+      </p:grpSpPr>
+      <p:sp>
+        <p:nvSpPr>
+          <p:cNvPr id="2" name="Espace réservé de l'image des diapositives 1"/>
+          <p:cNvSpPr>
+            <a:spLocks noGrp="1" noRot="1" noChangeAspect="1"/>
+          </p:cNvSpPr>
+          <p:nvPr>
+            <p:ph type="sldImg"/>
+          </p:nvPr>
+        </p:nvSpPr>
+        <p:spPr>
+          <a:xfrm>
+            <a:off x="217488" y="812800"/>
+            <a:ext cx="7124700" cy="4008438"/>
+          </a:xfrm>
+        </p:spPr>
+      </p:sp>
+      <p:sp>
+        <p:nvSpPr>
+          <p:cNvPr id="3" name="Espace réservé des commentaires 2"/>
+          <p:cNvSpPr>
+            <a:spLocks noGrp="1"/>
+          </p:cNvSpPr>
+          <p:nvPr>
+            <p:ph type="body" idx="1"/>
+          </p:nvPr>
+        </p:nvSpPr>
+        <p:spPr/>
+        <p:txBody>
+          <a:bodyPr/>
+          <a:lstStyle/>
+          <a:p>
+            <a:r>
+              <a:rPr lang="fr-FR" smtClean="0"/>
+              <a:t> </a:t>
+            </a:r>
+            <a:endParaRPr lang="fr-FR" dirty="0" smtClean="0"/>
+          </a:p>
+          <a:p>
+            <a:endParaRPr lang="fr-FR" dirty="0"/>
+          </a:p>
+        </p:txBody>
+      </p:sp>
+      <p:sp>
+        <p:nvSpPr>
+          <p:cNvPr id="4" name="Espace réservé du numéro de diapositive 3"/>
+          <p:cNvSpPr>
+            <a:spLocks noGrp="1"/>
+          </p:cNvSpPr>
+          <p:nvPr>
+            <p:ph type="sldNum" idx="10"/>
+          </p:nvPr>
+        </p:nvSpPr>
+        <p:spPr/>
+        <p:txBody>
+          <a:bodyPr/>
+          <a:lstStyle/>
+          <a:p>
+            <a:pPr algn="r"/>
+            <a:fld id="{4C8961B9-9BF0-44A4-A706-205F40A8B952}" type="slidenum">
+              <a:rPr lang="fr-FR" sz="1400" b="0" strike="noStrike" spc="-1" smtClean="0">
+                <a:latin typeface="Times New Roman"/>
+              </a:rPr>
+              <a:t>38</a:t>
+            </a:fld>
+            <a:endParaRPr lang="fr-FR" sz="1400" b="0" strike="noStrike" spc="-1">
+              <a:latin typeface="Times New Roman"/>
+            </a:endParaRPr>
+          </a:p>
+        </p:txBody>
+      </p:sp>
+    </p:spTree>
+    <p:extLst>
+      <p:ext uri="{BB962C8B-B14F-4D97-AF65-F5344CB8AC3E}">
+        <p14:creationId xmlns:p14="http://schemas.microsoft.com/office/powerpoint/2010/main" val="3794957818"/>
+      </p:ext>
+    </p:extLst>
+  </p:cSld>
+  <p:clrMapOvr>
+    <a:masterClrMapping/>
+  </p:clrMapOvr>
+</p:notes>
+</file>
+
+<file path=ppt/notesSlides/notesSlide39.xml><?xml version="1.0" encoding="utf-8"?>
+<p:notes xmlns:a="http://schemas.openxmlformats.org/drawingml/2006/main" xmlns:r="http://schemas.openxmlformats.org/officeDocument/2006/relationships" xmlns:p="http://schemas.openxmlformats.org/presentationml/2006/main">
+  <p:cSld>
+    <p:spTree>
+      <p:nvGrpSpPr>
+        <p:cNvPr id="1" name=""/>
+        <p:cNvGrpSpPr/>
+        <p:nvPr/>
+      </p:nvGrpSpPr>
+      <p:grpSpPr>
+        <a:xfrm>
+          <a:off x="0" y="0"/>
+          <a:ext cx="0" cy="0"/>
+          <a:chOff x="0" y="0"/>
+          <a:chExt cx="0" cy="0"/>
+        </a:xfrm>
+      </p:grpSpPr>
+      <p:sp>
+        <p:nvSpPr>
+          <p:cNvPr id="2" name="Espace réservé de l'image des diapositives 1"/>
+          <p:cNvSpPr>
+            <a:spLocks noGrp="1" noRot="1" noChangeAspect="1"/>
+          </p:cNvSpPr>
+          <p:nvPr>
+            <p:ph type="sldImg"/>
+          </p:nvPr>
+        </p:nvSpPr>
+        <p:spPr>
+          <a:xfrm>
+            <a:off x="217488" y="812800"/>
+            <a:ext cx="7124700" cy="4008438"/>
+          </a:xfrm>
+        </p:spPr>
+      </p:sp>
+      <p:sp>
+        <p:nvSpPr>
+          <p:cNvPr id="3" name="Espace réservé des commentaires 2"/>
+          <p:cNvSpPr>
+            <a:spLocks noGrp="1"/>
+          </p:cNvSpPr>
+          <p:nvPr>
+            <p:ph type="body" idx="1"/>
+          </p:nvPr>
+        </p:nvSpPr>
+        <p:spPr/>
+        <p:txBody>
+          <a:bodyPr/>
+          <a:lstStyle/>
+          <a:p>
+            <a:r>
+              <a:rPr lang="fr-FR" smtClean="0"/>
+              <a:t> </a:t>
+            </a:r>
+            <a:endParaRPr lang="fr-FR" dirty="0" smtClean="0"/>
+          </a:p>
+          <a:p>
+            <a:endParaRPr lang="fr-FR" dirty="0"/>
+          </a:p>
+        </p:txBody>
+      </p:sp>
+      <p:sp>
+        <p:nvSpPr>
+          <p:cNvPr id="4" name="Espace réservé du numéro de diapositive 3"/>
+          <p:cNvSpPr>
+            <a:spLocks noGrp="1"/>
+          </p:cNvSpPr>
+          <p:nvPr>
+            <p:ph type="sldNum" idx="10"/>
+          </p:nvPr>
+        </p:nvSpPr>
+        <p:spPr/>
+        <p:txBody>
+          <a:bodyPr/>
+          <a:lstStyle/>
+          <a:p>
+            <a:pPr algn="r"/>
+            <a:fld id="{4C8961B9-9BF0-44A4-A706-205F40A8B952}" type="slidenum">
+              <a:rPr lang="fr-FR" sz="1400" b="0" strike="noStrike" spc="-1" smtClean="0">
+                <a:latin typeface="Times New Roman"/>
+              </a:rPr>
+              <a:t>39</a:t>
+            </a:fld>
+            <a:endParaRPr lang="fr-FR" sz="1400" b="0" strike="noStrike" spc="-1">
+              <a:latin typeface="Times New Roman"/>
+            </a:endParaRPr>
+          </a:p>
+        </p:txBody>
+      </p:sp>
+    </p:spTree>
+    <p:extLst>
+      <p:ext uri="{BB962C8B-B14F-4D97-AF65-F5344CB8AC3E}">
+        <p14:creationId xmlns:p14="http://schemas.microsoft.com/office/powerpoint/2010/main" val="2501492494"/>
+      </p:ext>
+    </p:extLst>
+  </p:cSld>
+  <p:clrMapOvr>
+    <a:masterClrMapping/>
+  </p:clrMapOvr>
+</p:notes>
+</file>
+
 <file path=ppt/notesSlides/notesSlide4.xml><?xml version="1.0" encoding="utf-8"?>
 <p:notes xmlns:a="http://schemas.openxmlformats.org/drawingml/2006/main" xmlns:r="http://schemas.openxmlformats.org/officeDocument/2006/relationships" xmlns:p="http://schemas.openxmlformats.org/presentationml/2006/main">
   <p:cSld>
@@ -4694,6 +5555,107 @@
     <p:extLst>
       <p:ext uri="{BB962C8B-B14F-4D97-AF65-F5344CB8AC3E}">
         <p14:creationId xmlns:p14="http://schemas.microsoft.com/office/powerpoint/2010/main" val="445238254"/>
+      </p:ext>
+    </p:extLst>
+  </p:cSld>
+  <p:clrMapOvr>
+    <a:masterClrMapping/>
+  </p:clrMapOvr>
+</p:notes>
+</file>
+
+<file path=ppt/notesSlides/notesSlide40.xml><?xml version="1.0" encoding="utf-8"?>
+<p:notes xmlns:a="http://schemas.openxmlformats.org/drawingml/2006/main" xmlns:r="http://schemas.openxmlformats.org/officeDocument/2006/relationships" xmlns:p="http://schemas.openxmlformats.org/presentationml/2006/main">
+  <p:cSld>
+    <p:spTree>
+      <p:nvGrpSpPr>
+        <p:cNvPr id="1" name=""/>
+        <p:cNvGrpSpPr/>
+        <p:nvPr/>
+      </p:nvGrpSpPr>
+      <p:grpSpPr>
+        <a:xfrm>
+          <a:off x="0" y="0"/>
+          <a:ext cx="0" cy="0"/>
+          <a:chOff x="0" y="0"/>
+          <a:chExt cx="0" cy="0"/>
+        </a:xfrm>
+      </p:grpSpPr>
+      <p:sp>
+        <p:nvSpPr>
+          <p:cNvPr id="2" name="Espace réservé de l'image des diapositives 1"/>
+          <p:cNvSpPr>
+            <a:spLocks noGrp="1" noRot="1" noChangeAspect="1"/>
+          </p:cNvSpPr>
+          <p:nvPr>
+            <p:ph type="sldImg"/>
+          </p:nvPr>
+        </p:nvSpPr>
+        <p:spPr>
+          <a:xfrm>
+            <a:off x="217488" y="812800"/>
+            <a:ext cx="7124700" cy="4008438"/>
+          </a:xfrm>
+        </p:spPr>
+      </p:sp>
+      <p:sp>
+        <p:nvSpPr>
+          <p:cNvPr id="3" name="Espace réservé des commentaires 2"/>
+          <p:cNvSpPr>
+            <a:spLocks noGrp="1"/>
+          </p:cNvSpPr>
+          <p:nvPr>
+            <p:ph type="body" idx="1"/>
+          </p:nvPr>
+        </p:nvSpPr>
+        <p:spPr/>
+        <p:txBody>
+          <a:bodyPr/>
+          <a:lstStyle/>
+          <a:p>
+            <a:r>
+              <a:rPr lang="fr-FR" smtClean="0"/>
+              <a:t> </a:t>
+            </a:r>
+            <a:endParaRPr lang="fr-FR" dirty="0" smtClean="0"/>
+          </a:p>
+          <a:p>
+            <a:endParaRPr lang="fr-FR" dirty="0"/>
+          </a:p>
+        </p:txBody>
+      </p:sp>
+      <p:sp>
+        <p:nvSpPr>
+          <p:cNvPr id="4" name="Espace réservé du numéro de diapositive 3"/>
+          <p:cNvSpPr>
+            <a:spLocks noGrp="1"/>
+          </p:cNvSpPr>
+          <p:nvPr>
+            <p:ph type="sldNum" idx="10"/>
+          </p:nvPr>
+        </p:nvSpPr>
+        <p:spPr/>
+        <p:txBody>
+          <a:bodyPr/>
+          <a:lstStyle/>
+          <a:p>
+            <a:pPr algn="r"/>
+            <a:fld id="{4C8961B9-9BF0-44A4-A706-205F40A8B952}" type="slidenum">
+              <a:rPr lang="fr-FR" sz="1400" b="0" strike="noStrike" spc="-1" smtClean="0">
+                <a:latin typeface="Times New Roman"/>
+              </a:rPr>
+              <a:t>40</a:t>
+            </a:fld>
+            <a:endParaRPr lang="fr-FR" sz="1400" b="0" strike="noStrike" spc="-1">
+              <a:latin typeface="Times New Roman"/>
+            </a:endParaRPr>
+          </a:p>
+        </p:txBody>
+      </p:sp>
+    </p:spTree>
+    <p:extLst>
+      <p:ext uri="{BB962C8B-B14F-4D97-AF65-F5344CB8AC3E}">
+        <p14:creationId xmlns:p14="http://schemas.microsoft.com/office/powerpoint/2010/main" val="3217792340"/>
       </p:ext>
     </p:extLst>
   </p:cSld>
@@ -15973,6 +16935,1310 @@
 </p:sld>
 </file>
 
+<file path=ppt/slides/slide32.xml><?xml version="1.0" encoding="utf-8"?>
+<p:sld xmlns:a="http://schemas.openxmlformats.org/drawingml/2006/main" xmlns:r="http://schemas.openxmlformats.org/officeDocument/2006/relationships" xmlns:p="http://schemas.openxmlformats.org/presentationml/2006/main">
+  <p:cSld>
+    <p:spTree>
+      <p:nvGrpSpPr>
+        <p:cNvPr id="1" name=""/>
+        <p:cNvGrpSpPr/>
+        <p:nvPr/>
+      </p:nvGrpSpPr>
+      <p:grpSpPr>
+        <a:xfrm>
+          <a:off x="0" y="0"/>
+          <a:ext cx="0" cy="0"/>
+          <a:chOff x="0" y="0"/>
+          <a:chExt cx="0" cy="0"/>
+        </a:xfrm>
+      </p:grpSpPr>
+      <p:sp>
+        <p:nvSpPr>
+          <p:cNvPr id="144" name="CustomShape 1"/>
+          <p:cNvSpPr/>
+          <p:nvPr/>
+        </p:nvSpPr>
+        <p:spPr>
+          <a:xfrm>
+            <a:off x="609480" y="704160"/>
+            <a:ext cx="10972080" cy="1142280"/>
+          </a:xfrm>
+          <a:prstGeom prst="rect">
+            <a:avLst/>
+          </a:prstGeom>
+          <a:noFill/>
+          <a:ln>
+            <a:noFill/>
+          </a:ln>
+        </p:spPr>
+        <p:style>
+          <a:lnRef idx="0">
+            <a:scrgbClr r="0" g="0" b="0"/>
+          </a:lnRef>
+          <a:fillRef idx="0">
+            <a:scrgbClr r="0" g="0" b="0"/>
+          </a:fillRef>
+          <a:effectRef idx="0">
+            <a:scrgbClr r="0" g="0" b="0"/>
+          </a:effectRef>
+          <a:fontRef idx="minor"/>
+        </p:style>
+        <p:txBody>
+          <a:bodyPr lIns="0" tIns="45000" rIns="0" bIns="0" anchor="b">
+            <a:noAutofit/>
+          </a:bodyPr>
+          <a:lstStyle/>
+          <a:p>
+            <a:pPr>
+              <a:lnSpc>
+                <a:spcPct val="100000"/>
+              </a:lnSpc>
+            </a:pPr>
+            <a:r>
+              <a:rPr lang="fr-FR" sz="5000" b="0" strike="noStrike" spc="-1" dirty="0" smtClean="0">
+                <a:solidFill>
+                  <a:srgbClr val="455F51"/>
+                </a:solidFill>
+                <a:latin typeface="Century Gothic"/>
+              </a:rPr>
+              <a:t> </a:t>
+            </a:r>
+            <a:endParaRPr lang="fr-FR" sz="5000" b="0" strike="noStrike" spc="-1" dirty="0">
+              <a:latin typeface="Arial"/>
+            </a:endParaRPr>
+          </a:p>
+        </p:txBody>
+      </p:sp>
+      <p:sp>
+        <p:nvSpPr>
+          <p:cNvPr id="145" name="CustomShape 2"/>
+          <p:cNvSpPr/>
+          <p:nvPr/>
+        </p:nvSpPr>
+        <p:spPr>
+          <a:xfrm>
+            <a:off x="609480" y="1935360"/>
+            <a:ext cx="10972080" cy="4388400"/>
+          </a:xfrm>
+          <a:prstGeom prst="rect">
+            <a:avLst/>
+          </a:prstGeom>
+          <a:noFill/>
+          <a:ln>
+            <a:noFill/>
+          </a:ln>
+        </p:spPr>
+        <p:style>
+          <a:lnRef idx="0">
+            <a:scrgbClr r="0" g="0" b="0"/>
+          </a:lnRef>
+          <a:fillRef idx="0">
+            <a:scrgbClr r="0" g="0" b="0"/>
+          </a:fillRef>
+          <a:effectRef idx="0">
+            <a:scrgbClr r="0" g="0" b="0"/>
+          </a:effectRef>
+          <a:fontRef idx="minor"/>
+        </p:style>
+        <p:txBody>
+          <a:bodyPr lIns="90000" tIns="45000" rIns="90000" bIns="45000">
+            <a:noAutofit/>
+          </a:bodyPr>
+          <a:lstStyle/>
+          <a:p>
+            <a:pPr marL="274320" indent="-273600">
+              <a:lnSpc>
+                <a:spcPct val="100000"/>
+              </a:lnSpc>
+              <a:spcBef>
+                <a:spcPts val="519"/>
+              </a:spcBef>
+              <a:buClr>
+                <a:srgbClr val="626B1A"/>
+              </a:buClr>
+              <a:buSzPct val="95000"/>
+              <a:buFont typeface="Wingdings 2" charset="2"/>
+              <a:buChar char=""/>
+            </a:pPr>
+            <a:endParaRPr lang="fr-FR" sz="2600" b="0" strike="noStrike" spc="-1" dirty="0">
+              <a:latin typeface="Arial"/>
+            </a:endParaRPr>
+          </a:p>
+        </p:txBody>
+      </p:sp>
+    </p:spTree>
+    <p:extLst>
+      <p:ext uri="{BB962C8B-B14F-4D97-AF65-F5344CB8AC3E}">
+        <p14:creationId xmlns:p14="http://schemas.microsoft.com/office/powerpoint/2010/main" val="44115267"/>
+      </p:ext>
+    </p:extLst>
+  </p:cSld>
+  <p:clrMapOvr>
+    <a:masterClrMapping/>
+  </p:clrMapOvr>
+  <mc:AlternateContent xmlns:mc="http://schemas.openxmlformats.org/markup-compatibility/2006">
+    <mc:Choice xmlns:p14="http://schemas.microsoft.com/office/powerpoint/2010/main" Requires="p14">
+      <p:transition spd="med" p14:dur="700">
+        <p:fade/>
+      </p:transition>
+    </mc:Choice>
+    <mc:Fallback>
+      <p:transition spd="med">
+        <p:fade/>
+      </p:transition>
+    </mc:Fallback>
+  </mc:AlternateContent>
+  <p:timing>
+    <p:tnLst>
+      <p:par>
+        <p:cTn id="1" dur="indefinite" restart="never" nodeType="tmRoot"/>
+      </p:par>
+    </p:tnLst>
+  </p:timing>
+</p:sld>
+</file>
+
+<file path=ppt/slides/slide33.xml><?xml version="1.0" encoding="utf-8"?>
+<p:sld xmlns:a="http://schemas.openxmlformats.org/drawingml/2006/main" xmlns:r="http://schemas.openxmlformats.org/officeDocument/2006/relationships" xmlns:p="http://schemas.openxmlformats.org/presentationml/2006/main">
+  <p:cSld>
+    <p:spTree>
+      <p:nvGrpSpPr>
+        <p:cNvPr id="1" name=""/>
+        <p:cNvGrpSpPr/>
+        <p:nvPr/>
+      </p:nvGrpSpPr>
+      <p:grpSpPr>
+        <a:xfrm>
+          <a:off x="0" y="0"/>
+          <a:ext cx="0" cy="0"/>
+          <a:chOff x="0" y="0"/>
+          <a:chExt cx="0" cy="0"/>
+        </a:xfrm>
+      </p:grpSpPr>
+      <p:sp>
+        <p:nvSpPr>
+          <p:cNvPr id="144" name="CustomShape 1"/>
+          <p:cNvSpPr/>
+          <p:nvPr/>
+        </p:nvSpPr>
+        <p:spPr>
+          <a:xfrm>
+            <a:off x="609480" y="704160"/>
+            <a:ext cx="10972080" cy="1142280"/>
+          </a:xfrm>
+          <a:prstGeom prst="rect">
+            <a:avLst/>
+          </a:prstGeom>
+          <a:noFill/>
+          <a:ln>
+            <a:noFill/>
+          </a:ln>
+        </p:spPr>
+        <p:style>
+          <a:lnRef idx="0">
+            <a:scrgbClr r="0" g="0" b="0"/>
+          </a:lnRef>
+          <a:fillRef idx="0">
+            <a:scrgbClr r="0" g="0" b="0"/>
+          </a:fillRef>
+          <a:effectRef idx="0">
+            <a:scrgbClr r="0" g="0" b="0"/>
+          </a:effectRef>
+          <a:fontRef idx="minor"/>
+        </p:style>
+        <p:txBody>
+          <a:bodyPr lIns="0" tIns="45000" rIns="0" bIns="0" anchor="b">
+            <a:noAutofit/>
+          </a:bodyPr>
+          <a:lstStyle/>
+          <a:p>
+            <a:pPr>
+              <a:lnSpc>
+                <a:spcPct val="100000"/>
+              </a:lnSpc>
+            </a:pPr>
+            <a:r>
+              <a:rPr lang="fr-FR" sz="5000" b="0" strike="noStrike" spc="-1" dirty="0" smtClean="0">
+                <a:solidFill>
+                  <a:srgbClr val="455F51"/>
+                </a:solidFill>
+                <a:latin typeface="Century Gothic"/>
+              </a:rPr>
+              <a:t> </a:t>
+            </a:r>
+            <a:endParaRPr lang="fr-FR" sz="5000" b="0" strike="noStrike" spc="-1" dirty="0">
+              <a:latin typeface="Arial"/>
+            </a:endParaRPr>
+          </a:p>
+        </p:txBody>
+      </p:sp>
+      <p:sp>
+        <p:nvSpPr>
+          <p:cNvPr id="145" name="CustomShape 2"/>
+          <p:cNvSpPr/>
+          <p:nvPr/>
+        </p:nvSpPr>
+        <p:spPr>
+          <a:xfrm>
+            <a:off x="609480" y="1935360"/>
+            <a:ext cx="10972080" cy="4388400"/>
+          </a:xfrm>
+          <a:prstGeom prst="rect">
+            <a:avLst/>
+          </a:prstGeom>
+          <a:noFill/>
+          <a:ln>
+            <a:noFill/>
+          </a:ln>
+        </p:spPr>
+        <p:style>
+          <a:lnRef idx="0">
+            <a:scrgbClr r="0" g="0" b="0"/>
+          </a:lnRef>
+          <a:fillRef idx="0">
+            <a:scrgbClr r="0" g="0" b="0"/>
+          </a:fillRef>
+          <a:effectRef idx="0">
+            <a:scrgbClr r="0" g="0" b="0"/>
+          </a:effectRef>
+          <a:fontRef idx="minor"/>
+        </p:style>
+        <p:txBody>
+          <a:bodyPr lIns="90000" tIns="45000" rIns="90000" bIns="45000">
+            <a:noAutofit/>
+          </a:bodyPr>
+          <a:lstStyle/>
+          <a:p>
+            <a:pPr marL="274320" indent="-273600">
+              <a:lnSpc>
+                <a:spcPct val="100000"/>
+              </a:lnSpc>
+              <a:spcBef>
+                <a:spcPts val="519"/>
+              </a:spcBef>
+              <a:buClr>
+                <a:srgbClr val="626B1A"/>
+              </a:buClr>
+              <a:buSzPct val="95000"/>
+              <a:buFont typeface="Wingdings 2" charset="2"/>
+              <a:buChar char=""/>
+            </a:pPr>
+            <a:endParaRPr lang="fr-FR" sz="2600" b="0" strike="noStrike" spc="-1" dirty="0">
+              <a:latin typeface="Arial"/>
+            </a:endParaRPr>
+          </a:p>
+        </p:txBody>
+      </p:sp>
+    </p:spTree>
+    <p:extLst>
+      <p:ext uri="{BB962C8B-B14F-4D97-AF65-F5344CB8AC3E}">
+        <p14:creationId xmlns:p14="http://schemas.microsoft.com/office/powerpoint/2010/main" val="3344790749"/>
+      </p:ext>
+    </p:extLst>
+  </p:cSld>
+  <p:clrMapOvr>
+    <a:masterClrMapping/>
+  </p:clrMapOvr>
+  <mc:AlternateContent xmlns:mc="http://schemas.openxmlformats.org/markup-compatibility/2006">
+    <mc:Choice xmlns:p14="http://schemas.microsoft.com/office/powerpoint/2010/main" Requires="p14">
+      <p:transition spd="med" p14:dur="700">
+        <p:fade/>
+      </p:transition>
+    </mc:Choice>
+    <mc:Fallback>
+      <p:transition spd="med">
+        <p:fade/>
+      </p:transition>
+    </mc:Fallback>
+  </mc:AlternateContent>
+  <p:timing>
+    <p:tnLst>
+      <p:par>
+        <p:cTn id="1" dur="indefinite" restart="never" nodeType="tmRoot"/>
+      </p:par>
+    </p:tnLst>
+  </p:timing>
+</p:sld>
+</file>
+
+<file path=ppt/slides/slide34.xml><?xml version="1.0" encoding="utf-8"?>
+<p:sld xmlns:a="http://schemas.openxmlformats.org/drawingml/2006/main" xmlns:r="http://schemas.openxmlformats.org/officeDocument/2006/relationships" xmlns:p="http://schemas.openxmlformats.org/presentationml/2006/main">
+  <p:cSld>
+    <p:spTree>
+      <p:nvGrpSpPr>
+        <p:cNvPr id="1" name=""/>
+        <p:cNvGrpSpPr/>
+        <p:nvPr/>
+      </p:nvGrpSpPr>
+      <p:grpSpPr>
+        <a:xfrm>
+          <a:off x="0" y="0"/>
+          <a:ext cx="0" cy="0"/>
+          <a:chOff x="0" y="0"/>
+          <a:chExt cx="0" cy="0"/>
+        </a:xfrm>
+      </p:grpSpPr>
+      <p:sp>
+        <p:nvSpPr>
+          <p:cNvPr id="144" name="CustomShape 1"/>
+          <p:cNvSpPr/>
+          <p:nvPr/>
+        </p:nvSpPr>
+        <p:spPr>
+          <a:xfrm>
+            <a:off x="609480" y="704160"/>
+            <a:ext cx="10972080" cy="1142280"/>
+          </a:xfrm>
+          <a:prstGeom prst="rect">
+            <a:avLst/>
+          </a:prstGeom>
+          <a:noFill/>
+          <a:ln>
+            <a:noFill/>
+          </a:ln>
+        </p:spPr>
+        <p:style>
+          <a:lnRef idx="0">
+            <a:scrgbClr r="0" g="0" b="0"/>
+          </a:lnRef>
+          <a:fillRef idx="0">
+            <a:scrgbClr r="0" g="0" b="0"/>
+          </a:fillRef>
+          <a:effectRef idx="0">
+            <a:scrgbClr r="0" g="0" b="0"/>
+          </a:effectRef>
+          <a:fontRef idx="minor"/>
+        </p:style>
+        <p:txBody>
+          <a:bodyPr lIns="0" tIns="45000" rIns="0" bIns="0" anchor="b">
+            <a:noAutofit/>
+          </a:bodyPr>
+          <a:lstStyle/>
+          <a:p>
+            <a:pPr>
+              <a:lnSpc>
+                <a:spcPct val="100000"/>
+              </a:lnSpc>
+            </a:pPr>
+            <a:r>
+              <a:rPr lang="fr-FR" sz="5000" b="0" strike="noStrike" spc="-1" dirty="0" smtClean="0">
+                <a:solidFill>
+                  <a:srgbClr val="455F51"/>
+                </a:solidFill>
+                <a:latin typeface="Century Gothic"/>
+              </a:rPr>
+              <a:t> </a:t>
+            </a:r>
+            <a:endParaRPr lang="fr-FR" sz="5000" b="0" strike="noStrike" spc="-1" dirty="0">
+              <a:latin typeface="Arial"/>
+            </a:endParaRPr>
+          </a:p>
+        </p:txBody>
+      </p:sp>
+      <p:sp>
+        <p:nvSpPr>
+          <p:cNvPr id="145" name="CustomShape 2"/>
+          <p:cNvSpPr/>
+          <p:nvPr/>
+        </p:nvSpPr>
+        <p:spPr>
+          <a:xfrm>
+            <a:off x="609480" y="1935360"/>
+            <a:ext cx="10972080" cy="4388400"/>
+          </a:xfrm>
+          <a:prstGeom prst="rect">
+            <a:avLst/>
+          </a:prstGeom>
+          <a:noFill/>
+          <a:ln>
+            <a:noFill/>
+          </a:ln>
+        </p:spPr>
+        <p:style>
+          <a:lnRef idx="0">
+            <a:scrgbClr r="0" g="0" b="0"/>
+          </a:lnRef>
+          <a:fillRef idx="0">
+            <a:scrgbClr r="0" g="0" b="0"/>
+          </a:fillRef>
+          <a:effectRef idx="0">
+            <a:scrgbClr r="0" g="0" b="0"/>
+          </a:effectRef>
+          <a:fontRef idx="minor"/>
+        </p:style>
+        <p:txBody>
+          <a:bodyPr lIns="90000" tIns="45000" rIns="90000" bIns="45000">
+            <a:noAutofit/>
+          </a:bodyPr>
+          <a:lstStyle/>
+          <a:p>
+            <a:pPr marL="274320" indent="-273600">
+              <a:lnSpc>
+                <a:spcPct val="100000"/>
+              </a:lnSpc>
+              <a:spcBef>
+                <a:spcPts val="519"/>
+              </a:spcBef>
+              <a:buClr>
+                <a:srgbClr val="626B1A"/>
+              </a:buClr>
+              <a:buSzPct val="95000"/>
+              <a:buFont typeface="Wingdings 2" charset="2"/>
+              <a:buChar char=""/>
+            </a:pPr>
+            <a:endParaRPr lang="fr-FR" sz="2600" b="0" strike="noStrike" spc="-1" dirty="0">
+              <a:latin typeface="Arial"/>
+            </a:endParaRPr>
+          </a:p>
+        </p:txBody>
+      </p:sp>
+    </p:spTree>
+    <p:extLst>
+      <p:ext uri="{BB962C8B-B14F-4D97-AF65-F5344CB8AC3E}">
+        <p14:creationId xmlns:p14="http://schemas.microsoft.com/office/powerpoint/2010/main" val="3261194494"/>
+      </p:ext>
+    </p:extLst>
+  </p:cSld>
+  <p:clrMapOvr>
+    <a:masterClrMapping/>
+  </p:clrMapOvr>
+  <mc:AlternateContent xmlns:mc="http://schemas.openxmlformats.org/markup-compatibility/2006">
+    <mc:Choice xmlns:p14="http://schemas.microsoft.com/office/powerpoint/2010/main" Requires="p14">
+      <p:transition spd="med" p14:dur="700">
+        <p:fade/>
+      </p:transition>
+    </mc:Choice>
+    <mc:Fallback>
+      <p:transition spd="med">
+        <p:fade/>
+      </p:transition>
+    </mc:Fallback>
+  </mc:AlternateContent>
+  <p:timing>
+    <p:tnLst>
+      <p:par>
+        <p:cTn id="1" dur="indefinite" restart="never" nodeType="tmRoot"/>
+      </p:par>
+    </p:tnLst>
+  </p:timing>
+</p:sld>
+</file>
+
+<file path=ppt/slides/slide35.xml><?xml version="1.0" encoding="utf-8"?>
+<p:sld xmlns:a="http://schemas.openxmlformats.org/drawingml/2006/main" xmlns:r="http://schemas.openxmlformats.org/officeDocument/2006/relationships" xmlns:p="http://schemas.openxmlformats.org/presentationml/2006/main">
+  <p:cSld>
+    <p:spTree>
+      <p:nvGrpSpPr>
+        <p:cNvPr id="1" name=""/>
+        <p:cNvGrpSpPr/>
+        <p:nvPr/>
+      </p:nvGrpSpPr>
+      <p:grpSpPr>
+        <a:xfrm>
+          <a:off x="0" y="0"/>
+          <a:ext cx="0" cy="0"/>
+          <a:chOff x="0" y="0"/>
+          <a:chExt cx="0" cy="0"/>
+        </a:xfrm>
+      </p:grpSpPr>
+      <p:sp>
+        <p:nvSpPr>
+          <p:cNvPr id="144" name="CustomShape 1"/>
+          <p:cNvSpPr/>
+          <p:nvPr/>
+        </p:nvSpPr>
+        <p:spPr>
+          <a:xfrm>
+            <a:off x="609480" y="704160"/>
+            <a:ext cx="10972080" cy="1142280"/>
+          </a:xfrm>
+          <a:prstGeom prst="rect">
+            <a:avLst/>
+          </a:prstGeom>
+          <a:noFill/>
+          <a:ln>
+            <a:noFill/>
+          </a:ln>
+        </p:spPr>
+        <p:style>
+          <a:lnRef idx="0">
+            <a:scrgbClr r="0" g="0" b="0"/>
+          </a:lnRef>
+          <a:fillRef idx="0">
+            <a:scrgbClr r="0" g="0" b="0"/>
+          </a:fillRef>
+          <a:effectRef idx="0">
+            <a:scrgbClr r="0" g="0" b="0"/>
+          </a:effectRef>
+          <a:fontRef idx="minor"/>
+        </p:style>
+        <p:txBody>
+          <a:bodyPr lIns="0" tIns="45000" rIns="0" bIns="0" anchor="b">
+            <a:noAutofit/>
+          </a:bodyPr>
+          <a:lstStyle/>
+          <a:p>
+            <a:pPr>
+              <a:lnSpc>
+                <a:spcPct val="100000"/>
+              </a:lnSpc>
+            </a:pPr>
+            <a:r>
+              <a:rPr lang="fr-FR" sz="5000" b="0" strike="noStrike" spc="-1" dirty="0" smtClean="0">
+                <a:solidFill>
+                  <a:srgbClr val="455F51"/>
+                </a:solidFill>
+                <a:latin typeface="Century Gothic"/>
+              </a:rPr>
+              <a:t> </a:t>
+            </a:r>
+            <a:endParaRPr lang="fr-FR" sz="5000" b="0" strike="noStrike" spc="-1" dirty="0">
+              <a:latin typeface="Arial"/>
+            </a:endParaRPr>
+          </a:p>
+        </p:txBody>
+      </p:sp>
+      <p:sp>
+        <p:nvSpPr>
+          <p:cNvPr id="145" name="CustomShape 2"/>
+          <p:cNvSpPr/>
+          <p:nvPr/>
+        </p:nvSpPr>
+        <p:spPr>
+          <a:xfrm>
+            <a:off x="609480" y="1935360"/>
+            <a:ext cx="10972080" cy="4388400"/>
+          </a:xfrm>
+          <a:prstGeom prst="rect">
+            <a:avLst/>
+          </a:prstGeom>
+          <a:noFill/>
+          <a:ln>
+            <a:noFill/>
+          </a:ln>
+        </p:spPr>
+        <p:style>
+          <a:lnRef idx="0">
+            <a:scrgbClr r="0" g="0" b="0"/>
+          </a:lnRef>
+          <a:fillRef idx="0">
+            <a:scrgbClr r="0" g="0" b="0"/>
+          </a:fillRef>
+          <a:effectRef idx="0">
+            <a:scrgbClr r="0" g="0" b="0"/>
+          </a:effectRef>
+          <a:fontRef idx="minor"/>
+        </p:style>
+        <p:txBody>
+          <a:bodyPr lIns="90000" tIns="45000" rIns="90000" bIns="45000">
+            <a:noAutofit/>
+          </a:bodyPr>
+          <a:lstStyle/>
+          <a:p>
+            <a:pPr marL="274320" indent="-273600">
+              <a:lnSpc>
+                <a:spcPct val="100000"/>
+              </a:lnSpc>
+              <a:spcBef>
+                <a:spcPts val="519"/>
+              </a:spcBef>
+              <a:buClr>
+                <a:srgbClr val="626B1A"/>
+              </a:buClr>
+              <a:buSzPct val="95000"/>
+              <a:buFont typeface="Wingdings 2" charset="2"/>
+              <a:buChar char=""/>
+            </a:pPr>
+            <a:endParaRPr lang="fr-FR" sz="2600" b="0" strike="noStrike" spc="-1" dirty="0">
+              <a:latin typeface="Arial"/>
+            </a:endParaRPr>
+          </a:p>
+        </p:txBody>
+      </p:sp>
+    </p:spTree>
+    <p:extLst>
+      <p:ext uri="{BB962C8B-B14F-4D97-AF65-F5344CB8AC3E}">
+        <p14:creationId xmlns:p14="http://schemas.microsoft.com/office/powerpoint/2010/main" val="4293558524"/>
+      </p:ext>
+    </p:extLst>
+  </p:cSld>
+  <p:clrMapOvr>
+    <a:masterClrMapping/>
+  </p:clrMapOvr>
+  <mc:AlternateContent xmlns:mc="http://schemas.openxmlformats.org/markup-compatibility/2006">
+    <mc:Choice xmlns:p14="http://schemas.microsoft.com/office/powerpoint/2010/main" Requires="p14">
+      <p:transition spd="med" p14:dur="700">
+        <p:fade/>
+      </p:transition>
+    </mc:Choice>
+    <mc:Fallback>
+      <p:transition spd="med">
+        <p:fade/>
+      </p:transition>
+    </mc:Fallback>
+  </mc:AlternateContent>
+  <p:timing>
+    <p:tnLst>
+      <p:par>
+        <p:cTn id="1" dur="indefinite" restart="never" nodeType="tmRoot"/>
+      </p:par>
+    </p:tnLst>
+  </p:timing>
+</p:sld>
+</file>
+
+<file path=ppt/slides/slide36.xml><?xml version="1.0" encoding="utf-8"?>
+<p:sld xmlns:a="http://schemas.openxmlformats.org/drawingml/2006/main" xmlns:r="http://schemas.openxmlformats.org/officeDocument/2006/relationships" xmlns:p="http://schemas.openxmlformats.org/presentationml/2006/main">
+  <p:cSld>
+    <p:spTree>
+      <p:nvGrpSpPr>
+        <p:cNvPr id="1" name=""/>
+        <p:cNvGrpSpPr/>
+        <p:nvPr/>
+      </p:nvGrpSpPr>
+      <p:grpSpPr>
+        <a:xfrm>
+          <a:off x="0" y="0"/>
+          <a:ext cx="0" cy="0"/>
+          <a:chOff x="0" y="0"/>
+          <a:chExt cx="0" cy="0"/>
+        </a:xfrm>
+      </p:grpSpPr>
+      <p:sp>
+        <p:nvSpPr>
+          <p:cNvPr id="144" name="CustomShape 1"/>
+          <p:cNvSpPr/>
+          <p:nvPr/>
+        </p:nvSpPr>
+        <p:spPr>
+          <a:xfrm>
+            <a:off x="609480" y="704160"/>
+            <a:ext cx="10972080" cy="1142280"/>
+          </a:xfrm>
+          <a:prstGeom prst="rect">
+            <a:avLst/>
+          </a:prstGeom>
+          <a:noFill/>
+          <a:ln>
+            <a:noFill/>
+          </a:ln>
+        </p:spPr>
+        <p:style>
+          <a:lnRef idx="0">
+            <a:scrgbClr r="0" g="0" b="0"/>
+          </a:lnRef>
+          <a:fillRef idx="0">
+            <a:scrgbClr r="0" g="0" b="0"/>
+          </a:fillRef>
+          <a:effectRef idx="0">
+            <a:scrgbClr r="0" g="0" b="0"/>
+          </a:effectRef>
+          <a:fontRef idx="minor"/>
+        </p:style>
+        <p:txBody>
+          <a:bodyPr lIns="0" tIns="45000" rIns="0" bIns="0" anchor="b">
+            <a:noAutofit/>
+          </a:bodyPr>
+          <a:lstStyle/>
+          <a:p>
+            <a:pPr>
+              <a:lnSpc>
+                <a:spcPct val="100000"/>
+              </a:lnSpc>
+            </a:pPr>
+            <a:r>
+              <a:rPr lang="fr-FR" sz="5000" b="0" strike="noStrike" spc="-1" dirty="0" smtClean="0">
+                <a:solidFill>
+                  <a:srgbClr val="455F51"/>
+                </a:solidFill>
+                <a:latin typeface="Century Gothic"/>
+              </a:rPr>
+              <a:t> </a:t>
+            </a:r>
+            <a:endParaRPr lang="fr-FR" sz="5000" b="0" strike="noStrike" spc="-1" dirty="0">
+              <a:latin typeface="Arial"/>
+            </a:endParaRPr>
+          </a:p>
+        </p:txBody>
+      </p:sp>
+      <p:sp>
+        <p:nvSpPr>
+          <p:cNvPr id="145" name="CustomShape 2"/>
+          <p:cNvSpPr/>
+          <p:nvPr/>
+        </p:nvSpPr>
+        <p:spPr>
+          <a:xfrm>
+            <a:off x="609480" y="1935360"/>
+            <a:ext cx="10972080" cy="4388400"/>
+          </a:xfrm>
+          <a:prstGeom prst="rect">
+            <a:avLst/>
+          </a:prstGeom>
+          <a:noFill/>
+          <a:ln>
+            <a:noFill/>
+          </a:ln>
+        </p:spPr>
+        <p:style>
+          <a:lnRef idx="0">
+            <a:scrgbClr r="0" g="0" b="0"/>
+          </a:lnRef>
+          <a:fillRef idx="0">
+            <a:scrgbClr r="0" g="0" b="0"/>
+          </a:fillRef>
+          <a:effectRef idx="0">
+            <a:scrgbClr r="0" g="0" b="0"/>
+          </a:effectRef>
+          <a:fontRef idx="minor"/>
+        </p:style>
+        <p:txBody>
+          <a:bodyPr lIns="90000" tIns="45000" rIns="90000" bIns="45000">
+            <a:noAutofit/>
+          </a:bodyPr>
+          <a:lstStyle/>
+          <a:p>
+            <a:pPr marL="274320" indent="-273600">
+              <a:lnSpc>
+                <a:spcPct val="100000"/>
+              </a:lnSpc>
+              <a:spcBef>
+                <a:spcPts val="519"/>
+              </a:spcBef>
+              <a:buClr>
+                <a:srgbClr val="626B1A"/>
+              </a:buClr>
+              <a:buSzPct val="95000"/>
+              <a:buFont typeface="Wingdings 2" charset="2"/>
+              <a:buChar char=""/>
+            </a:pPr>
+            <a:endParaRPr lang="fr-FR" sz="2600" b="0" strike="noStrike" spc="-1" dirty="0">
+              <a:latin typeface="Arial"/>
+            </a:endParaRPr>
+          </a:p>
+        </p:txBody>
+      </p:sp>
+    </p:spTree>
+    <p:extLst>
+      <p:ext uri="{BB962C8B-B14F-4D97-AF65-F5344CB8AC3E}">
+        <p14:creationId xmlns:p14="http://schemas.microsoft.com/office/powerpoint/2010/main" val="3342264112"/>
+      </p:ext>
+    </p:extLst>
+  </p:cSld>
+  <p:clrMapOvr>
+    <a:masterClrMapping/>
+  </p:clrMapOvr>
+  <mc:AlternateContent xmlns:mc="http://schemas.openxmlformats.org/markup-compatibility/2006">
+    <mc:Choice xmlns:p14="http://schemas.microsoft.com/office/powerpoint/2010/main" Requires="p14">
+      <p:transition spd="med" p14:dur="700">
+        <p:fade/>
+      </p:transition>
+    </mc:Choice>
+    <mc:Fallback>
+      <p:transition spd="med">
+        <p:fade/>
+      </p:transition>
+    </mc:Fallback>
+  </mc:AlternateContent>
+  <p:timing>
+    <p:tnLst>
+      <p:par>
+        <p:cTn id="1" dur="indefinite" restart="never" nodeType="tmRoot"/>
+      </p:par>
+    </p:tnLst>
+  </p:timing>
+</p:sld>
+</file>
+
+<file path=ppt/slides/slide37.xml><?xml version="1.0" encoding="utf-8"?>
+<p:sld xmlns:a="http://schemas.openxmlformats.org/drawingml/2006/main" xmlns:r="http://schemas.openxmlformats.org/officeDocument/2006/relationships" xmlns:p="http://schemas.openxmlformats.org/presentationml/2006/main">
+  <p:cSld>
+    <p:spTree>
+      <p:nvGrpSpPr>
+        <p:cNvPr id="1" name=""/>
+        <p:cNvGrpSpPr/>
+        <p:nvPr/>
+      </p:nvGrpSpPr>
+      <p:grpSpPr>
+        <a:xfrm>
+          <a:off x="0" y="0"/>
+          <a:ext cx="0" cy="0"/>
+          <a:chOff x="0" y="0"/>
+          <a:chExt cx="0" cy="0"/>
+        </a:xfrm>
+      </p:grpSpPr>
+      <p:sp>
+        <p:nvSpPr>
+          <p:cNvPr id="144" name="CustomShape 1"/>
+          <p:cNvSpPr/>
+          <p:nvPr/>
+        </p:nvSpPr>
+        <p:spPr>
+          <a:xfrm>
+            <a:off x="609480" y="704160"/>
+            <a:ext cx="10972080" cy="1142280"/>
+          </a:xfrm>
+          <a:prstGeom prst="rect">
+            <a:avLst/>
+          </a:prstGeom>
+          <a:noFill/>
+          <a:ln>
+            <a:noFill/>
+          </a:ln>
+        </p:spPr>
+        <p:style>
+          <a:lnRef idx="0">
+            <a:scrgbClr r="0" g="0" b="0"/>
+          </a:lnRef>
+          <a:fillRef idx="0">
+            <a:scrgbClr r="0" g="0" b="0"/>
+          </a:fillRef>
+          <a:effectRef idx="0">
+            <a:scrgbClr r="0" g="0" b="0"/>
+          </a:effectRef>
+          <a:fontRef idx="minor"/>
+        </p:style>
+        <p:txBody>
+          <a:bodyPr lIns="0" tIns="45000" rIns="0" bIns="0" anchor="b">
+            <a:noAutofit/>
+          </a:bodyPr>
+          <a:lstStyle/>
+          <a:p>
+            <a:pPr>
+              <a:lnSpc>
+                <a:spcPct val="100000"/>
+              </a:lnSpc>
+            </a:pPr>
+            <a:r>
+              <a:rPr lang="fr-FR" sz="5000" b="0" strike="noStrike" spc="-1" dirty="0" smtClean="0">
+                <a:solidFill>
+                  <a:srgbClr val="455F51"/>
+                </a:solidFill>
+                <a:latin typeface="Century Gothic"/>
+              </a:rPr>
+              <a:t> </a:t>
+            </a:r>
+            <a:endParaRPr lang="fr-FR" sz="5000" b="0" strike="noStrike" spc="-1" dirty="0">
+              <a:latin typeface="Arial"/>
+            </a:endParaRPr>
+          </a:p>
+        </p:txBody>
+      </p:sp>
+      <p:sp>
+        <p:nvSpPr>
+          <p:cNvPr id="145" name="CustomShape 2"/>
+          <p:cNvSpPr/>
+          <p:nvPr/>
+        </p:nvSpPr>
+        <p:spPr>
+          <a:xfrm>
+            <a:off x="609480" y="1935360"/>
+            <a:ext cx="10972080" cy="4388400"/>
+          </a:xfrm>
+          <a:prstGeom prst="rect">
+            <a:avLst/>
+          </a:prstGeom>
+          <a:noFill/>
+          <a:ln>
+            <a:noFill/>
+          </a:ln>
+        </p:spPr>
+        <p:style>
+          <a:lnRef idx="0">
+            <a:scrgbClr r="0" g="0" b="0"/>
+          </a:lnRef>
+          <a:fillRef idx="0">
+            <a:scrgbClr r="0" g="0" b="0"/>
+          </a:fillRef>
+          <a:effectRef idx="0">
+            <a:scrgbClr r="0" g="0" b="0"/>
+          </a:effectRef>
+          <a:fontRef idx="minor"/>
+        </p:style>
+        <p:txBody>
+          <a:bodyPr lIns="90000" tIns="45000" rIns="90000" bIns="45000">
+            <a:noAutofit/>
+          </a:bodyPr>
+          <a:lstStyle/>
+          <a:p>
+            <a:pPr marL="274320" indent="-273600">
+              <a:lnSpc>
+                <a:spcPct val="100000"/>
+              </a:lnSpc>
+              <a:spcBef>
+                <a:spcPts val="519"/>
+              </a:spcBef>
+              <a:buClr>
+                <a:srgbClr val="626B1A"/>
+              </a:buClr>
+              <a:buSzPct val="95000"/>
+              <a:buFont typeface="Wingdings 2" charset="2"/>
+              <a:buChar char=""/>
+            </a:pPr>
+            <a:endParaRPr lang="fr-FR" sz="2600" b="0" strike="noStrike" spc="-1" dirty="0">
+              <a:latin typeface="Arial"/>
+            </a:endParaRPr>
+          </a:p>
+        </p:txBody>
+      </p:sp>
+    </p:spTree>
+    <p:extLst>
+      <p:ext uri="{BB962C8B-B14F-4D97-AF65-F5344CB8AC3E}">
+        <p14:creationId xmlns:p14="http://schemas.microsoft.com/office/powerpoint/2010/main" val="4074319656"/>
+      </p:ext>
+    </p:extLst>
+  </p:cSld>
+  <p:clrMapOvr>
+    <a:masterClrMapping/>
+  </p:clrMapOvr>
+  <mc:AlternateContent xmlns:mc="http://schemas.openxmlformats.org/markup-compatibility/2006">
+    <mc:Choice xmlns:p14="http://schemas.microsoft.com/office/powerpoint/2010/main" Requires="p14">
+      <p:transition spd="med" p14:dur="700">
+        <p:fade/>
+      </p:transition>
+    </mc:Choice>
+    <mc:Fallback>
+      <p:transition spd="med">
+        <p:fade/>
+      </p:transition>
+    </mc:Fallback>
+  </mc:AlternateContent>
+  <p:timing>
+    <p:tnLst>
+      <p:par>
+        <p:cTn id="1" dur="indefinite" restart="never" nodeType="tmRoot"/>
+      </p:par>
+    </p:tnLst>
+  </p:timing>
+</p:sld>
+</file>
+
+<file path=ppt/slides/slide38.xml><?xml version="1.0" encoding="utf-8"?>
+<p:sld xmlns:a="http://schemas.openxmlformats.org/drawingml/2006/main" xmlns:r="http://schemas.openxmlformats.org/officeDocument/2006/relationships" xmlns:p="http://schemas.openxmlformats.org/presentationml/2006/main">
+  <p:cSld>
+    <p:spTree>
+      <p:nvGrpSpPr>
+        <p:cNvPr id="1" name=""/>
+        <p:cNvGrpSpPr/>
+        <p:nvPr/>
+      </p:nvGrpSpPr>
+      <p:grpSpPr>
+        <a:xfrm>
+          <a:off x="0" y="0"/>
+          <a:ext cx="0" cy="0"/>
+          <a:chOff x="0" y="0"/>
+          <a:chExt cx="0" cy="0"/>
+        </a:xfrm>
+      </p:grpSpPr>
+      <p:sp>
+        <p:nvSpPr>
+          <p:cNvPr id="144" name="CustomShape 1"/>
+          <p:cNvSpPr/>
+          <p:nvPr/>
+        </p:nvSpPr>
+        <p:spPr>
+          <a:xfrm>
+            <a:off x="609480" y="704160"/>
+            <a:ext cx="10972080" cy="1142280"/>
+          </a:xfrm>
+          <a:prstGeom prst="rect">
+            <a:avLst/>
+          </a:prstGeom>
+          <a:noFill/>
+          <a:ln>
+            <a:noFill/>
+          </a:ln>
+        </p:spPr>
+        <p:style>
+          <a:lnRef idx="0">
+            <a:scrgbClr r="0" g="0" b="0"/>
+          </a:lnRef>
+          <a:fillRef idx="0">
+            <a:scrgbClr r="0" g="0" b="0"/>
+          </a:fillRef>
+          <a:effectRef idx="0">
+            <a:scrgbClr r="0" g="0" b="0"/>
+          </a:effectRef>
+          <a:fontRef idx="minor"/>
+        </p:style>
+        <p:txBody>
+          <a:bodyPr lIns="0" tIns="45000" rIns="0" bIns="0" anchor="b">
+            <a:noAutofit/>
+          </a:bodyPr>
+          <a:lstStyle/>
+          <a:p>
+            <a:pPr>
+              <a:lnSpc>
+                <a:spcPct val="100000"/>
+              </a:lnSpc>
+            </a:pPr>
+            <a:r>
+              <a:rPr lang="fr-FR" sz="5000" b="0" strike="noStrike" spc="-1" dirty="0" smtClean="0">
+                <a:solidFill>
+                  <a:srgbClr val="455F51"/>
+                </a:solidFill>
+                <a:latin typeface="Century Gothic"/>
+              </a:rPr>
+              <a:t> </a:t>
+            </a:r>
+            <a:endParaRPr lang="fr-FR" sz="5000" b="0" strike="noStrike" spc="-1" dirty="0">
+              <a:latin typeface="Arial"/>
+            </a:endParaRPr>
+          </a:p>
+        </p:txBody>
+      </p:sp>
+      <p:sp>
+        <p:nvSpPr>
+          <p:cNvPr id="145" name="CustomShape 2"/>
+          <p:cNvSpPr/>
+          <p:nvPr/>
+        </p:nvSpPr>
+        <p:spPr>
+          <a:xfrm>
+            <a:off x="609480" y="1935360"/>
+            <a:ext cx="10972080" cy="4388400"/>
+          </a:xfrm>
+          <a:prstGeom prst="rect">
+            <a:avLst/>
+          </a:prstGeom>
+          <a:noFill/>
+          <a:ln>
+            <a:noFill/>
+          </a:ln>
+        </p:spPr>
+        <p:style>
+          <a:lnRef idx="0">
+            <a:scrgbClr r="0" g="0" b="0"/>
+          </a:lnRef>
+          <a:fillRef idx="0">
+            <a:scrgbClr r="0" g="0" b="0"/>
+          </a:fillRef>
+          <a:effectRef idx="0">
+            <a:scrgbClr r="0" g="0" b="0"/>
+          </a:effectRef>
+          <a:fontRef idx="minor"/>
+        </p:style>
+        <p:txBody>
+          <a:bodyPr lIns="90000" tIns="45000" rIns="90000" bIns="45000">
+            <a:noAutofit/>
+          </a:bodyPr>
+          <a:lstStyle/>
+          <a:p>
+            <a:pPr marL="274320" indent="-273600">
+              <a:lnSpc>
+                <a:spcPct val="100000"/>
+              </a:lnSpc>
+              <a:spcBef>
+                <a:spcPts val="519"/>
+              </a:spcBef>
+              <a:buClr>
+                <a:srgbClr val="626B1A"/>
+              </a:buClr>
+              <a:buSzPct val="95000"/>
+              <a:buFont typeface="Wingdings 2" charset="2"/>
+              <a:buChar char=""/>
+            </a:pPr>
+            <a:endParaRPr lang="fr-FR" sz="2600" b="0" strike="noStrike" spc="-1" dirty="0">
+              <a:latin typeface="Arial"/>
+            </a:endParaRPr>
+          </a:p>
+        </p:txBody>
+      </p:sp>
+    </p:spTree>
+    <p:extLst>
+      <p:ext uri="{BB962C8B-B14F-4D97-AF65-F5344CB8AC3E}">
+        <p14:creationId xmlns:p14="http://schemas.microsoft.com/office/powerpoint/2010/main" val="2959813911"/>
+      </p:ext>
+    </p:extLst>
+  </p:cSld>
+  <p:clrMapOvr>
+    <a:masterClrMapping/>
+  </p:clrMapOvr>
+  <mc:AlternateContent xmlns:mc="http://schemas.openxmlformats.org/markup-compatibility/2006">
+    <mc:Choice xmlns:p14="http://schemas.microsoft.com/office/powerpoint/2010/main" Requires="p14">
+      <p:transition spd="med" p14:dur="700">
+        <p:fade/>
+      </p:transition>
+    </mc:Choice>
+    <mc:Fallback>
+      <p:transition spd="med">
+        <p:fade/>
+      </p:transition>
+    </mc:Fallback>
+  </mc:AlternateContent>
+  <p:timing>
+    <p:tnLst>
+      <p:par>
+        <p:cTn id="1" dur="indefinite" restart="never" nodeType="tmRoot"/>
+      </p:par>
+    </p:tnLst>
+  </p:timing>
+</p:sld>
+</file>
+
+<file path=ppt/slides/slide39.xml><?xml version="1.0" encoding="utf-8"?>
+<p:sld xmlns:a="http://schemas.openxmlformats.org/drawingml/2006/main" xmlns:r="http://schemas.openxmlformats.org/officeDocument/2006/relationships" xmlns:p="http://schemas.openxmlformats.org/presentationml/2006/main">
+  <p:cSld>
+    <p:spTree>
+      <p:nvGrpSpPr>
+        <p:cNvPr id="1" name=""/>
+        <p:cNvGrpSpPr/>
+        <p:nvPr/>
+      </p:nvGrpSpPr>
+      <p:grpSpPr>
+        <a:xfrm>
+          <a:off x="0" y="0"/>
+          <a:ext cx="0" cy="0"/>
+          <a:chOff x="0" y="0"/>
+          <a:chExt cx="0" cy="0"/>
+        </a:xfrm>
+      </p:grpSpPr>
+      <p:sp>
+        <p:nvSpPr>
+          <p:cNvPr id="144" name="CustomShape 1"/>
+          <p:cNvSpPr/>
+          <p:nvPr/>
+        </p:nvSpPr>
+        <p:spPr>
+          <a:xfrm>
+            <a:off x="609480" y="704160"/>
+            <a:ext cx="10972080" cy="1142280"/>
+          </a:xfrm>
+          <a:prstGeom prst="rect">
+            <a:avLst/>
+          </a:prstGeom>
+          <a:noFill/>
+          <a:ln>
+            <a:noFill/>
+          </a:ln>
+        </p:spPr>
+        <p:style>
+          <a:lnRef idx="0">
+            <a:scrgbClr r="0" g="0" b="0"/>
+          </a:lnRef>
+          <a:fillRef idx="0">
+            <a:scrgbClr r="0" g="0" b="0"/>
+          </a:fillRef>
+          <a:effectRef idx="0">
+            <a:scrgbClr r="0" g="0" b="0"/>
+          </a:effectRef>
+          <a:fontRef idx="minor"/>
+        </p:style>
+        <p:txBody>
+          <a:bodyPr lIns="0" tIns="45000" rIns="0" bIns="0" anchor="b">
+            <a:noAutofit/>
+          </a:bodyPr>
+          <a:lstStyle/>
+          <a:p>
+            <a:pPr>
+              <a:lnSpc>
+                <a:spcPct val="100000"/>
+              </a:lnSpc>
+            </a:pPr>
+            <a:r>
+              <a:rPr lang="fr-FR" sz="5000" b="0" strike="noStrike" spc="-1" dirty="0" smtClean="0">
+                <a:solidFill>
+                  <a:srgbClr val="455F51"/>
+                </a:solidFill>
+                <a:latin typeface="Century Gothic"/>
+              </a:rPr>
+              <a:t> </a:t>
+            </a:r>
+            <a:endParaRPr lang="fr-FR" sz="5000" b="0" strike="noStrike" spc="-1" dirty="0">
+              <a:latin typeface="Arial"/>
+            </a:endParaRPr>
+          </a:p>
+        </p:txBody>
+      </p:sp>
+      <p:sp>
+        <p:nvSpPr>
+          <p:cNvPr id="145" name="CustomShape 2"/>
+          <p:cNvSpPr/>
+          <p:nvPr/>
+        </p:nvSpPr>
+        <p:spPr>
+          <a:xfrm>
+            <a:off x="609480" y="1935360"/>
+            <a:ext cx="10972080" cy="4388400"/>
+          </a:xfrm>
+          <a:prstGeom prst="rect">
+            <a:avLst/>
+          </a:prstGeom>
+          <a:noFill/>
+          <a:ln>
+            <a:noFill/>
+          </a:ln>
+        </p:spPr>
+        <p:style>
+          <a:lnRef idx="0">
+            <a:scrgbClr r="0" g="0" b="0"/>
+          </a:lnRef>
+          <a:fillRef idx="0">
+            <a:scrgbClr r="0" g="0" b="0"/>
+          </a:fillRef>
+          <a:effectRef idx="0">
+            <a:scrgbClr r="0" g="0" b="0"/>
+          </a:effectRef>
+          <a:fontRef idx="minor"/>
+        </p:style>
+        <p:txBody>
+          <a:bodyPr lIns="90000" tIns="45000" rIns="90000" bIns="45000">
+            <a:noAutofit/>
+          </a:bodyPr>
+          <a:lstStyle/>
+          <a:p>
+            <a:pPr marL="274320" indent="-273600">
+              <a:lnSpc>
+                <a:spcPct val="100000"/>
+              </a:lnSpc>
+              <a:spcBef>
+                <a:spcPts val="519"/>
+              </a:spcBef>
+              <a:buClr>
+                <a:srgbClr val="626B1A"/>
+              </a:buClr>
+              <a:buSzPct val="95000"/>
+              <a:buFont typeface="Wingdings 2" charset="2"/>
+              <a:buChar char=""/>
+            </a:pPr>
+            <a:endParaRPr lang="fr-FR" sz="2600" b="0" strike="noStrike" spc="-1" dirty="0">
+              <a:latin typeface="Arial"/>
+            </a:endParaRPr>
+          </a:p>
+        </p:txBody>
+      </p:sp>
+    </p:spTree>
+    <p:extLst>
+      <p:ext uri="{BB962C8B-B14F-4D97-AF65-F5344CB8AC3E}">
+        <p14:creationId xmlns:p14="http://schemas.microsoft.com/office/powerpoint/2010/main" val="2798129906"/>
+      </p:ext>
+    </p:extLst>
+  </p:cSld>
+  <p:clrMapOvr>
+    <a:masterClrMapping/>
+  </p:clrMapOvr>
+  <mc:AlternateContent xmlns:mc="http://schemas.openxmlformats.org/markup-compatibility/2006">
+    <mc:Choice xmlns:p14="http://schemas.microsoft.com/office/powerpoint/2010/main" Requires="p14">
+      <p:transition spd="med" p14:dur="700">
+        <p:fade/>
+      </p:transition>
+    </mc:Choice>
+    <mc:Fallback>
+      <p:transition spd="med">
+        <p:fade/>
+      </p:transition>
+    </mc:Fallback>
+  </mc:AlternateContent>
+  <p:timing>
+    <p:tnLst>
+      <p:par>
+        <p:cTn id="1" dur="indefinite" restart="never" nodeType="tmRoot"/>
+      </p:par>
+    </p:tnLst>
+  </p:timing>
+</p:sld>
+</file>
+
 <file path=ppt/slides/slide4.xml><?xml version="1.0" encoding="utf-8"?>
 <p:sld xmlns:a="http://schemas.openxmlformats.org/drawingml/2006/main" xmlns:r="http://schemas.openxmlformats.org/officeDocument/2006/relationships" xmlns:p="http://schemas.openxmlformats.org/presentationml/2006/main">
   <p:cSld>
@@ -16265,6 +18531,169 @@
       </p:transition>
     </mc:Choice>
     <mc:Fallback xmlns:p15="http://schemas.microsoft.com/office/powerpoint/2012/main" xmlns="">
+      <p:transition spd="med">
+        <p:fade/>
+      </p:transition>
+    </mc:Fallback>
+  </mc:AlternateContent>
+  <p:timing>
+    <p:tnLst>
+      <p:par>
+        <p:cTn id="1" dur="indefinite" restart="never" nodeType="tmRoot"/>
+      </p:par>
+    </p:tnLst>
+  </p:timing>
+</p:sld>
+</file>
+
+<file path=ppt/slides/slide40.xml><?xml version="1.0" encoding="utf-8"?>
+<p:sld xmlns:a="http://schemas.openxmlformats.org/drawingml/2006/main" xmlns:r="http://schemas.openxmlformats.org/officeDocument/2006/relationships" xmlns:p="http://schemas.openxmlformats.org/presentationml/2006/main">
+  <p:cSld>
+    <p:spTree>
+      <p:nvGrpSpPr>
+        <p:cNvPr id="1" name=""/>
+        <p:cNvGrpSpPr/>
+        <p:nvPr/>
+      </p:nvGrpSpPr>
+      <p:grpSpPr>
+        <a:xfrm>
+          <a:off x="0" y="0"/>
+          <a:ext cx="0" cy="0"/>
+          <a:chOff x="0" y="0"/>
+          <a:chExt cx="0" cy="0"/>
+        </a:xfrm>
+      </p:grpSpPr>
+      <p:sp>
+        <p:nvSpPr>
+          <p:cNvPr id="144" name="CustomShape 1"/>
+          <p:cNvSpPr/>
+          <p:nvPr/>
+        </p:nvSpPr>
+        <p:spPr>
+          <a:xfrm>
+            <a:off x="609480" y="704160"/>
+            <a:ext cx="10972080" cy="1142280"/>
+          </a:xfrm>
+          <a:prstGeom prst="rect">
+            <a:avLst/>
+          </a:prstGeom>
+          <a:noFill/>
+          <a:ln>
+            <a:noFill/>
+          </a:ln>
+        </p:spPr>
+        <p:style>
+          <a:lnRef idx="0">
+            <a:scrgbClr r="0" g="0" b="0"/>
+          </a:lnRef>
+          <a:fillRef idx="0">
+            <a:scrgbClr r="0" g="0" b="0"/>
+          </a:fillRef>
+          <a:effectRef idx="0">
+            <a:scrgbClr r="0" g="0" b="0"/>
+          </a:effectRef>
+          <a:fontRef idx="minor"/>
+        </p:style>
+        <p:txBody>
+          <a:bodyPr lIns="0" tIns="45000" rIns="0" bIns="0" anchor="b">
+            <a:noAutofit/>
+          </a:bodyPr>
+          <a:lstStyle/>
+          <a:p>
+            <a:pPr>
+              <a:lnSpc>
+                <a:spcPct val="100000"/>
+              </a:lnSpc>
+            </a:pPr>
+            <a:r>
+              <a:rPr lang="fr-FR" sz="5000" b="0" strike="noStrike" spc="-1" dirty="0" smtClean="0">
+                <a:solidFill>
+                  <a:srgbClr val="455F51"/>
+                </a:solidFill>
+                <a:latin typeface="Century Gothic"/>
+              </a:rPr>
+              <a:t> </a:t>
+            </a:r>
+            <a:endParaRPr lang="fr-FR" sz="5000" b="0" strike="noStrike" spc="-1" dirty="0">
+              <a:latin typeface="Arial"/>
+            </a:endParaRPr>
+          </a:p>
+        </p:txBody>
+      </p:sp>
+      <p:sp>
+        <p:nvSpPr>
+          <p:cNvPr id="145" name="CustomShape 2"/>
+          <p:cNvSpPr/>
+          <p:nvPr/>
+        </p:nvSpPr>
+        <p:spPr>
+          <a:xfrm>
+            <a:off x="609480" y="1935360"/>
+            <a:ext cx="10972080" cy="4388400"/>
+          </a:xfrm>
+          <a:prstGeom prst="rect">
+            <a:avLst/>
+          </a:prstGeom>
+          <a:noFill/>
+          <a:ln>
+            <a:noFill/>
+          </a:ln>
+        </p:spPr>
+        <p:style>
+          <a:lnRef idx="0">
+            <a:scrgbClr r="0" g="0" b="0"/>
+          </a:lnRef>
+          <a:fillRef idx="0">
+            <a:scrgbClr r="0" g="0" b="0"/>
+          </a:fillRef>
+          <a:effectRef idx="0">
+            <a:scrgbClr r="0" g="0" b="0"/>
+          </a:effectRef>
+          <a:fontRef idx="minor"/>
+        </p:style>
+        <p:txBody>
+          <a:bodyPr lIns="90000" tIns="45000" rIns="90000" bIns="45000">
+            <a:noAutofit/>
+          </a:bodyPr>
+          <a:lstStyle/>
+          <a:p>
+            <a:pPr marL="274320" indent="-273600">
+              <a:lnSpc>
+                <a:spcPct val="100000"/>
+              </a:lnSpc>
+              <a:spcBef>
+                <a:spcPts val="519"/>
+              </a:spcBef>
+              <a:buClr>
+                <a:srgbClr val="626B1A"/>
+              </a:buClr>
+              <a:buSzPct val="95000"/>
+              <a:buFont typeface="Wingdings 2" charset="2"/>
+              <a:buChar char=""/>
+            </a:pPr>
+            <a:endParaRPr lang="fr-FR" sz="2600" b="0" strike="noStrike" spc="-1" dirty="0">
+              <a:latin typeface="Arial"/>
+            </a:endParaRPr>
+          </a:p>
+        </p:txBody>
+      </p:sp>
+    </p:spTree>
+    <p:extLst>
+      <p:ext uri="{BB962C8B-B14F-4D97-AF65-F5344CB8AC3E}">
+        <p14:creationId xmlns:p14="http://schemas.microsoft.com/office/powerpoint/2010/main" val="3437694029"/>
+      </p:ext>
+    </p:extLst>
+  </p:cSld>
+  <p:clrMapOvr>
+    <a:masterClrMapping/>
+  </p:clrMapOvr>
+  <mc:AlternateContent xmlns:mc="http://schemas.openxmlformats.org/markup-compatibility/2006">
+    <mc:Choice xmlns:p14="http://schemas.microsoft.com/office/powerpoint/2010/main" Requires="p14">
+      <p:transition spd="med" p14:dur="700">
+        <p:fade/>
+      </p:transition>
+    </mc:Choice>
+    <mc:Fallback>
       <p:transition spd="med">
         <p:fade/>
       </p:transition>

</xml_diff>

<commit_message>
le bon commit de midi avec les retour sur le power point
</commit_message>
<xml_diff>
--- a/Présentation du titre pro/Dossier Professionnel v1.pptx
+++ b/Présentation du titre pro/Dossier Professionnel v1.pptx
@@ -6,7 +6,7 @@
     <p:sldMasterId id="2147483661" r:id="rId2"/>
   </p:sldMasterIdLst>
   <p:notesMasterIdLst>
-    <p:notesMasterId r:id="rId38"/>
+    <p:notesMasterId r:id="rId37"/>
   </p:notesMasterIdLst>
   <p:sldIdLst>
     <p:sldId id="256" r:id="rId3"/>
@@ -15,9 +15,9 @@
     <p:sldId id="259" r:id="rId6"/>
     <p:sldId id="284" r:id="rId7"/>
     <p:sldId id="285" r:id="rId8"/>
-    <p:sldId id="286" r:id="rId9"/>
-    <p:sldId id="300" r:id="rId10"/>
-    <p:sldId id="301" r:id="rId11"/>
+    <p:sldId id="300" r:id="rId9"/>
+    <p:sldId id="301" r:id="rId10"/>
+    <p:sldId id="268" r:id="rId11"/>
     <p:sldId id="287" r:id="rId12"/>
     <p:sldId id="299" r:id="rId13"/>
     <p:sldId id="290" r:id="rId14"/>
@@ -38,12 +38,11 @@
     <p:sldId id="265" r:id="rId29"/>
     <p:sldId id="267" r:id="rId30"/>
     <p:sldId id="298" r:id="rId31"/>
-    <p:sldId id="268" r:id="rId32"/>
-    <p:sldId id="270" r:id="rId33"/>
-    <p:sldId id="272" r:id="rId34"/>
-    <p:sldId id="275" r:id="rId35"/>
-    <p:sldId id="281" r:id="rId36"/>
-    <p:sldId id="302" r:id="rId37"/>
+    <p:sldId id="270" r:id="rId32"/>
+    <p:sldId id="272" r:id="rId33"/>
+    <p:sldId id="275" r:id="rId34"/>
+    <p:sldId id="281" r:id="rId35"/>
+    <p:sldId id="302" r:id="rId36"/>
   </p:sldIdLst>
   <p:sldSz cx="12192000" cy="6858000"/>
   <p:notesSz cx="6858000" cy="9144000"/>
@@ -763,6 +762,113 @@
               <a:rPr lang="fr-FR" sz="2000" baseline="0" dirty="0" smtClean="0"/>
               <a:t>Une partie pour les développeur est aussi présent afin qu’ils puisse consulté la liste des offres disponible est choisir l’annonce qu’ils leurs conviennent le plus </a:t>
             </a:r>
+          </a:p>
+          <a:p>
+            <a:pPr marL="0" marR="0" indent="0" algn="l" defTabSz="914400" rtl="0" eaLnBrk="1" fontAlgn="auto" latinLnBrk="0" hangingPunct="1">
+              <a:lnSpc>
+                <a:spcPct val="100000"/>
+              </a:lnSpc>
+              <a:spcBef>
+                <a:spcPts val="0"/>
+              </a:spcBef>
+              <a:spcAft>
+                <a:spcPts val="0"/>
+              </a:spcAft>
+              <a:buClrTx/>
+              <a:buSzTx/>
+              <a:buFontTx/>
+              <a:buNone/>
+              <a:tabLst/>
+              <a:defRPr/>
+            </a:pPr>
+            <a:endParaRPr lang="fr-FR" sz="2000" baseline="0" dirty="0" smtClean="0"/>
+          </a:p>
+          <a:p>
+            <a:pPr marL="0" marR="0" indent="0" algn="l" defTabSz="914400" rtl="0" eaLnBrk="1" fontAlgn="auto" latinLnBrk="0" hangingPunct="1">
+              <a:lnSpc>
+                <a:spcPct val="100000"/>
+              </a:lnSpc>
+              <a:spcBef>
+                <a:spcPts val="0"/>
+              </a:spcBef>
+              <a:spcAft>
+                <a:spcPts val="0"/>
+              </a:spcAft>
+              <a:buClrTx/>
+              <a:buSzTx/>
+              <a:buFontTx/>
+              <a:buNone/>
+              <a:tabLst/>
+              <a:defRPr/>
+            </a:pPr>
+            <a:r>
+              <a:rPr lang="fr-FR" sz="2000" baseline="0" dirty="0" smtClean="0"/>
+              <a:t>Ajouter la partie </a:t>
+            </a:r>
+            <a:r>
+              <a:rPr lang="fr-FR" sz="2000" baseline="0" dirty="0" smtClean="0"/>
+              <a:t>création </a:t>
+            </a:r>
+            <a:r>
+              <a:rPr lang="fr-FR" sz="2000" baseline="0" dirty="0" smtClean="0"/>
+              <a:t>du profil dev a l’</a:t>
+            </a:r>
+            <a:r>
+              <a:rPr lang="fr-FR" sz="2000" baseline="0" dirty="0" err="1" smtClean="0"/>
+              <a:t>arboressence</a:t>
+            </a:r>
+            <a:r>
+              <a:rPr lang="fr-FR" sz="2000" baseline="0" dirty="0" smtClean="0"/>
+              <a:t> </a:t>
+            </a:r>
+            <a:endParaRPr lang="fr-FR" sz="2000" baseline="0" dirty="0" smtClean="0"/>
+          </a:p>
+          <a:p>
+            <a:pPr marL="0" marR="0" indent="0" algn="l" defTabSz="914400" rtl="0" eaLnBrk="1" fontAlgn="auto" latinLnBrk="0" hangingPunct="1">
+              <a:lnSpc>
+                <a:spcPct val="100000"/>
+              </a:lnSpc>
+              <a:spcBef>
+                <a:spcPts val="0"/>
+              </a:spcBef>
+              <a:spcAft>
+                <a:spcPts val="0"/>
+              </a:spcAft>
+              <a:buClrTx/>
+              <a:buSzTx/>
+              <a:buFontTx/>
+              <a:buNone/>
+              <a:tabLst/>
+              <a:defRPr/>
+            </a:pPr>
+            <a:r>
+              <a:rPr lang="fr-FR" sz="2000" baseline="0" dirty="0" smtClean="0"/>
+              <a:t>Changer </a:t>
+            </a:r>
+            <a:r>
+              <a:rPr lang="fr-FR" sz="2000" baseline="0" dirty="0" err="1" smtClean="0"/>
+              <a:t>detailler</a:t>
+            </a:r>
+            <a:r>
+              <a:rPr lang="fr-FR" sz="2000" baseline="0" dirty="0" smtClean="0"/>
+              <a:t> l’</a:t>
+            </a:r>
+            <a:r>
+              <a:rPr lang="fr-FR" sz="2000" baseline="0" dirty="0" err="1" smtClean="0"/>
+              <a:t>anonce</a:t>
+            </a:r>
+            <a:r>
+              <a:rPr lang="fr-FR" sz="2000" baseline="0" dirty="0" smtClean="0"/>
+              <a:t> en création de l’</a:t>
+            </a:r>
+            <a:r>
+              <a:rPr lang="fr-FR" sz="2000" baseline="0" dirty="0" err="1" smtClean="0"/>
+              <a:t>anonce</a:t>
+            </a:r>
+            <a:r>
+              <a:rPr lang="fr-FR" sz="2000" baseline="0" dirty="0" smtClean="0"/>
+              <a:t> </a:t>
+            </a:r>
             <a:endParaRPr lang="fr-FR" sz="2000" dirty="0"/>
           </a:p>
         </p:txBody>
@@ -906,11 +1012,7 @@
             </a:pPr>
             <a:r>
               <a:rPr lang="fr-FR" dirty="0" smtClean="0"/>
-              <a:t> </a:t>
-            </a:r>
-            <a:r>
-              <a:rPr lang="fr-FR" dirty="0" smtClean="0"/>
-              <a:t>concernent l</a:t>
+              <a:t> concernent l</a:t>
             </a:r>
             <a:r>
               <a:rPr lang="fr-FR" sz="1200" kern="1200" dirty="0" smtClean="0">
@@ -3462,6 +3564,21 @@
               <a:rPr lang="fr-FR" dirty="0" err="1" smtClean="0"/>
               <a:t>css</a:t>
             </a:r>
+            <a:endParaRPr lang="fr-FR" dirty="0" smtClean="0"/>
+          </a:p>
+          <a:p>
+            <a:r>
+              <a:rPr lang="fr-FR" dirty="0" smtClean="0"/>
+              <a:t>Z-index pour le </a:t>
+            </a:r>
+            <a:r>
+              <a:rPr lang="fr-FR" dirty="0" err="1" smtClean="0"/>
+              <a:t>css</a:t>
+            </a:r>
+            <a:r>
+              <a:rPr lang="fr-FR" dirty="0" smtClean="0"/>
+              <a:t> </a:t>
+            </a:r>
             <a:endParaRPr lang="fr-FR" dirty="0"/>
           </a:p>
         </p:txBody>
@@ -3946,6 +4063,136 @@
               </a:rPr>
               <a:t>)</a:t>
             </a:r>
+          </a:p>
+          <a:p>
+            <a:endParaRPr lang="fr-FR" sz="2000" b="0" strike="noStrike" spc="-1" baseline="0" dirty="0" smtClean="0">
+              <a:latin typeface="Arial"/>
+            </a:endParaRPr>
+          </a:p>
+          <a:p>
+            <a:r>
+              <a:rPr lang="fr-FR" sz="2000" b="0" strike="noStrike" spc="-1" baseline="0" dirty="0" err="1" smtClean="0">
+                <a:latin typeface="Arial"/>
+              </a:rPr>
+              <a:t>Extend</a:t>
+            </a:r>
+            <a:r>
+              <a:rPr lang="fr-FR" sz="2000" b="0" strike="noStrike" spc="-1" baseline="0" dirty="0" smtClean="0">
+                <a:latin typeface="Arial"/>
+              </a:rPr>
+              <a:t> option non obligatoire</a:t>
+            </a:r>
+          </a:p>
+          <a:p>
+            <a:r>
+              <a:rPr lang="fr-FR" sz="2000" b="0" strike="noStrike" spc="-1" baseline="0" dirty="0" err="1" smtClean="0">
+                <a:latin typeface="Arial"/>
+              </a:rPr>
+              <a:t>Includ</a:t>
+            </a:r>
+            <a:r>
+              <a:rPr lang="fr-FR" sz="2000" b="0" strike="noStrike" spc="-1" baseline="0" dirty="0" smtClean="0">
+                <a:latin typeface="Arial"/>
+              </a:rPr>
+              <a:t> option </a:t>
+            </a:r>
+            <a:r>
+              <a:rPr lang="fr-FR" sz="2000" b="0" strike="noStrike" spc="-1" baseline="0" dirty="0" smtClean="0">
+                <a:latin typeface="Arial"/>
+              </a:rPr>
+              <a:t>obligatoire</a:t>
+            </a:r>
+          </a:p>
+          <a:p>
+            <a:r>
+              <a:rPr lang="fr-FR" sz="2000" b="0" strike="noStrike" spc="-1" baseline="0" dirty="0" err="1" smtClean="0">
+                <a:latin typeface="Arial"/>
+              </a:rPr>
+              <a:t>Admin</a:t>
+            </a:r>
+            <a:endParaRPr lang="fr-FR" sz="2000" b="0" strike="noStrike" spc="-1" baseline="0" dirty="0" smtClean="0">
+              <a:latin typeface="Arial"/>
+            </a:endParaRPr>
+          </a:p>
+          <a:p>
+            <a:r>
+              <a:rPr lang="fr-FR" sz="2000" b="0" strike="noStrike" spc="-1" baseline="0" dirty="0" smtClean="0">
+                <a:latin typeface="Arial"/>
+              </a:rPr>
+              <a:t>Dev</a:t>
+            </a:r>
+          </a:p>
+          <a:p>
+            <a:r>
+              <a:rPr lang="fr-FR" sz="2000" b="0" strike="noStrike" spc="-1" baseline="0" dirty="0" smtClean="0">
+                <a:latin typeface="Arial"/>
+              </a:rPr>
+              <a:t>Particulier</a:t>
+            </a:r>
+          </a:p>
+          <a:p>
+            <a:r>
+              <a:rPr lang="fr-FR" sz="2000" b="0" strike="noStrike" spc="-1" baseline="0" dirty="0" smtClean="0">
+                <a:latin typeface="Arial"/>
+              </a:rPr>
+              <a:t>Visiteur</a:t>
+            </a:r>
+          </a:p>
+          <a:p>
+            <a:r>
+              <a:rPr lang="fr-FR" sz="2000" b="0" strike="noStrike" spc="-1" baseline="0" dirty="0" err="1" smtClean="0">
+                <a:latin typeface="Arial"/>
+              </a:rPr>
+              <a:t>Disossicer</a:t>
+            </a:r>
+            <a:r>
+              <a:rPr lang="fr-FR" sz="2000" b="0" strike="noStrike" spc="-1" baseline="0" dirty="0" smtClean="0">
+                <a:latin typeface="Arial"/>
+              </a:rPr>
+              <a:t> utilisateur en dev/particulier</a:t>
+            </a:r>
+          </a:p>
+          <a:p>
+            <a:r>
+              <a:rPr lang="fr-FR" sz="2000" b="0" strike="noStrike" spc="-1" baseline="0" dirty="0" err="1" smtClean="0">
+                <a:latin typeface="Arial"/>
+              </a:rPr>
+              <a:t>Vusionner</a:t>
+            </a:r>
+            <a:r>
+              <a:rPr lang="fr-FR" sz="2000" b="0" strike="noStrike" spc="-1" baseline="0" dirty="0" smtClean="0">
+                <a:latin typeface="Arial"/>
+              </a:rPr>
+              <a:t> </a:t>
+            </a:r>
+            <a:r>
+              <a:rPr lang="fr-FR" sz="2000" b="0" strike="noStrike" spc="-1" baseline="0" dirty="0" err="1" smtClean="0">
+                <a:latin typeface="Arial"/>
+              </a:rPr>
+              <a:t>connecton</a:t>
+            </a:r>
+            <a:r>
+              <a:rPr lang="fr-FR" sz="2000" b="0" strike="noStrike" spc="-1" baseline="0" dirty="0" smtClean="0">
+                <a:latin typeface="Arial"/>
+              </a:rPr>
+              <a:t> utilisateur</a:t>
+            </a:r>
+          </a:p>
+          <a:p>
+            <a:r>
+              <a:rPr lang="fr-FR" sz="2000" b="0" strike="noStrike" spc="-1" baseline="0" dirty="0" err="1" smtClean="0">
+                <a:latin typeface="Arial"/>
+              </a:rPr>
+              <a:t>Vusionner</a:t>
+            </a:r>
+            <a:r>
+              <a:rPr lang="fr-FR" sz="2000" b="0" strike="noStrike" spc="-1" baseline="0" dirty="0" smtClean="0">
+                <a:latin typeface="Arial"/>
+              </a:rPr>
+              <a:t> lecteur a visiteur </a:t>
+            </a:r>
+          </a:p>
+          <a:p>
             <a:endParaRPr lang="fr-FR" sz="2000" b="0" strike="noStrike" spc="-1" dirty="0">
               <a:latin typeface="Arial"/>
             </a:endParaRPr>
@@ -4274,7 +4521,52 @@
           <a:p>
             <a:r>
               <a:rPr lang="fr-FR" baseline="0" dirty="0" smtClean="0"/>
-              <a:t>(a droite le diagramme d’activité &amp; a gauche le diagramme séquentiel) </a:t>
+              <a:t>(a gauche le diagramme d’activité &amp; a droite le diagramme séquentiel) </a:t>
+            </a:r>
+          </a:p>
+          <a:p>
+            <a:r>
+              <a:rPr lang="fr-FR" baseline="0" dirty="0" smtClean="0"/>
+              <a:t>Modifier les scenario du diagramme séquentiel </a:t>
+            </a:r>
+            <a:r>
+              <a:rPr lang="fr-FR" baseline="0" dirty="0" smtClean="0"/>
+              <a:t>(scénario d’erreur lorsque le </a:t>
+            </a:r>
+            <a:r>
+              <a:rPr lang="fr-FR" baseline="0" dirty="0" err="1" smtClean="0"/>
+              <a:t>bdd</a:t>
+            </a:r>
+            <a:r>
+              <a:rPr lang="fr-FR" baseline="0" dirty="0" smtClean="0"/>
+              <a:t> est </a:t>
+            </a:r>
+            <a:r>
+              <a:rPr lang="fr-FR" baseline="0" dirty="0" err="1" smtClean="0"/>
+              <a:t>hs</a:t>
+            </a:r>
+            <a:r>
+              <a:rPr lang="fr-FR" baseline="0" dirty="0" smtClean="0"/>
+              <a:t>)+ remplacer 8&amp;11 teste en retour de la </a:t>
+            </a:r>
+            <a:r>
+              <a:rPr lang="fr-FR" baseline="0" dirty="0" err="1" smtClean="0"/>
+              <a:t>requete</a:t>
+            </a:r>
+            <a:endParaRPr lang="fr-FR" baseline="0" dirty="0" smtClean="0"/>
+          </a:p>
+          <a:p>
+            <a:r>
+              <a:rPr lang="fr-FR" baseline="0" dirty="0" smtClean="0"/>
+              <a:t>Diagramme d’</a:t>
+            </a:r>
+            <a:r>
+              <a:rPr lang="fr-FR" baseline="0" dirty="0" err="1" smtClean="0"/>
+              <a:t>activiter</a:t>
+            </a:r>
+            <a:r>
+              <a:rPr lang="fr-FR" baseline="0" dirty="0" smtClean="0"/>
+              <a:t> faire les boucle </a:t>
             </a:r>
             <a:endParaRPr lang="fr-FR" dirty="0"/>
           </a:p>
@@ -4593,6 +4885,66 @@
           <a:bodyPr/>
           <a:lstStyle/>
           <a:p>
+            <a:r>
+              <a:rPr lang="fr-FR" dirty="0" smtClean="0"/>
+              <a:t>Je me permet de joindre</a:t>
+            </a:r>
+            <a:r>
+              <a:rPr lang="fr-FR" baseline="0" dirty="0" smtClean="0"/>
+              <a:t> a cette présentation un bout de code HTML d’un formulaire actuellement présent dans mon projet ace développeur </a:t>
+            </a:r>
+          </a:p>
+          <a:p>
+            <a:endParaRPr lang="fr-FR" baseline="0" dirty="0" smtClean="0"/>
+          </a:p>
+          <a:p>
+            <a:r>
+              <a:rPr lang="fr-FR" dirty="0" smtClean="0"/>
+              <a:t>Le voici :</a:t>
+            </a:r>
+          </a:p>
+          <a:p>
+            <a:r>
+              <a:rPr lang="fr-FR" dirty="0" smtClean="0"/>
+              <a:t>L’input de type</a:t>
+            </a:r>
+            <a:r>
+              <a:rPr lang="fr-FR" baseline="0" dirty="0" smtClean="0"/>
+              <a:t> radio permet de créer des </a:t>
+            </a:r>
+            <a:r>
+              <a:rPr lang="fr-FR" dirty="0" smtClean="0"/>
+              <a:t>boutons représentés par des cercles remplis lorsqu'ils sont sélectionnés &amp; vide quand cela n’est pas le cas</a:t>
+            </a:r>
+            <a:r>
+              <a:rPr lang="fr-FR" baseline="0" dirty="0" smtClean="0"/>
+              <a:t> </a:t>
+            </a:r>
+          </a:p>
+          <a:p>
+            <a:r>
+              <a:rPr lang="fr-FR" baseline="0" dirty="0" smtClean="0"/>
+              <a:t>Il est généralement </a:t>
+            </a:r>
+            <a:r>
+              <a:rPr lang="fr-FR" dirty="0" smtClean="0"/>
+              <a:t>utilisés pour construire des groupes d'options parmi lesquelles on ne peut choisir qu'une valeur. </a:t>
+            </a:r>
+          </a:p>
+          <a:p>
+            <a:r>
+              <a:rPr lang="fr-FR" dirty="0" smtClean="0"/>
+              <a:t>En l'occurrence pour choisir</a:t>
+            </a:r>
+            <a:r>
+              <a:rPr lang="fr-FR" baseline="0" dirty="0" smtClean="0"/>
+              <a:t> madame ou monsieur .</a:t>
+            </a:r>
+          </a:p>
+          <a:p>
+            <a:endParaRPr lang="fr-FR" baseline="0" dirty="0" smtClean="0"/>
+          </a:p>
+          <a:p>
             <a:pPr marL="0" marR="0" indent="0" algn="l" defTabSz="914400" rtl="0" eaLnBrk="1" fontAlgn="auto" latinLnBrk="0" hangingPunct="1">
               <a:lnSpc>
                 <a:spcPct val="100000"/>
@@ -4611,13 +4963,12 @@
               <a:defRPr/>
             </a:pPr>
             <a:r>
-              <a:rPr lang="fr-FR" sz="1200" b="0" strike="noStrike" spc="-1" dirty="0" smtClean="0">
-                <a:solidFill>
-                  <a:srgbClr val="000000"/>
-                </a:solidFill>
-                <a:latin typeface="Palatino Linotype"/>
-              </a:rPr>
-              <a:t>Dans un premier temps, j’aimerai une application rapide, pratique, et portable, utilisable sur tous support numérique .</a:t>
+              <a:rPr lang="fr-FR" dirty="0" smtClean="0"/>
+              <a:t>Concernent l’input de type texte des restriction on été définit afin</a:t>
+            </a:r>
+            <a:r>
+              <a:rPr lang="fr-FR" baseline="0" dirty="0" smtClean="0"/>
+              <a:t> que l’utilisateur ne puis pas faire n’importe quoi .</a:t>
             </a:r>
           </a:p>
           <a:p>
@@ -4639,26 +4990,44 @@
               <a:defRPr/>
             </a:pPr>
             <a:r>
-              <a:rPr lang="fr-FR" sz="1200" b="0" strike="noStrike" spc="-1" dirty="0" smtClean="0">
-                <a:solidFill>
-                  <a:srgbClr val="000000"/>
-                </a:solidFill>
-                <a:latin typeface="Palatino Linotype"/>
-              </a:rPr>
-              <a:t>Dans un second temps m’adapter au besoin auquel je n’ai pas encore pensais</a:t>
-            </a:r>
-            <a:r>
-              <a:rPr lang="fr-FR" sz="1200" b="0" strike="noStrike" spc="-1" baseline="0" dirty="0" smtClean="0">
-                <a:solidFill>
-                  <a:srgbClr val="000000"/>
-                </a:solidFill>
-                <a:latin typeface="Palatino Linotype"/>
-              </a:rPr>
-              <a:t> .</a:t>
-            </a:r>
-            <a:endParaRPr lang="fr-FR" sz="1200" b="0" strike="noStrike" spc="-1" dirty="0" smtClean="0">
-              <a:latin typeface="+mn-lt"/>
-            </a:endParaRPr>
+              <a:rPr lang="fr-FR" baseline="0" dirty="0" smtClean="0"/>
+              <a:t>Dans le cas du prénom le nombre de lettre maximum que l’utilisateur est autorisé a mettre est de 20  définit par « </a:t>
+            </a:r>
+            <a:r>
+              <a:rPr lang="fr-FR" baseline="0" dirty="0" err="1" smtClean="0"/>
+              <a:t>maxlength</a:t>
+            </a:r>
+            <a:r>
+              <a:rPr lang="fr-FR" baseline="0" dirty="0" smtClean="0"/>
+              <a:t> » de </a:t>
+            </a:r>
+            <a:r>
+              <a:rPr lang="fr-FR" baseline="0" dirty="0" err="1" smtClean="0"/>
+              <a:t>meme</a:t>
+            </a:r>
+            <a:r>
+              <a:rPr lang="fr-FR" baseline="0" dirty="0" smtClean="0"/>
+              <a:t> que le nombre minimum </a:t>
+            </a:r>
+            <a:r>
+              <a:rPr lang="fr-FR" baseline="0" dirty="0" err="1" smtClean="0"/>
+              <a:t>definit</a:t>
+            </a:r>
+            <a:r>
+              <a:rPr lang="fr-FR" baseline="0" dirty="0" smtClean="0"/>
+              <a:t> par « </a:t>
+            </a:r>
+            <a:r>
+              <a:rPr lang="fr-FR" baseline="0" dirty="0" err="1" smtClean="0"/>
+              <a:t>minlength</a:t>
+            </a:r>
+            <a:r>
+              <a:rPr lang="fr-FR" baseline="0" dirty="0" smtClean="0"/>
+              <a:t> » et de 2 .</a:t>
+            </a:r>
+          </a:p>
+          <a:p>
+            <a:endParaRPr lang="fr-FR" dirty="0" smtClean="0"/>
           </a:p>
           <a:p>
             <a:endParaRPr lang="fr-FR" dirty="0"/>
@@ -4696,7 +5065,7 @@
     </p:spTree>
     <p:extLst>
       <p:ext uri="{BB962C8B-B14F-4D97-AF65-F5344CB8AC3E}">
-        <p14:creationId xmlns:p14="http://schemas.microsoft.com/office/powerpoint/2010/main" val="2348629073"/>
+        <p14:creationId xmlns:p14="http://schemas.microsoft.com/office/powerpoint/2010/main" val="703020805"/>
       </p:ext>
     </p:extLst>
   </p:cSld>
@@ -4757,147 +5126,44 @@
           <a:p>
             <a:r>
               <a:rPr lang="fr-FR" dirty="0" smtClean="0"/>
-              <a:t>Je me permet de joindre</a:t>
+              <a:t>L’input de type « file » permettent à un utilisateur de sélectionner un ou plusieurs fichiers depuis leur appareil et de les uploader les fichier autorisé sont définit grâce a « </a:t>
+            </a:r>
+            <a:r>
+              <a:rPr lang="fr-FR" dirty="0" err="1" smtClean="0"/>
+              <a:t>accept</a:t>
+            </a:r>
+            <a:r>
+              <a:rPr lang="fr-FR" dirty="0" smtClean="0"/>
+              <a:t>= le nom des extension » en l’occurrence</a:t>
             </a:r>
             <a:r>
               <a:rPr lang="fr-FR" baseline="0" dirty="0" smtClean="0"/>
-              <a:t> a cette présentation un bout de code HTML d’un formulaire actuellement présent dans mon projet ace développeur </a:t>
-            </a:r>
-          </a:p>
-          <a:p>
-            <a:endParaRPr lang="fr-FR" baseline="0" dirty="0" smtClean="0"/>
-          </a:p>
-          <a:p>
-            <a:r>
-              <a:rPr lang="fr-FR" dirty="0" smtClean="0"/>
-              <a:t>Le voici :</a:t>
-            </a:r>
-          </a:p>
-          <a:p>
-            <a:r>
-              <a:rPr lang="fr-FR" dirty="0" smtClean="0"/>
-              <a:t>L’input de type</a:t>
+              <a:t> .</a:t>
+            </a:r>
+            <a:r>
+              <a:rPr lang="fr-FR" baseline="0" dirty="0" err="1" smtClean="0"/>
+              <a:t>jpg</a:t>
             </a:r>
             <a:r>
               <a:rPr lang="fr-FR" baseline="0" dirty="0" smtClean="0"/>
-              <a:t> radio permet de créer des </a:t>
-            </a:r>
-            <a:r>
-              <a:rPr lang="fr-FR" dirty="0" smtClean="0"/>
-              <a:t>boutons représentés par des cercles remplis lorsqu'ils sont sélectionnés &amp; vide quand cela n’est pas le cas</a:t>
+              <a:t> .</a:t>
+            </a:r>
+            <a:r>
+              <a:rPr lang="fr-FR" baseline="0" dirty="0" err="1" smtClean="0"/>
+              <a:t>png</a:t>
             </a:r>
             <a:r>
               <a:rPr lang="fr-FR" baseline="0" dirty="0" smtClean="0"/>
-              <a:t> </a:t>
-            </a:r>
-          </a:p>
-          <a:p>
+              <a:t> pour les images et .</a:t>
+            </a:r>
+            <a:r>
+              <a:rPr lang="fr-FR" baseline="0" dirty="0" err="1" smtClean="0"/>
+              <a:t>gif</a:t>
+            </a:r>
             <a:r>
               <a:rPr lang="fr-FR" baseline="0" dirty="0" smtClean="0"/>
-              <a:t>Il est généralement </a:t>
-            </a:r>
-            <a:r>
-              <a:rPr lang="fr-FR" dirty="0" smtClean="0"/>
-              <a:t>utilisés pour construire des groupes d'options parmi lesquelles on ne peut choisir qu'une valeur. </a:t>
-            </a:r>
-          </a:p>
-          <a:p>
-            <a:r>
-              <a:rPr lang="fr-FR" dirty="0" smtClean="0"/>
-              <a:t>En l'occurrence pour choisir</a:t>
-            </a:r>
-            <a:r>
-              <a:rPr lang="fr-FR" baseline="0" dirty="0" smtClean="0"/>
-              <a:t> madame ou monsieur .</a:t>
-            </a:r>
-          </a:p>
-          <a:p>
-            <a:endParaRPr lang="fr-FR" baseline="0" dirty="0" smtClean="0"/>
-          </a:p>
-          <a:p>
-            <a:pPr marL="0" marR="0" indent="0" algn="l" defTabSz="914400" rtl="0" eaLnBrk="1" fontAlgn="auto" latinLnBrk="0" hangingPunct="1">
-              <a:lnSpc>
-                <a:spcPct val="100000"/>
-              </a:lnSpc>
-              <a:spcBef>
-                <a:spcPts val="0"/>
-              </a:spcBef>
-              <a:spcAft>
-                <a:spcPts val="0"/>
-              </a:spcAft>
-              <a:buClrTx/>
-              <a:buSzTx/>
-              <a:buFontTx/>
-              <a:buNone/>
-              <a:tabLst/>
-              <a:defRPr/>
-            </a:pPr>
-            <a:r>
-              <a:rPr lang="fr-FR" dirty="0" smtClean="0"/>
-              <a:t>Concernent l’input de type texte des restriction on été définit afin</a:t>
-            </a:r>
-            <a:r>
-              <a:rPr lang="fr-FR" baseline="0" dirty="0" smtClean="0"/>
-              <a:t> que l’utilisateur ne puis pas faire n’importe quoi .</a:t>
-            </a:r>
-          </a:p>
-          <a:p>
-            <a:pPr marL="0" marR="0" indent="0" algn="l" defTabSz="914400" rtl="0" eaLnBrk="1" fontAlgn="auto" latinLnBrk="0" hangingPunct="1">
-              <a:lnSpc>
-                <a:spcPct val="100000"/>
-              </a:lnSpc>
-              <a:spcBef>
-                <a:spcPts val="0"/>
-              </a:spcBef>
-              <a:spcAft>
-                <a:spcPts val="0"/>
-              </a:spcAft>
-              <a:buClrTx/>
-              <a:buSzTx/>
-              <a:buFontTx/>
-              <a:buNone/>
-              <a:tabLst/>
-              <a:defRPr/>
-            </a:pPr>
-            <a:r>
-              <a:rPr lang="fr-FR" baseline="0" dirty="0" smtClean="0"/>
-              <a:t>Dans le cas du prénom le nombre de lettre maximum que l’utilisateur est autorisé a mettre est de 20  définit par « </a:t>
-            </a:r>
-            <a:r>
-              <a:rPr lang="fr-FR" baseline="0" dirty="0" err="1" smtClean="0"/>
-              <a:t>maxlength</a:t>
-            </a:r>
-            <a:r>
-              <a:rPr lang="fr-FR" baseline="0" dirty="0" smtClean="0"/>
-              <a:t> » de </a:t>
-            </a:r>
-            <a:r>
-              <a:rPr lang="fr-FR" baseline="0" dirty="0" err="1" smtClean="0"/>
-              <a:t>meme</a:t>
-            </a:r>
-            <a:r>
-              <a:rPr lang="fr-FR" baseline="0" dirty="0" smtClean="0"/>
-              <a:t> que le nombre minimum </a:t>
-            </a:r>
-            <a:r>
-              <a:rPr lang="fr-FR" baseline="0" dirty="0" err="1" smtClean="0"/>
-              <a:t>definit</a:t>
-            </a:r>
-            <a:r>
-              <a:rPr lang="fr-FR" baseline="0" dirty="0" smtClean="0"/>
-              <a:t> par « </a:t>
-            </a:r>
-            <a:r>
-              <a:rPr lang="fr-FR" baseline="0" dirty="0" err="1" smtClean="0"/>
-              <a:t>minlength</a:t>
-            </a:r>
-            <a:r>
-              <a:rPr lang="fr-FR" baseline="0" dirty="0" smtClean="0"/>
-              <a:t> » et de 2 .</a:t>
-            </a:r>
-          </a:p>
-          <a:p>
-            <a:endParaRPr lang="fr-FR" dirty="0" smtClean="0"/>
+              <a:t> pour les image animés </a:t>
+            </a:r>
           </a:p>
           <a:p>
             <a:endParaRPr lang="fr-FR" dirty="0"/>
@@ -4935,7 +5201,7 @@
     </p:spTree>
     <p:extLst>
       <p:ext uri="{BB962C8B-B14F-4D97-AF65-F5344CB8AC3E}">
-        <p14:creationId xmlns:p14="http://schemas.microsoft.com/office/powerpoint/2010/main" val="703020805"/>
+        <p14:creationId xmlns:p14="http://schemas.microsoft.com/office/powerpoint/2010/main" val="3429599279"/>
       </p:ext>
     </p:extLst>
   </p:cSld>
@@ -4996,46 +5262,26 @@
           <a:p>
             <a:r>
               <a:rPr lang="fr-FR" dirty="0" smtClean="0"/>
-              <a:t>L’input de type « file » permettent à un utilisateur de sélectionner un ou plusieurs fichiers depuis leur appareil et de les uploader les fichier autorisé sont définit grâce a « </a:t>
+              <a:t>Voici le résultat avec du </a:t>
             </a:r>
             <a:r>
               <a:rPr lang="fr-FR" dirty="0" err="1" smtClean="0"/>
-              <a:t>accept</a:t>
+              <a:t>Css</a:t>
             </a:r>
             <a:r>
               <a:rPr lang="fr-FR" dirty="0" smtClean="0"/>
-              <a:t>= le nom des extension » en l’occurrence</a:t>
+              <a:t> pour mettre un peu de la couleur aux tous .</a:t>
+            </a:r>
+          </a:p>
+          <a:p>
+            <a:r>
+              <a:rPr lang="fr-FR" dirty="0" smtClean="0"/>
+              <a:t>Mettre le</a:t>
             </a:r>
             <a:r>
               <a:rPr lang="fr-FR" baseline="0" dirty="0" smtClean="0"/>
-              <a:t> .</a:t>
-            </a:r>
-            <a:r>
-              <a:rPr lang="fr-FR" baseline="0" dirty="0" err="1" smtClean="0"/>
-              <a:t>jpg</a:t>
-            </a:r>
-            <a:r>
-              <a:rPr lang="fr-FR" baseline="0" dirty="0" smtClean="0"/>
-              <a:t> .</a:t>
-            </a:r>
-            <a:r>
-              <a:rPr lang="fr-FR" baseline="0" dirty="0" err="1" smtClean="0"/>
-              <a:t>png</a:t>
-            </a:r>
-            <a:r>
-              <a:rPr lang="fr-FR" baseline="0" dirty="0" smtClean="0"/>
-              <a:t> pour les images et .</a:t>
-            </a:r>
-            <a:r>
-              <a:rPr lang="fr-FR" baseline="0" dirty="0" err="1" smtClean="0"/>
-              <a:t>gif</a:t>
-            </a:r>
-            <a:r>
-              <a:rPr lang="fr-FR" baseline="0" dirty="0" smtClean="0"/>
-              <a:t> pour les image animés </a:t>
-            </a:r>
-          </a:p>
-          <a:p>
+              <a:t> rendu avec le code </a:t>
+            </a:r>
             <a:endParaRPr lang="fr-FR" dirty="0"/>
           </a:p>
         </p:txBody>
@@ -5071,7 +5317,7 @@
     </p:spTree>
     <p:extLst>
       <p:ext uri="{BB962C8B-B14F-4D97-AF65-F5344CB8AC3E}">
-        <p14:creationId xmlns:p14="http://schemas.microsoft.com/office/powerpoint/2010/main" val="3429599279"/>
+        <p14:creationId xmlns:p14="http://schemas.microsoft.com/office/powerpoint/2010/main" val="2625164785"/>
       </p:ext>
     </p:extLst>
   </p:cSld>
@@ -5132,15 +5378,23 @@
           <a:p>
             <a:r>
               <a:rPr lang="fr-FR" dirty="0" smtClean="0"/>
-              <a:t>Voici le résultat avec du </a:t>
-            </a:r>
-            <a:r>
-              <a:rPr lang="fr-FR" dirty="0" err="1" smtClean="0"/>
-              <a:t>Css</a:t>
-            </a:r>
+              <a:t>En conclusion cette aventure qu’est ce projet est un challenge des plus passionnant qui m’apportera une monté en compétence ainsi qu’en expérience .</a:t>
+            </a:r>
+          </a:p>
+          <a:p>
             <a:r>
               <a:rPr lang="fr-FR" dirty="0" smtClean="0"/>
-              <a:t> pour mettre un peu de la couleur aux tous .</a:t>
+              <a:t>Tous retour de votre part est la bienvenue </a:t>
+            </a:r>
+          </a:p>
+          <a:p>
+            <a:r>
+              <a:rPr lang="fr-FR" dirty="0" smtClean="0"/>
+              <a:t>Merci de votre attention</a:t>
+            </a:r>
+            <a:r>
+              <a:rPr lang="fr-FR" baseline="0" dirty="0" smtClean="0"/>
+              <a:t> </a:t>
             </a:r>
             <a:endParaRPr lang="fr-FR" dirty="0"/>
           </a:p>
@@ -5177,7 +5431,7 @@
     </p:spTree>
     <p:extLst>
       <p:ext uri="{BB962C8B-B14F-4D97-AF65-F5344CB8AC3E}">
-        <p14:creationId xmlns:p14="http://schemas.microsoft.com/office/powerpoint/2010/main" val="2625164785"/>
+        <p14:creationId xmlns:p14="http://schemas.microsoft.com/office/powerpoint/2010/main" val="3183842373"/>
       </p:ext>
     </p:extLst>
   </p:cSld>
@@ -5237,29 +5491,12 @@
           <a:lstStyle/>
           <a:p>
             <a:r>
-              <a:rPr lang="fr-FR" dirty="0" smtClean="0"/>
-              <a:t>En conclusion cette aventure qu’est ce projet est un challenge des plus passionnant qui m’apportera une monté en compétence ainsi qu’en expérience .</a:t>
-            </a:r>
-          </a:p>
-          <a:p>
-            <a:r>
-              <a:rPr lang="fr-FR" dirty="0" smtClean="0"/>
-              <a:t>Tous retour de votre part est la bienvenue </a:t>
-            </a:r>
-          </a:p>
-          <a:p>
-            <a:r>
-              <a:rPr lang="fr-FR" dirty="0" smtClean="0"/>
-              <a:t>Merci de </a:t>
-            </a:r>
-            <a:r>
               <a:rPr lang="fr-FR" smtClean="0"/>
-              <a:t>votre attention</a:t>
-            </a:r>
-            <a:r>
-              <a:rPr lang="fr-FR" baseline="0" smtClean="0"/>
               <a:t> </a:t>
             </a:r>
+            <a:endParaRPr lang="fr-FR" dirty="0" smtClean="0"/>
+          </a:p>
+          <a:p>
             <a:endParaRPr lang="fr-FR" dirty="0"/>
           </a:p>
         </p:txBody>
@@ -5285,107 +5522,6 @@
                 <a:latin typeface="Times New Roman"/>
               </a:rPr>
               <a:t>34</a:t>
-            </a:fld>
-            <a:endParaRPr lang="fr-FR" sz="1400" b="0" strike="noStrike" spc="-1">
-              <a:latin typeface="Times New Roman"/>
-            </a:endParaRPr>
-          </a:p>
-        </p:txBody>
-      </p:sp>
-    </p:spTree>
-    <p:extLst>
-      <p:ext uri="{BB962C8B-B14F-4D97-AF65-F5344CB8AC3E}">
-        <p14:creationId xmlns:p14="http://schemas.microsoft.com/office/powerpoint/2010/main" val="3183842373"/>
-      </p:ext>
-    </p:extLst>
-  </p:cSld>
-  <p:clrMapOvr>
-    <a:masterClrMapping/>
-  </p:clrMapOvr>
-</p:notes>
-</file>
-
-<file path=ppt/notesSlides/notesSlide35.xml><?xml version="1.0" encoding="utf-8"?>
-<p:notes xmlns:a="http://schemas.openxmlformats.org/drawingml/2006/main" xmlns:r="http://schemas.openxmlformats.org/officeDocument/2006/relationships" xmlns:p="http://schemas.openxmlformats.org/presentationml/2006/main">
-  <p:cSld>
-    <p:spTree>
-      <p:nvGrpSpPr>
-        <p:cNvPr id="1" name=""/>
-        <p:cNvGrpSpPr/>
-        <p:nvPr/>
-      </p:nvGrpSpPr>
-      <p:grpSpPr>
-        <a:xfrm>
-          <a:off x="0" y="0"/>
-          <a:ext cx="0" cy="0"/>
-          <a:chOff x="0" y="0"/>
-          <a:chExt cx="0" cy="0"/>
-        </a:xfrm>
-      </p:grpSpPr>
-      <p:sp>
-        <p:nvSpPr>
-          <p:cNvPr id="2" name="Espace réservé de l'image des diapositives 1"/>
-          <p:cNvSpPr>
-            <a:spLocks noGrp="1" noRot="1" noChangeAspect="1"/>
-          </p:cNvSpPr>
-          <p:nvPr>
-            <p:ph type="sldImg"/>
-          </p:nvPr>
-        </p:nvSpPr>
-        <p:spPr>
-          <a:xfrm>
-            <a:off x="217488" y="812800"/>
-            <a:ext cx="7124700" cy="4008438"/>
-          </a:xfrm>
-        </p:spPr>
-      </p:sp>
-      <p:sp>
-        <p:nvSpPr>
-          <p:cNvPr id="3" name="Espace réservé des commentaires 2"/>
-          <p:cNvSpPr>
-            <a:spLocks noGrp="1"/>
-          </p:cNvSpPr>
-          <p:nvPr>
-            <p:ph type="body" idx="1"/>
-          </p:nvPr>
-        </p:nvSpPr>
-        <p:spPr/>
-        <p:txBody>
-          <a:bodyPr/>
-          <a:lstStyle/>
-          <a:p>
-            <a:r>
-              <a:rPr lang="fr-FR" smtClean="0"/>
-              <a:t> </a:t>
-            </a:r>
-            <a:endParaRPr lang="fr-FR" dirty="0" smtClean="0"/>
-          </a:p>
-          <a:p>
-            <a:endParaRPr lang="fr-FR" dirty="0"/>
-          </a:p>
-        </p:txBody>
-      </p:sp>
-      <p:sp>
-        <p:nvSpPr>
-          <p:cNvPr id="4" name="Espace réservé du numéro de diapositive 3"/>
-          <p:cNvSpPr>
-            <a:spLocks noGrp="1"/>
-          </p:cNvSpPr>
-          <p:nvPr>
-            <p:ph type="sldNum" idx="10"/>
-          </p:nvPr>
-        </p:nvSpPr>
-        <p:spPr/>
-        <p:txBody>
-          <a:bodyPr/>
-          <a:lstStyle/>
-          <a:p>
-            <a:pPr algn="r"/>
-            <a:fld id="{4C8961B9-9BF0-44A4-A706-205F40A8B952}" type="slidenum">
-              <a:rPr lang="fr-FR" sz="1400" b="0" strike="noStrike" spc="-1" smtClean="0">
-                <a:latin typeface="Times New Roman"/>
-              </a:rPr>
-              <a:t>35</a:t>
             </a:fld>
             <a:endParaRPr lang="fr-FR" sz="1400" b="0" strike="noStrike" spc="-1">
               <a:latin typeface="Times New Roman"/>
@@ -5880,7 +6016,7 @@
       </p:grpSpPr>
       <p:sp>
         <p:nvSpPr>
-          <p:cNvPr id="155" name="PlaceHolder 1"/>
+          <p:cNvPr id="2" name="Espace réservé de l'image des diapositives 1"/>
           <p:cNvSpPr>
             <a:spLocks noGrp="1" noRot="1" noChangeAspect="1"/>
           </p:cNvSpPr>
@@ -5890,148 +6026,104 @@
         </p:nvSpPr>
         <p:spPr>
           <a:xfrm>
-            <a:off x="685800" y="1143000"/>
-            <a:ext cx="5486400" cy="3086100"/>
-          </a:xfrm>
-          <a:prstGeom prst="rect">
-            <a:avLst/>
-          </a:prstGeom>
-        </p:spPr>
-      </p:sp>
-      <p:sp>
-        <p:nvSpPr>
-          <p:cNvPr id="156" name="PlaceHolder 2"/>
+            <a:off x="217488" y="812800"/>
+            <a:ext cx="7124700" cy="4008438"/>
+          </a:xfrm>
+        </p:spPr>
+      </p:sp>
+      <p:sp>
+        <p:nvSpPr>
+          <p:cNvPr id="3" name="Espace réservé des commentaires 2"/>
           <p:cNvSpPr>
             <a:spLocks noGrp="1"/>
           </p:cNvSpPr>
           <p:nvPr>
-            <p:ph type="body"/>
+            <p:ph type="body" idx="1"/>
           </p:nvPr>
         </p:nvSpPr>
-        <p:spPr>
-          <a:xfrm>
-            <a:off x="685800" y="4400640"/>
-            <a:ext cx="5485680" cy="3599640"/>
-          </a:xfrm>
-          <a:prstGeom prst="rect">
-            <a:avLst/>
-          </a:prstGeom>
-        </p:spPr>
-        <p:txBody>
-          <a:bodyPr lIns="0" tIns="0" rIns="0" bIns="0">
-            <a:noAutofit/>
-          </a:bodyPr>
-          <a:lstStyle/>
-          <a:p>
-            <a:pPr marL="0" marR="0" indent="0" algn="l" defTabSz="914400" rtl="0" eaLnBrk="1" fontAlgn="auto" latinLnBrk="0" hangingPunct="1">
-              <a:lnSpc>
-                <a:spcPct val="100000"/>
-              </a:lnSpc>
-              <a:spcBef>
-                <a:spcPts val="0"/>
-              </a:spcBef>
-              <a:spcAft>
-                <a:spcPts val="0"/>
-              </a:spcAft>
-              <a:buClrTx/>
-              <a:buSzTx/>
-              <a:buFontTx/>
-              <a:buNone/>
-              <a:tabLst/>
-              <a:defRPr/>
-            </a:pPr>
-            <a:r>
-              <a:rPr lang="fr-FR" sz="2000" dirty="0" smtClean="0"/>
-              <a:t>Voir même un</a:t>
-            </a:r>
-            <a:r>
-              <a:rPr lang="fr-FR" sz="2000" baseline="0" dirty="0" smtClean="0"/>
-              <a:t> particulier qui désire juste un site vitrine afin de promouvoir un événement …</a:t>
-            </a:r>
-          </a:p>
-          <a:p>
-            <a:pPr marL="0" marR="0" indent="0" algn="l" defTabSz="914400" rtl="0" eaLnBrk="1" fontAlgn="auto" latinLnBrk="0" hangingPunct="1">
-              <a:lnSpc>
-                <a:spcPct val="100000"/>
-              </a:lnSpc>
-              <a:spcBef>
-                <a:spcPts val="0"/>
-              </a:spcBef>
-              <a:spcAft>
-                <a:spcPts val="0"/>
-              </a:spcAft>
-              <a:buClrTx/>
-              <a:buSzTx/>
-              <a:buFontTx/>
-              <a:buNone/>
-              <a:tabLst/>
-              <a:defRPr/>
-            </a:pPr>
-            <a:r>
-              <a:rPr lang="fr-FR" sz="2000" baseline="0" dirty="0" smtClean="0"/>
-              <a:t>bref toute personne souhaitent avoir un site web et ne sachant pas comment procéder .</a:t>
-            </a:r>
-            <a:endParaRPr lang="fr-FR" sz="2000" dirty="0" smtClean="0"/>
-          </a:p>
-          <a:p>
-            <a:endParaRPr lang="fr-FR" sz="2000" dirty="0"/>
-          </a:p>
-        </p:txBody>
-      </p:sp>
-      <p:sp>
-        <p:nvSpPr>
-          <p:cNvPr id="157" name="CustomShape 3"/>
-          <p:cNvSpPr/>
-          <p:nvPr/>
-        </p:nvSpPr>
-        <p:spPr>
-          <a:xfrm>
-            <a:off x="3884760" y="8685360"/>
-            <a:ext cx="2971080" cy="457920"/>
-          </a:xfrm>
-          <a:prstGeom prst="rect">
-            <a:avLst/>
-          </a:prstGeom>
-          <a:noFill/>
-          <a:ln>
-            <a:noFill/>
-          </a:ln>
-        </p:spPr>
-        <p:style>
-          <a:lnRef idx="0">
-            <a:scrgbClr r="0" g="0" b="0"/>
-          </a:lnRef>
-          <a:fillRef idx="0">
-            <a:scrgbClr r="0" g="0" b="0"/>
-          </a:fillRef>
-          <a:effectRef idx="0">
-            <a:scrgbClr r="0" g="0" b="0"/>
-          </a:effectRef>
-          <a:fontRef idx="minor"/>
-        </p:style>
-        <p:txBody>
-          <a:bodyPr lIns="90000" tIns="45000" rIns="90000" bIns="45000" anchor="b">
-            <a:noAutofit/>
-          </a:bodyPr>
-          <a:lstStyle/>
-          <a:p>
-            <a:pPr algn="r">
-              <a:lnSpc>
-                <a:spcPct val="100000"/>
-              </a:lnSpc>
-            </a:pPr>
-            <a:fld id="{7DFA6E54-7A15-4764-ACBB-0422FDEFF671}" type="slidenum">
-              <a:rPr lang="fr-FR" sz="1200" b="0" strike="noStrike" spc="-1">
-                <a:solidFill>
-                  <a:srgbClr val="000000"/>
-                </a:solidFill>
-                <a:latin typeface="+mn-lt"/>
-                <a:ea typeface="+mn-ea"/>
+        <p:spPr/>
+        <p:txBody>
+          <a:bodyPr/>
+          <a:lstStyle/>
+          <a:p>
+            <a:r>
+              <a:rPr lang="fr-FR" dirty="0" smtClean="0"/>
+              <a:t> </a:t>
+            </a:r>
+          </a:p>
+          <a:p>
+            <a:r>
+              <a:rPr lang="fr-FR" dirty="0" smtClean="0"/>
+              <a:t>Refaire au propre la </a:t>
+            </a:r>
+            <a:r>
+              <a:rPr lang="fr-FR" dirty="0" err="1" smtClean="0"/>
+              <a:t>bete</a:t>
+            </a:r>
+            <a:r>
+              <a:rPr lang="fr-FR" dirty="0" smtClean="0"/>
+              <a:t> a corne</a:t>
+            </a:r>
+          </a:p>
+          <a:p>
+            <a:r>
+              <a:rPr lang="fr-FR" dirty="0" smtClean="0"/>
+              <a:t>Quesque</a:t>
+            </a:r>
+            <a:r>
+              <a:rPr lang="fr-FR" baseline="0" dirty="0" smtClean="0"/>
+              <a:t> la </a:t>
+            </a:r>
+            <a:r>
+              <a:rPr lang="fr-FR" baseline="0" dirty="0" err="1" smtClean="0"/>
+              <a:t>bete</a:t>
+            </a:r>
+            <a:r>
+              <a:rPr lang="fr-FR" baseline="0" dirty="0" smtClean="0"/>
+              <a:t> a corne (définition)</a:t>
+            </a:r>
+          </a:p>
+          <a:p>
+            <a:r>
+              <a:rPr lang="fr-FR" baseline="0" dirty="0" err="1" smtClean="0"/>
+              <a:t>Siter</a:t>
+            </a:r>
+            <a:r>
+              <a:rPr lang="fr-FR" baseline="0" dirty="0" smtClean="0"/>
+              <a:t> </a:t>
+            </a:r>
+            <a:r>
+              <a:rPr lang="fr-FR" baseline="0" smtClean="0"/>
+              <a:t>les source </a:t>
+            </a:r>
+            <a:endParaRPr lang="fr-FR" dirty="0"/>
+          </a:p>
+        </p:txBody>
+      </p:sp>
+      <p:sp>
+        <p:nvSpPr>
+          <p:cNvPr id="4" name="Espace réservé du numéro de diapositive 3"/>
+          <p:cNvSpPr>
+            <a:spLocks noGrp="1"/>
+          </p:cNvSpPr>
+          <p:nvPr>
+            <p:ph type="sldNum" idx="10"/>
+          </p:nvPr>
+        </p:nvSpPr>
+        <p:spPr/>
+        <p:txBody>
+          <a:bodyPr/>
+          <a:lstStyle/>
+          <a:p>
+            <a:pPr algn="r"/>
+            <a:fld id="{4C8961B9-9BF0-44A4-A706-205F40A8B952}" type="slidenum">
+              <a:rPr lang="fr-FR" sz="1400" b="0" strike="noStrike" spc="-1" smtClean="0">
+                <a:latin typeface="Times New Roman"/>
               </a:rPr>
               <a:t>7</a:t>
             </a:fld>
-            <a:endParaRPr lang="fr-FR" sz="1200" b="0" strike="noStrike" spc="-1">
-              <a:latin typeface="Arial"/>
+            <a:endParaRPr lang="fr-FR" sz="1400" b="0" strike="noStrike" spc="-1">
+              <a:latin typeface="Times New Roman"/>
             </a:endParaRPr>
           </a:p>
         </p:txBody>
@@ -6039,7 +6131,7 @@
     </p:spTree>
     <p:extLst>
       <p:ext uri="{BB962C8B-B14F-4D97-AF65-F5344CB8AC3E}">
-        <p14:creationId xmlns:p14="http://schemas.microsoft.com/office/powerpoint/2010/main" val="3617550498"/>
+        <p14:creationId xmlns:p14="http://schemas.microsoft.com/office/powerpoint/2010/main" val="1775862669"/>
       </p:ext>
     </p:extLst>
   </p:cSld>
@@ -6098,10 +6190,41 @@
           <a:bodyPr/>
           <a:lstStyle/>
           <a:p>
-            <a:r>
-              <a:rPr lang="fr-FR" smtClean="0"/>
+            <a:pPr marL="0" marR="0" indent="0" algn="l" defTabSz="914400" rtl="0" eaLnBrk="1" fontAlgn="auto" latinLnBrk="0" hangingPunct="1">
+              <a:lnSpc>
+                <a:spcPct val="100000"/>
+              </a:lnSpc>
+              <a:spcBef>
+                <a:spcPts val="0"/>
+              </a:spcBef>
+              <a:spcAft>
+                <a:spcPts val="0"/>
+              </a:spcAft>
+              <a:buClrTx/>
+              <a:buSzTx/>
+              <a:buFontTx/>
+              <a:buNone/>
+              <a:tabLst/>
+              <a:defRPr/>
+            </a:pPr>
+            <a:r>
+              <a:rPr lang="fr-FR" dirty="0" smtClean="0"/>
               <a:t> </a:t>
             </a:r>
+            <a:r>
+              <a:rPr lang="fr-FR" sz="1200" kern="1200" dirty="0" smtClean="0">
+                <a:solidFill>
+                  <a:schemeClr val="tx1"/>
+                </a:solidFill>
+                <a:effectLst/>
+                <a:latin typeface="+mn-lt"/>
+                <a:ea typeface="+mn-ea"/>
+                <a:cs typeface="+mn-cs"/>
+              </a:rPr>
+              <a:t>les concurrents Service à domicile (bricolage, jardinage, administratif, aide à la personne, événementiel, informatique etc…)</a:t>
+            </a:r>
+          </a:p>
+          <a:p>
             <a:endParaRPr lang="fr-FR" dirty="0" smtClean="0"/>
           </a:p>
           <a:p>
@@ -6140,7 +6263,7 @@
     </p:spTree>
     <p:extLst>
       <p:ext uri="{BB962C8B-B14F-4D97-AF65-F5344CB8AC3E}">
-        <p14:creationId xmlns:p14="http://schemas.microsoft.com/office/powerpoint/2010/main" val="1775862669"/>
+        <p14:creationId xmlns:p14="http://schemas.microsoft.com/office/powerpoint/2010/main" val="3632931389"/>
       </p:ext>
     </p:extLst>
   </p:cSld>
@@ -6217,24 +6340,54 @@
               <a:defRPr/>
             </a:pPr>
             <a:r>
-              <a:rPr lang="fr-FR" dirty="0" smtClean="0"/>
-              <a:t> </a:t>
-            </a:r>
-            <a:r>
-              <a:rPr lang="fr-FR" sz="1200" kern="1200" dirty="0" smtClean="0">
+              <a:rPr lang="fr-FR" sz="1200" b="0" strike="noStrike" spc="-1" dirty="0" smtClean="0">
                 <a:solidFill>
-                  <a:schemeClr val="tx1"/>
+                  <a:srgbClr val="000000"/>
                 </a:solidFill>
-                <a:effectLst/>
-                <a:latin typeface="+mn-lt"/>
-                <a:ea typeface="+mn-ea"/>
-                <a:cs typeface="+mn-cs"/>
-              </a:rPr>
-              <a:t>les concurrents Service à domicile (bricolage, jardinage, administratif, aide à la personne, événementiel, informatique etc…)</a:t>
-            </a:r>
-          </a:p>
-          <a:p>
-            <a:endParaRPr lang="fr-FR" dirty="0" smtClean="0"/>
+                <a:latin typeface="Palatino Linotype"/>
+              </a:rPr>
+              <a:t>Dans un premier temps, j’aimerai une application rapide, pratique, et portable, utilisable sur tous support numérique .</a:t>
+            </a:r>
+          </a:p>
+          <a:p>
+            <a:pPr marL="0" marR="0" indent="0" algn="l" defTabSz="914400" rtl="0" eaLnBrk="1" fontAlgn="auto" latinLnBrk="0" hangingPunct="1">
+              <a:lnSpc>
+                <a:spcPct val="100000"/>
+              </a:lnSpc>
+              <a:spcBef>
+                <a:spcPts val="0"/>
+              </a:spcBef>
+              <a:spcAft>
+                <a:spcPts val="0"/>
+              </a:spcAft>
+              <a:buClrTx/>
+              <a:buSzTx/>
+              <a:buFontTx/>
+              <a:buNone/>
+              <a:tabLst/>
+              <a:defRPr/>
+            </a:pPr>
+            <a:r>
+              <a:rPr lang="fr-FR" sz="1200" b="0" strike="noStrike" spc="-1" dirty="0" smtClean="0">
+                <a:solidFill>
+                  <a:srgbClr val="000000"/>
+                </a:solidFill>
+                <a:latin typeface="Palatino Linotype"/>
+              </a:rPr>
+              <a:t>Dans un second temps m’adapter au besoin auquel je n’ai pas encore pensais</a:t>
+            </a:r>
+            <a:r>
+              <a:rPr lang="fr-FR" sz="1200" b="0" strike="noStrike" spc="-1" baseline="0" dirty="0" smtClean="0">
+                <a:solidFill>
+                  <a:srgbClr val="000000"/>
+                </a:solidFill>
+                <a:latin typeface="Palatino Linotype"/>
+              </a:rPr>
+              <a:t> .</a:t>
+            </a:r>
+            <a:endParaRPr lang="fr-FR" sz="1200" b="0" strike="noStrike" spc="-1" dirty="0" smtClean="0">
+              <a:latin typeface="+mn-lt"/>
+            </a:endParaRPr>
           </a:p>
           <a:p>
             <a:endParaRPr lang="fr-FR" dirty="0"/>
@@ -6272,7 +6425,7 @@
     </p:spTree>
     <p:extLst>
       <p:ext uri="{BB962C8B-B14F-4D97-AF65-F5344CB8AC3E}">
-        <p14:creationId xmlns:p14="http://schemas.microsoft.com/office/powerpoint/2010/main" val="3632931389"/>
+        <p14:creationId xmlns:p14="http://schemas.microsoft.com/office/powerpoint/2010/main" val="2348629073"/>
       </p:ext>
     </p:extLst>
   </p:cSld>
@@ -11230,7 +11383,7 @@
         <p:fade/>
       </p:transition>
     </mc:Choice>
-    <mc:Fallback xmlns="" xmlns:p15="http://schemas.microsoft.com/office/powerpoint/2012/main">
+    <mc:Fallback xmlns:p15="http://schemas.microsoft.com/office/powerpoint/2012/main" xmlns="">
       <p:transition spd="med">
         <p:fade/>
       </p:transition>
@@ -13958,7 +14111,7 @@
         <p:fade/>
       </p:transition>
     </mc:Choice>
-    <mc:Fallback xmlns="" xmlns:p15="http://schemas.microsoft.com/office/powerpoint/2012/main">
+    <mc:Fallback xmlns:p15="http://schemas.microsoft.com/office/powerpoint/2012/main" xmlns="">
       <p:transition spd="med">
         <p:fade/>
       </p:transition>
@@ -14676,7 +14829,7 @@
         <p:fade/>
       </p:transition>
     </mc:Choice>
-    <mc:Fallback xmlns="" xmlns:p15="http://schemas.microsoft.com/office/powerpoint/2012/main">
+    <mc:Fallback xmlns:p15="http://schemas.microsoft.com/office/powerpoint/2012/main" xmlns="">
       <p:transition spd="med">
         <p:fade/>
       </p:transition>
@@ -14843,7 +14996,7 @@
         <p:fade/>
       </p:transition>
     </mc:Choice>
-    <mc:Fallback xmlns="" xmlns:p15="http://schemas.microsoft.com/office/powerpoint/2012/main">
+    <mc:Fallback xmlns:p15="http://schemas.microsoft.com/office/powerpoint/2012/main" xmlns="">
       <p:transition spd="med">
         <p:fade/>
       </p:transition>
@@ -14910,7 +15063,7 @@
         <p:fade/>
       </p:transition>
     </mc:Choice>
-    <mc:Fallback xmlns="" xmlns:p15="http://schemas.microsoft.com/office/powerpoint/2012/main">
+    <mc:Fallback xmlns:p15="http://schemas.microsoft.com/office/powerpoint/2012/main" xmlns="">
       <p:transition spd="med">
         <p:fade/>
       </p:transition>
@@ -15125,7 +15278,7 @@
         <p:fade/>
       </p:transition>
     </mc:Choice>
-    <mc:Fallback xmlns="" xmlns:p15="http://schemas.microsoft.com/office/powerpoint/2012/main">
+    <mc:Fallback xmlns:p15="http://schemas.microsoft.com/office/powerpoint/2012/main" xmlns="">
       <p:transition spd="med">
         <p:fade/>
       </p:transition>
@@ -15409,7 +15562,7 @@
         <p:fade/>
       </p:transition>
     </mc:Choice>
-    <mc:Fallback xmlns="" xmlns:p15="http://schemas.microsoft.com/office/powerpoint/2012/main">
+    <mc:Fallback xmlns:p15="http://schemas.microsoft.com/office/powerpoint/2012/main" xmlns="">
       <p:transition spd="med">
         <p:fade/>
       </p:transition>
@@ -15599,7 +15752,7 @@
         <p:fade/>
       </p:transition>
     </mc:Choice>
-    <mc:Fallback xmlns="" xmlns:p15="http://schemas.microsoft.com/office/powerpoint/2012/main">
+    <mc:Fallback xmlns:p15="http://schemas.microsoft.com/office/powerpoint/2012/main" xmlns="">
       <p:transition spd="med">
         <p:fade/>
       </p:transition>
@@ -15787,7 +15940,7 @@
         <p:fade/>
       </p:transition>
     </mc:Choice>
-    <mc:Fallback xmlns="" xmlns:p15="http://schemas.microsoft.com/office/powerpoint/2012/main">
+    <mc:Fallback xmlns:p15="http://schemas.microsoft.com/office/powerpoint/2012/main" xmlns="">
       <p:transition spd="med">
         <p:fade/>
       </p:transition>
@@ -16387,7 +16540,7 @@
         <p:fade/>
       </p:transition>
     </mc:Choice>
-    <mc:Fallback xmlns="" xmlns:p15="http://schemas.microsoft.com/office/powerpoint/2012/main">
+    <mc:Fallback xmlns:p15="http://schemas.microsoft.com/office/powerpoint/2012/main" xmlns="">
       <p:transition spd="med">
         <p:fade/>
       </p:transition>
@@ -16422,7 +16575,7 @@
       </p:grpSpPr>
       <p:sp>
         <p:nvSpPr>
-          <p:cNvPr id="130" name="CustomShape 1"/>
+          <p:cNvPr id="134" name="CustomShape 1"/>
           <p:cNvSpPr/>
           <p:nvPr/>
         </p:nvSpPr>
@@ -16453,7 +16606,7 @@
         </p:style>
         <p:txBody>
           <a:bodyPr lIns="0" tIns="45000" rIns="0" bIns="0" anchor="b">
-            <a:normAutofit/>
+            <a:noAutofit/>
           </a:bodyPr>
           <a:lstStyle/>
           <a:p>
@@ -16469,7 +16622,7 @@
                 </a:solidFill>
                 <a:latin typeface="Century Gothic"/>
               </a:rPr>
-              <a:t>Analyse des besoins</a:t>
+              <a:t>Codage d'un formulaire</a:t>
             </a:r>
             <a:endParaRPr lang="fr-FR" sz="5000" b="0" strike="noStrike" spc="-1">
               <a:latin typeface="Arial"/>
@@ -16479,7 +16632,7 @@
       </p:sp>
       <p:sp>
         <p:nvSpPr>
-          <p:cNvPr id="131" name="CustomShape 2"/>
+          <p:cNvPr id="135" name="CustomShape 2"/>
           <p:cNvSpPr/>
           <p:nvPr/>
         </p:nvSpPr>
@@ -16508,95 +16661,30 @@
           </a:effectRef>
           <a:fontRef idx="minor"/>
         </p:style>
-        <p:txBody>
-          <a:bodyPr lIns="90000" tIns="45000" rIns="90000" bIns="45000">
-            <a:noAutofit/>
-          </a:bodyPr>
-          <a:lstStyle/>
-          <a:p>
-            <a:pPr marL="274320" indent="-273600">
-              <a:lnSpc>
-                <a:spcPct val="100000"/>
-              </a:lnSpc>
-              <a:spcBef>
-                <a:spcPts val="519"/>
-              </a:spcBef>
-              <a:buClr>
-                <a:srgbClr val="626B1A"/>
-              </a:buClr>
-              <a:buSzPct val="95000"/>
-              <a:buFont typeface="Wingdings 2" charset="2"/>
-              <a:buChar char=""/>
-            </a:pPr>
-            <a:r>
-              <a:rPr lang="fr-FR" sz="2600" b="0" strike="noStrike" spc="-1" dirty="0">
-                <a:solidFill>
-                  <a:srgbClr val="000000"/>
-                </a:solidFill>
-                <a:latin typeface="Palatino Linotype"/>
-              </a:rPr>
-              <a:t>Dans un premier temps, une application rapide, pratique, et portable, utilisable depuis partout (pc, téléphone, tv).</a:t>
-            </a:r>
-            <a:endParaRPr lang="fr-FR" sz="2600" b="0" strike="noStrike" spc="-1" dirty="0">
-              <a:latin typeface="Arial"/>
-            </a:endParaRPr>
-          </a:p>
-          <a:p>
-            <a:pPr marL="640080" lvl="1" indent="-246240">
-              <a:lnSpc>
-                <a:spcPct val="100000"/>
-              </a:lnSpc>
-              <a:spcBef>
-                <a:spcPts val="479"/>
-              </a:spcBef>
-              <a:buClr>
-                <a:srgbClr val="2A4F1C"/>
-              </a:buClr>
-              <a:buSzPct val="85000"/>
-              <a:buFont typeface="Wingdings 2" charset="2"/>
-              <a:buChar char=""/>
-            </a:pPr>
-            <a:r>
-              <a:rPr lang="fr-FR" sz="2400" b="0" strike="noStrike" spc="-1" dirty="0">
-                <a:solidFill>
-                  <a:srgbClr val="000000"/>
-                </a:solidFill>
-                <a:latin typeface="Palatino Linotype"/>
-              </a:rPr>
-              <a:t>Le choix des technologies est donc fait en conformité avec ceci.</a:t>
-            </a:r>
-            <a:endParaRPr lang="fr-FR" sz="2400" b="0" strike="noStrike" spc="-1" dirty="0">
-              <a:latin typeface="Arial"/>
-            </a:endParaRPr>
-          </a:p>
-          <a:p>
-            <a:pPr>
-              <a:lnSpc>
-                <a:spcPct val="100000"/>
-              </a:lnSpc>
-              <a:spcBef>
-                <a:spcPts val="519"/>
-              </a:spcBef>
-            </a:pPr>
-            <a:endParaRPr lang="fr-FR" sz="2400" b="0" strike="noStrike" spc="-1" dirty="0">
-              <a:latin typeface="Arial"/>
-            </a:endParaRPr>
-          </a:p>
-          <a:p>
-            <a:pPr>
-              <a:lnSpc>
-                <a:spcPct val="100000"/>
-              </a:lnSpc>
-              <a:spcBef>
-                <a:spcPts val="519"/>
-              </a:spcBef>
-            </a:pPr>
-            <a:endParaRPr lang="fr-FR" sz="2400" b="0" strike="noStrike" spc="-1" dirty="0">
-              <a:latin typeface="Arial"/>
-            </a:endParaRPr>
-          </a:p>
-        </p:txBody>
-      </p:sp>
+      </p:sp>
+      <p:pic>
+        <p:nvPicPr>
+          <p:cNvPr id="4" name="Image 3"/>
+          <p:cNvPicPr/>
+          <p:nvPr/>
+        </p:nvPicPr>
+        <p:blipFill>
+          <a:blip r:embed="rId3"/>
+          <a:stretch/>
+        </p:blipFill>
+        <p:spPr>
+          <a:xfrm>
+            <a:off x="956160" y="1846440"/>
+            <a:ext cx="10138560" cy="5497560"/>
+          </a:xfrm>
+          <a:prstGeom prst="rect">
+            <a:avLst/>
+          </a:prstGeom>
+          <a:ln>
+            <a:noFill/>
+          </a:ln>
+        </p:spPr>
+      </p:pic>
     </p:spTree>
   </p:cSld>
   <p:clrMapOvr>
@@ -16608,7 +16696,7 @@
         <p:fade/>
       </p:transition>
     </mc:Choice>
-    <mc:Fallback xmlns="" xmlns:p15="http://schemas.microsoft.com/office/powerpoint/2012/main">
+    <mc:Fallback xmlns:p15="http://schemas.microsoft.com/office/powerpoint/2012/main" xmlns="">
       <p:transition spd="med">
         <p:fade/>
       </p:transition>
@@ -16641,98 +16729,9 @@
           <a:chExt cx="0" cy="0"/>
         </a:xfrm>
       </p:grpSpPr>
-      <p:sp>
-        <p:nvSpPr>
-          <p:cNvPr id="134" name="CustomShape 1"/>
-          <p:cNvSpPr/>
-          <p:nvPr/>
-        </p:nvSpPr>
-        <p:spPr>
-          <a:xfrm>
-            <a:off x="609480" y="704160"/>
-            <a:ext cx="10972080" cy="1142280"/>
-          </a:xfrm>
-          <a:prstGeom prst="rect">
-            <a:avLst/>
-          </a:prstGeom>
-          <a:noFill/>
-          <a:ln>
-            <a:noFill/>
-          </a:ln>
-        </p:spPr>
-        <p:style>
-          <a:lnRef idx="0">
-            <a:scrgbClr r="0" g="0" b="0"/>
-          </a:lnRef>
-          <a:fillRef idx="0">
-            <a:scrgbClr r="0" g="0" b="0"/>
-          </a:fillRef>
-          <a:effectRef idx="0">
-            <a:scrgbClr r="0" g="0" b="0"/>
-          </a:effectRef>
-          <a:fontRef idx="minor"/>
-        </p:style>
-        <p:txBody>
-          <a:bodyPr lIns="0" tIns="45000" rIns="0" bIns="0" anchor="b">
-            <a:noAutofit/>
-          </a:bodyPr>
-          <a:lstStyle/>
-          <a:p>
-            <a:pPr>
-              <a:lnSpc>
-                <a:spcPct val="100000"/>
-              </a:lnSpc>
-            </a:pPr>
-            <a:r>
-              <a:rPr lang="fr-FR" sz="5000" b="0" strike="noStrike" spc="-1">
-                <a:solidFill>
-                  <a:srgbClr val="455F51"/>
-                </a:solidFill>
-                <a:latin typeface="Century Gothic"/>
-              </a:rPr>
-              <a:t>Codage d'un formulaire</a:t>
-            </a:r>
-            <a:endParaRPr lang="fr-FR" sz="5000" b="0" strike="noStrike" spc="-1">
-              <a:latin typeface="Arial"/>
-            </a:endParaRPr>
-          </a:p>
-        </p:txBody>
-      </p:sp>
-      <p:sp>
-        <p:nvSpPr>
-          <p:cNvPr id="135" name="CustomShape 2"/>
-          <p:cNvSpPr/>
-          <p:nvPr/>
-        </p:nvSpPr>
-        <p:spPr>
-          <a:xfrm>
-            <a:off x="609480" y="1935360"/>
-            <a:ext cx="10972080" cy="4388400"/>
-          </a:xfrm>
-          <a:prstGeom prst="rect">
-            <a:avLst/>
-          </a:prstGeom>
-          <a:noFill/>
-          <a:ln>
-            <a:noFill/>
-          </a:ln>
-        </p:spPr>
-        <p:style>
-          <a:lnRef idx="0">
-            <a:scrgbClr r="0" g="0" b="0"/>
-          </a:lnRef>
-          <a:fillRef idx="0">
-            <a:scrgbClr r="0" g="0" b="0"/>
-          </a:fillRef>
-          <a:effectRef idx="0">
-            <a:scrgbClr r="0" g="0" b="0"/>
-          </a:effectRef>
-          <a:fontRef idx="minor"/>
-        </p:style>
-      </p:sp>
       <p:pic>
         <p:nvPicPr>
-          <p:cNvPr id="4" name="Image 3"/>
+          <p:cNvPr id="137" name="Image 136"/>
           <p:cNvPicPr/>
           <p:nvPr/>
         </p:nvPicPr>
@@ -16742,8 +16741,8 @@
         </p:blipFill>
         <p:spPr>
           <a:xfrm>
-            <a:off x="956160" y="1846440"/>
-            <a:ext cx="10138560" cy="5497560"/>
+            <a:off x="1008000" y="720000"/>
+            <a:ext cx="10755720" cy="6328080"/>
           </a:xfrm>
           <a:prstGeom prst="rect">
             <a:avLst/>
@@ -16764,7 +16763,7 @@
         <p:fade/>
       </p:transition>
     </mc:Choice>
-    <mc:Fallback xmlns="" xmlns:p15="http://schemas.microsoft.com/office/powerpoint/2012/main">
+    <mc:Fallback xmlns:p15="http://schemas.microsoft.com/office/powerpoint/2012/main" xmlns="">
       <p:transition spd="med">
         <p:fade/>
       </p:transition>
@@ -16797,9 +16796,66 @@
           <a:chExt cx="0" cy="0"/>
         </a:xfrm>
       </p:grpSpPr>
+      <p:sp>
+        <p:nvSpPr>
+          <p:cNvPr id="138" name="CustomShape 1"/>
+          <p:cNvSpPr/>
+          <p:nvPr/>
+        </p:nvSpPr>
+        <p:spPr>
+          <a:xfrm>
+            <a:off x="609480" y="704160"/>
+            <a:ext cx="10972080" cy="1142280"/>
+          </a:xfrm>
+          <a:prstGeom prst="rect">
+            <a:avLst/>
+          </a:prstGeom>
+          <a:noFill/>
+          <a:ln>
+            <a:noFill/>
+          </a:ln>
+        </p:spPr>
+        <p:style>
+          <a:lnRef idx="0">
+            <a:scrgbClr r="0" g="0" b="0"/>
+          </a:lnRef>
+          <a:fillRef idx="0">
+            <a:scrgbClr r="0" g="0" b="0"/>
+          </a:fillRef>
+          <a:effectRef idx="0">
+            <a:scrgbClr r="0" g="0" b="0"/>
+          </a:effectRef>
+          <a:fontRef idx="minor"/>
+        </p:style>
+        <p:txBody>
+          <a:bodyPr lIns="0" tIns="45000" rIns="0" bIns="0" anchor="b">
+            <a:noAutofit/>
+          </a:bodyPr>
+          <a:lstStyle/>
+          <a:p>
+            <a:pPr>
+              <a:lnSpc>
+                <a:spcPct val="100000"/>
+              </a:lnSpc>
+            </a:pPr>
+            <a:r>
+              <a:rPr lang="fr-FR" sz="5000" b="0" strike="noStrike" spc="-1">
+                <a:solidFill>
+                  <a:srgbClr val="455F51"/>
+                </a:solidFill>
+                <a:latin typeface="Century Gothic"/>
+              </a:rPr>
+              <a:t>Résultat :</a:t>
+            </a:r>
+            <a:endParaRPr lang="fr-FR" sz="5000" b="0" strike="noStrike" spc="-1">
+              <a:latin typeface="Arial"/>
+            </a:endParaRPr>
+          </a:p>
+        </p:txBody>
+      </p:sp>
       <p:pic>
         <p:nvPicPr>
-          <p:cNvPr id="137" name="Image 136"/>
+          <p:cNvPr id="139" name="Image 138"/>
           <p:cNvPicPr/>
           <p:nvPr/>
         </p:nvPicPr>
@@ -16809,8 +16865,8 @@
         </p:blipFill>
         <p:spPr>
           <a:xfrm>
-            <a:off x="1008000" y="720000"/>
-            <a:ext cx="10755720" cy="6328080"/>
+            <a:off x="3672000" y="781560"/>
+            <a:ext cx="8280000" cy="5914440"/>
           </a:xfrm>
           <a:prstGeom prst="rect">
             <a:avLst/>
@@ -16831,7 +16887,7 @@
         <p:fade/>
       </p:transition>
     </mc:Choice>
-    <mc:Fallback xmlns="" xmlns:p15="http://schemas.microsoft.com/office/powerpoint/2012/main">
+    <mc:Fallback xmlns:p15="http://schemas.microsoft.com/office/powerpoint/2012/main" xmlns="">
       <p:transition spd="med">
         <p:fade/>
       </p:transition>
@@ -16866,7 +16922,7 @@
       </p:grpSpPr>
       <p:sp>
         <p:nvSpPr>
-          <p:cNvPr id="138" name="CustomShape 1"/>
+          <p:cNvPr id="144" name="CustomShape 1"/>
           <p:cNvSpPr/>
           <p:nvPr/>
         </p:nvSpPr>
@@ -16913,7 +16969,7 @@
                 </a:solidFill>
                 <a:latin typeface="Century Gothic"/>
               </a:rPr>
-              <a:t>Résultat :</a:t>
+              <a:t>Synthèse et conclusion</a:t>
             </a:r>
             <a:endParaRPr lang="fr-FR" sz="5000" b="0" strike="noStrike" spc="-1">
               <a:latin typeface="Arial"/>
@@ -16921,29 +16977,184 @@
           </a:p>
         </p:txBody>
       </p:sp>
-      <p:pic>
-        <p:nvPicPr>
-          <p:cNvPr id="139" name="Image 138"/>
-          <p:cNvPicPr/>
+      <p:sp>
+        <p:nvSpPr>
+          <p:cNvPr id="145" name="CustomShape 2"/>
+          <p:cNvSpPr/>
           <p:nvPr/>
-        </p:nvPicPr>
-        <p:blipFill>
-          <a:blip r:embed="rId3"/>
-          <a:stretch/>
-        </p:blipFill>
-        <p:spPr>
-          <a:xfrm>
-            <a:off x="3672000" y="781560"/>
-            <a:ext cx="8280000" cy="5914440"/>
-          </a:xfrm>
-          <a:prstGeom prst="rect">
-            <a:avLst/>
-          </a:prstGeom>
+        </p:nvSpPr>
+        <p:spPr>
+          <a:xfrm>
+            <a:off x="609480" y="1935360"/>
+            <a:ext cx="10972080" cy="4388400"/>
+          </a:xfrm>
+          <a:prstGeom prst="rect">
+            <a:avLst/>
+          </a:prstGeom>
+          <a:noFill/>
           <a:ln>
             <a:noFill/>
           </a:ln>
         </p:spPr>
-      </p:pic>
+        <p:style>
+          <a:lnRef idx="0">
+            <a:scrgbClr r="0" g="0" b="0"/>
+          </a:lnRef>
+          <a:fillRef idx="0">
+            <a:scrgbClr r="0" g="0" b="0"/>
+          </a:fillRef>
+          <a:effectRef idx="0">
+            <a:scrgbClr r="0" g="0" b="0"/>
+          </a:effectRef>
+          <a:fontRef idx="minor"/>
+        </p:style>
+        <p:txBody>
+          <a:bodyPr lIns="90000" tIns="45000" rIns="90000" bIns="45000">
+            <a:noAutofit/>
+          </a:bodyPr>
+          <a:lstStyle/>
+          <a:p>
+            <a:pPr marL="274320" indent="-273600">
+              <a:lnSpc>
+                <a:spcPct val="100000"/>
+              </a:lnSpc>
+              <a:spcBef>
+                <a:spcPts val="519"/>
+              </a:spcBef>
+              <a:buClr>
+                <a:srgbClr val="626B1A"/>
+              </a:buClr>
+              <a:buSzPct val="95000"/>
+              <a:buFont typeface="Wingdings 2" charset="2"/>
+              <a:buChar char=""/>
+            </a:pPr>
+            <a:r>
+              <a:rPr lang="fr-FR" sz="2600" b="0" strike="noStrike" spc="-1">
+                <a:solidFill>
+                  <a:srgbClr val="000000"/>
+                </a:solidFill>
+                <a:latin typeface="Palatino Linotype"/>
+              </a:rPr>
+              <a:t>Un projet passionnant.</a:t>
+            </a:r>
+            <a:endParaRPr lang="fr-FR" sz="2600" b="0" strike="noStrike" spc="-1">
+              <a:latin typeface="Arial"/>
+            </a:endParaRPr>
+          </a:p>
+          <a:p>
+            <a:pPr marL="274320" indent="-273600">
+              <a:lnSpc>
+                <a:spcPct val="100000"/>
+              </a:lnSpc>
+              <a:spcBef>
+                <a:spcPts val="519"/>
+              </a:spcBef>
+              <a:buClr>
+                <a:srgbClr val="626B1A"/>
+              </a:buClr>
+              <a:buSzPct val="95000"/>
+              <a:buFont typeface="Wingdings 2" charset="2"/>
+              <a:buChar char=""/>
+            </a:pPr>
+            <a:r>
+              <a:rPr lang="fr-FR" sz="2600" b="0" strike="noStrike" spc="-1">
+                <a:solidFill>
+                  <a:srgbClr val="000000"/>
+                </a:solidFill>
+                <a:latin typeface="Palatino Linotype"/>
+              </a:rPr>
+              <a:t>De grand challenge.</a:t>
+            </a:r>
+            <a:endParaRPr lang="fr-FR" sz="2600" b="0" strike="noStrike" spc="-1">
+              <a:latin typeface="Arial"/>
+            </a:endParaRPr>
+          </a:p>
+          <a:p>
+            <a:pPr marL="274320" indent="-273600">
+              <a:lnSpc>
+                <a:spcPct val="100000"/>
+              </a:lnSpc>
+              <a:spcBef>
+                <a:spcPts val="519"/>
+              </a:spcBef>
+              <a:buClr>
+                <a:srgbClr val="626B1A"/>
+              </a:buClr>
+              <a:buSzPct val="95000"/>
+              <a:buFont typeface="Wingdings 2" charset="2"/>
+              <a:buChar char=""/>
+            </a:pPr>
+            <a:r>
+              <a:rPr lang="fr-FR" sz="2600" b="0" strike="noStrike" spc="-1">
+                <a:solidFill>
+                  <a:srgbClr val="000000"/>
+                </a:solidFill>
+                <a:latin typeface="Palatino Linotype"/>
+              </a:rPr>
+              <a:t>Une bonne aventure.</a:t>
+            </a:r>
+            <a:endParaRPr lang="fr-FR" sz="2600" b="0" strike="noStrike" spc="-1">
+              <a:latin typeface="Arial"/>
+            </a:endParaRPr>
+          </a:p>
+          <a:p>
+            <a:pPr marL="274320" indent="-273600">
+              <a:lnSpc>
+                <a:spcPct val="100000"/>
+              </a:lnSpc>
+              <a:spcBef>
+                <a:spcPts val="519"/>
+              </a:spcBef>
+              <a:buClr>
+                <a:srgbClr val="626B1A"/>
+              </a:buClr>
+              <a:buSzPct val="95000"/>
+              <a:buFont typeface="Wingdings 2" charset="2"/>
+              <a:buChar char=""/>
+            </a:pPr>
+            <a:r>
+              <a:rPr lang="fr-FR" sz="2600" b="0" strike="noStrike" spc="-1">
+                <a:solidFill>
+                  <a:srgbClr val="000000"/>
+                </a:solidFill>
+                <a:latin typeface="Palatino Linotype"/>
+              </a:rPr>
+              <a:t>Une bonne expérience.</a:t>
+            </a:r>
+            <a:endParaRPr lang="fr-FR" sz="2600" b="0" strike="noStrike" spc="-1">
+              <a:latin typeface="Arial"/>
+            </a:endParaRPr>
+          </a:p>
+          <a:p>
+            <a:pPr marL="274320" indent="-273600">
+              <a:lnSpc>
+                <a:spcPct val="100000"/>
+              </a:lnSpc>
+              <a:spcBef>
+                <a:spcPts val="519"/>
+              </a:spcBef>
+              <a:buClr>
+                <a:srgbClr val="626B1A"/>
+              </a:buClr>
+              <a:buSzPct val="95000"/>
+              <a:buFont typeface="Wingdings 2" charset="2"/>
+              <a:buChar char=""/>
+            </a:pPr>
+            <a:r>
+              <a:rPr lang="fr-FR" sz="2600" b="0" strike="noStrike" spc="-1">
+                <a:solidFill>
+                  <a:srgbClr val="000000"/>
+                </a:solidFill>
+                <a:latin typeface="Palatino Linotype"/>
+              </a:rPr>
+              <a:t>Une grande monté en compétence.</a:t>
+            </a:r>
+            <a:endParaRPr lang="fr-FR" sz="2600" b="0" strike="noStrike" spc="-1">
+              <a:latin typeface="Arial"/>
+            </a:endParaRPr>
+          </a:p>
+        </p:txBody>
+      </p:sp>
     </p:spTree>
   </p:cSld>
   <p:clrMapOvr>
@@ -16955,7 +17166,7 @@
         <p:fade/>
       </p:transition>
     </mc:Choice>
-    <mc:Fallback xmlns="" xmlns:p15="http://schemas.microsoft.com/office/powerpoint/2012/main">
+    <mc:Fallback xmlns:p15="http://schemas.microsoft.com/office/powerpoint/2012/main" xmlns="">
       <p:transition spd="med">
         <p:fade/>
       </p:transition>
@@ -16972,285 +17183,6 @@
 </file>
 
 <file path=ppt/slides/slide34.xml><?xml version="1.0" encoding="utf-8"?>
-<p:sld xmlns:a="http://schemas.openxmlformats.org/drawingml/2006/main" xmlns:r="http://schemas.openxmlformats.org/officeDocument/2006/relationships" xmlns:p="http://schemas.openxmlformats.org/presentationml/2006/main">
-  <p:cSld>
-    <p:spTree>
-      <p:nvGrpSpPr>
-        <p:cNvPr id="1" name=""/>
-        <p:cNvGrpSpPr/>
-        <p:nvPr/>
-      </p:nvGrpSpPr>
-      <p:grpSpPr>
-        <a:xfrm>
-          <a:off x="0" y="0"/>
-          <a:ext cx="0" cy="0"/>
-          <a:chOff x="0" y="0"/>
-          <a:chExt cx="0" cy="0"/>
-        </a:xfrm>
-      </p:grpSpPr>
-      <p:sp>
-        <p:nvSpPr>
-          <p:cNvPr id="144" name="CustomShape 1"/>
-          <p:cNvSpPr/>
-          <p:nvPr/>
-        </p:nvSpPr>
-        <p:spPr>
-          <a:xfrm>
-            <a:off x="609480" y="704160"/>
-            <a:ext cx="10972080" cy="1142280"/>
-          </a:xfrm>
-          <a:prstGeom prst="rect">
-            <a:avLst/>
-          </a:prstGeom>
-          <a:noFill/>
-          <a:ln>
-            <a:noFill/>
-          </a:ln>
-        </p:spPr>
-        <p:style>
-          <a:lnRef idx="0">
-            <a:scrgbClr r="0" g="0" b="0"/>
-          </a:lnRef>
-          <a:fillRef idx="0">
-            <a:scrgbClr r="0" g="0" b="0"/>
-          </a:fillRef>
-          <a:effectRef idx="0">
-            <a:scrgbClr r="0" g="0" b="0"/>
-          </a:effectRef>
-          <a:fontRef idx="minor"/>
-        </p:style>
-        <p:txBody>
-          <a:bodyPr lIns="0" tIns="45000" rIns="0" bIns="0" anchor="b">
-            <a:noAutofit/>
-          </a:bodyPr>
-          <a:lstStyle/>
-          <a:p>
-            <a:pPr>
-              <a:lnSpc>
-                <a:spcPct val="100000"/>
-              </a:lnSpc>
-            </a:pPr>
-            <a:r>
-              <a:rPr lang="fr-FR" sz="5000" b="0" strike="noStrike" spc="-1">
-                <a:solidFill>
-                  <a:srgbClr val="455F51"/>
-                </a:solidFill>
-                <a:latin typeface="Century Gothic"/>
-              </a:rPr>
-              <a:t>Synthèse et conclusion</a:t>
-            </a:r>
-            <a:endParaRPr lang="fr-FR" sz="5000" b="0" strike="noStrike" spc="-1">
-              <a:latin typeface="Arial"/>
-            </a:endParaRPr>
-          </a:p>
-        </p:txBody>
-      </p:sp>
-      <p:sp>
-        <p:nvSpPr>
-          <p:cNvPr id="145" name="CustomShape 2"/>
-          <p:cNvSpPr/>
-          <p:nvPr/>
-        </p:nvSpPr>
-        <p:spPr>
-          <a:xfrm>
-            <a:off x="609480" y="1935360"/>
-            <a:ext cx="10972080" cy="4388400"/>
-          </a:xfrm>
-          <a:prstGeom prst="rect">
-            <a:avLst/>
-          </a:prstGeom>
-          <a:noFill/>
-          <a:ln>
-            <a:noFill/>
-          </a:ln>
-        </p:spPr>
-        <p:style>
-          <a:lnRef idx="0">
-            <a:scrgbClr r="0" g="0" b="0"/>
-          </a:lnRef>
-          <a:fillRef idx="0">
-            <a:scrgbClr r="0" g="0" b="0"/>
-          </a:fillRef>
-          <a:effectRef idx="0">
-            <a:scrgbClr r="0" g="0" b="0"/>
-          </a:effectRef>
-          <a:fontRef idx="minor"/>
-        </p:style>
-        <p:txBody>
-          <a:bodyPr lIns="90000" tIns="45000" rIns="90000" bIns="45000">
-            <a:noAutofit/>
-          </a:bodyPr>
-          <a:lstStyle/>
-          <a:p>
-            <a:pPr marL="274320" indent="-273600">
-              <a:lnSpc>
-                <a:spcPct val="100000"/>
-              </a:lnSpc>
-              <a:spcBef>
-                <a:spcPts val="519"/>
-              </a:spcBef>
-              <a:buClr>
-                <a:srgbClr val="626B1A"/>
-              </a:buClr>
-              <a:buSzPct val="95000"/>
-              <a:buFont typeface="Wingdings 2" charset="2"/>
-              <a:buChar char=""/>
-            </a:pPr>
-            <a:r>
-              <a:rPr lang="fr-FR" sz="2600" b="0" strike="noStrike" spc="-1">
-                <a:solidFill>
-                  <a:srgbClr val="000000"/>
-                </a:solidFill>
-                <a:latin typeface="Palatino Linotype"/>
-              </a:rPr>
-              <a:t>Un projet passionnant.</a:t>
-            </a:r>
-            <a:endParaRPr lang="fr-FR" sz="2600" b="0" strike="noStrike" spc="-1">
-              <a:latin typeface="Arial"/>
-            </a:endParaRPr>
-          </a:p>
-          <a:p>
-            <a:pPr marL="274320" indent="-273600">
-              <a:lnSpc>
-                <a:spcPct val="100000"/>
-              </a:lnSpc>
-              <a:spcBef>
-                <a:spcPts val="519"/>
-              </a:spcBef>
-              <a:buClr>
-                <a:srgbClr val="626B1A"/>
-              </a:buClr>
-              <a:buSzPct val="95000"/>
-              <a:buFont typeface="Wingdings 2" charset="2"/>
-              <a:buChar char=""/>
-            </a:pPr>
-            <a:r>
-              <a:rPr lang="fr-FR" sz="2600" b="0" strike="noStrike" spc="-1">
-                <a:solidFill>
-                  <a:srgbClr val="000000"/>
-                </a:solidFill>
-                <a:latin typeface="Palatino Linotype"/>
-              </a:rPr>
-              <a:t>De grand challenge.</a:t>
-            </a:r>
-            <a:endParaRPr lang="fr-FR" sz="2600" b="0" strike="noStrike" spc="-1">
-              <a:latin typeface="Arial"/>
-            </a:endParaRPr>
-          </a:p>
-          <a:p>
-            <a:pPr marL="274320" indent="-273600">
-              <a:lnSpc>
-                <a:spcPct val="100000"/>
-              </a:lnSpc>
-              <a:spcBef>
-                <a:spcPts val="519"/>
-              </a:spcBef>
-              <a:buClr>
-                <a:srgbClr val="626B1A"/>
-              </a:buClr>
-              <a:buSzPct val="95000"/>
-              <a:buFont typeface="Wingdings 2" charset="2"/>
-              <a:buChar char=""/>
-            </a:pPr>
-            <a:r>
-              <a:rPr lang="fr-FR" sz="2600" b="0" strike="noStrike" spc="-1">
-                <a:solidFill>
-                  <a:srgbClr val="000000"/>
-                </a:solidFill>
-                <a:latin typeface="Palatino Linotype"/>
-              </a:rPr>
-              <a:t>Une bonne aventure.</a:t>
-            </a:r>
-            <a:endParaRPr lang="fr-FR" sz="2600" b="0" strike="noStrike" spc="-1">
-              <a:latin typeface="Arial"/>
-            </a:endParaRPr>
-          </a:p>
-          <a:p>
-            <a:pPr marL="274320" indent="-273600">
-              <a:lnSpc>
-                <a:spcPct val="100000"/>
-              </a:lnSpc>
-              <a:spcBef>
-                <a:spcPts val="519"/>
-              </a:spcBef>
-              <a:buClr>
-                <a:srgbClr val="626B1A"/>
-              </a:buClr>
-              <a:buSzPct val="95000"/>
-              <a:buFont typeface="Wingdings 2" charset="2"/>
-              <a:buChar char=""/>
-            </a:pPr>
-            <a:r>
-              <a:rPr lang="fr-FR" sz="2600" b="0" strike="noStrike" spc="-1">
-                <a:solidFill>
-                  <a:srgbClr val="000000"/>
-                </a:solidFill>
-                <a:latin typeface="Palatino Linotype"/>
-              </a:rPr>
-              <a:t>Une bonne expérience.</a:t>
-            </a:r>
-            <a:endParaRPr lang="fr-FR" sz="2600" b="0" strike="noStrike" spc="-1">
-              <a:latin typeface="Arial"/>
-            </a:endParaRPr>
-          </a:p>
-          <a:p>
-            <a:pPr marL="274320" indent="-273600">
-              <a:lnSpc>
-                <a:spcPct val="100000"/>
-              </a:lnSpc>
-              <a:spcBef>
-                <a:spcPts val="519"/>
-              </a:spcBef>
-              <a:buClr>
-                <a:srgbClr val="626B1A"/>
-              </a:buClr>
-              <a:buSzPct val="95000"/>
-              <a:buFont typeface="Wingdings 2" charset="2"/>
-              <a:buChar char=""/>
-            </a:pPr>
-            <a:r>
-              <a:rPr lang="fr-FR" sz="2600" b="0" strike="noStrike" spc="-1">
-                <a:solidFill>
-                  <a:srgbClr val="000000"/>
-                </a:solidFill>
-                <a:latin typeface="Palatino Linotype"/>
-              </a:rPr>
-              <a:t>Une grande monté en compétence.</a:t>
-            </a:r>
-            <a:endParaRPr lang="fr-FR" sz="2600" b="0" strike="noStrike" spc="-1">
-              <a:latin typeface="Arial"/>
-            </a:endParaRPr>
-          </a:p>
-        </p:txBody>
-      </p:sp>
-    </p:spTree>
-  </p:cSld>
-  <p:clrMapOvr>
-    <a:masterClrMapping/>
-  </p:clrMapOvr>
-  <mc:AlternateContent xmlns:mc="http://schemas.openxmlformats.org/markup-compatibility/2006" xmlns:p14="http://schemas.microsoft.com/office/powerpoint/2010/main">
-    <mc:Choice Requires="p14">
-      <p:transition spd="med" p14:dur="700">
-        <p:fade/>
-      </p:transition>
-    </mc:Choice>
-    <mc:Fallback xmlns="" xmlns:p15="http://schemas.microsoft.com/office/powerpoint/2012/main">
-      <p:transition spd="med">
-        <p:fade/>
-      </p:transition>
-    </mc:Fallback>
-  </mc:AlternateContent>
-  <p:timing>
-    <p:tnLst>
-      <p:par>
-        <p:cTn id="1" dur="indefinite" restart="never" nodeType="tmRoot"/>
-      </p:par>
-    </p:tnLst>
-  </p:timing>
-</p:sld>
-</file>
-
-<file path=ppt/slides/slide35.xml><?xml version="1.0" encoding="utf-8"?>
 <p:sld xmlns:a="http://schemas.openxmlformats.org/drawingml/2006/main" xmlns:r="http://schemas.openxmlformats.org/officeDocument/2006/relationships" xmlns:p="http://schemas.openxmlformats.org/presentationml/2006/main">
   <p:cSld>
     <p:spTree>
@@ -17704,7 +17636,7 @@
         <p:fade/>
       </p:transition>
     </mc:Choice>
-    <mc:Fallback xmlns="" xmlns:p15="http://schemas.microsoft.com/office/powerpoint/2012/main">
+    <mc:Fallback xmlns:p15="http://schemas.microsoft.com/office/powerpoint/2012/main" xmlns="">
       <p:transition spd="med">
         <p:fade/>
       </p:transition>
@@ -18191,7 +18123,7 @@
       </p:grpSpPr>
       <p:sp>
         <p:nvSpPr>
-          <p:cNvPr id="110" name="CustomShape 1"/>
+          <p:cNvPr id="144" name="CustomShape 1"/>
           <p:cNvSpPr/>
           <p:nvPr/>
         </p:nvSpPr>
@@ -18232,13 +18164,13 @@
               </a:lnSpc>
             </a:pPr>
             <a:r>
-              <a:rPr lang="fr-FR" sz="5000" b="0" strike="noStrike" spc="-1" dirty="0">
+              <a:rPr lang="fr-FR" sz="5000" b="0" strike="noStrike" spc="-1" dirty="0" smtClean="0">
                 <a:solidFill>
                   <a:srgbClr val="455F51"/>
                 </a:solidFill>
                 <a:latin typeface="Century Gothic"/>
               </a:rPr>
-              <a:t>Contexte du projet</a:t>
+              <a:t> La bête à cornes</a:t>
             </a:r>
             <a:endParaRPr lang="fr-FR" sz="5000" b="0" strike="noStrike" spc="-1" dirty="0">
               <a:latin typeface="Arial"/>
@@ -18248,7 +18180,7 @@
       </p:sp>
       <p:sp>
         <p:nvSpPr>
-          <p:cNvPr id="111" name="CustomShape 2"/>
+          <p:cNvPr id="145" name="CustomShape 2"/>
           <p:cNvSpPr/>
           <p:nvPr/>
         </p:nvSpPr>
@@ -18283,54 +18215,21 @@
           </a:bodyPr>
           <a:lstStyle/>
           <a:p>
-            <a:pPr>
+            <a:pPr marL="274320" indent="-273600">
               <a:lnSpc>
                 <a:spcPct val="100000"/>
               </a:lnSpc>
               <a:spcBef>
                 <a:spcPts val="519"/>
               </a:spcBef>
-            </a:pPr>
-            <a:endParaRPr lang="fr-FR" sz="2400" b="0" strike="noStrike" spc="-1" dirty="0">
-              <a:latin typeface="Arial"/>
-            </a:endParaRPr>
-          </a:p>
-          <a:p>
-            <a:pPr>
-              <a:lnSpc>
-                <a:spcPct val="100000"/>
-              </a:lnSpc>
-              <a:spcBef>
-                <a:spcPts val="519"/>
-              </a:spcBef>
-            </a:pPr>
-            <a:endParaRPr lang="fr-FR" sz="2400" b="0" strike="noStrike" spc="-1" dirty="0">
-              <a:latin typeface="Arial"/>
-            </a:endParaRPr>
-          </a:p>
-          <a:p>
-            <a:pPr>
-              <a:lnSpc>
-                <a:spcPct val="100000"/>
-              </a:lnSpc>
-              <a:spcBef>
-                <a:spcPts val="519"/>
-              </a:spcBef>
-            </a:pPr>
-            <a:endParaRPr lang="fr-FR" sz="2400" b="0" strike="noStrike" spc="-1" dirty="0">
-              <a:latin typeface="Arial"/>
-            </a:endParaRPr>
-          </a:p>
-          <a:p>
-            <a:pPr>
-              <a:lnSpc>
-                <a:spcPct val="100000"/>
-              </a:lnSpc>
-              <a:spcBef>
-                <a:spcPts val="519"/>
-              </a:spcBef>
-            </a:pPr>
-            <a:endParaRPr lang="fr-FR" sz="2400" b="0" strike="noStrike" spc="-1" dirty="0">
+              <a:buClr>
+                <a:srgbClr val="626B1A"/>
+              </a:buClr>
+              <a:buSzPct val="95000"/>
+              <a:buFont typeface="Wingdings 2" charset="2"/>
+              <a:buChar char=""/>
+            </a:pPr>
+            <a:endParaRPr lang="fr-FR" sz="2600" b="0" strike="noStrike" spc="-1" dirty="0">
               <a:latin typeface="Arial"/>
             </a:endParaRPr>
           </a:p>
@@ -18358,8 +18257,8 @@
         </p:blipFill>
         <p:spPr>
           <a:xfrm>
-            <a:off x="1448027" y="1935360"/>
-            <a:ext cx="7730807" cy="4492513"/>
+            <a:off x="3228473" y="2033587"/>
+            <a:ext cx="5978284" cy="4379093"/>
           </a:xfrm>
           <a:prstGeom prst="rect">
             <a:avLst/>
@@ -18369,7 +18268,7 @@
     </p:spTree>
     <p:extLst>
       <p:ext uri="{BB962C8B-B14F-4D97-AF65-F5344CB8AC3E}">
-        <p14:creationId xmlns:p14="http://schemas.microsoft.com/office/powerpoint/2010/main" val="3441433021"/>
+        <p14:creationId xmlns:p14="http://schemas.microsoft.com/office/powerpoint/2010/main" val="3344790749"/>
       </p:ext>
     </p:extLst>
   </p:cSld>
@@ -18464,16 +18363,7 @@
                 </a:solidFill>
                 <a:latin typeface="Century Gothic"/>
               </a:rPr>
-              <a:t> </a:t>
-            </a:r>
-            <a:r>
-              <a:rPr lang="fr-FR" sz="5000" b="0" strike="noStrike" spc="-1" dirty="0" smtClean="0">
-                <a:solidFill>
-                  <a:srgbClr val="455F51"/>
-                </a:solidFill>
-                <a:latin typeface="Century Gothic"/>
-              </a:rPr>
-              <a:t>La bête à cornes</a:t>
+              <a:t> Matrice SWOT</a:t>
             </a:r>
             <a:endParaRPr lang="fr-FR" sz="5000" b="0" strike="noStrike" spc="-1" dirty="0">
               <a:latin typeface="Arial"/>
@@ -18540,10 +18430,8 @@
       </p:sp>
       <p:pic>
         <p:nvPicPr>
-          <p:cNvPr id="2" name="Image 1"/>
-          <p:cNvPicPr>
-            <a:picLocks noChangeAspect="1"/>
-          </p:cNvPicPr>
+          <p:cNvPr id="5" name="Image 4" descr="C:\Users\dev\Desktop\SPOILER_sowt.png"/>
+          <p:cNvPicPr/>
           <p:nvPr/>
         </p:nvPicPr>
         <p:blipFill>
@@ -18554,24 +18442,29 @@
               </a:ext>
             </a:extLst>
           </a:blip>
+          <a:srcRect/>
           <a:stretch>
             <a:fillRect/>
           </a:stretch>
         </p:blipFill>
-        <p:spPr>
-          <a:xfrm>
-            <a:off x="3228473" y="2033587"/>
-            <a:ext cx="5978284" cy="4379093"/>
-          </a:xfrm>
-          <a:prstGeom prst="rect">
-            <a:avLst/>
-          </a:prstGeom>
+        <p:spPr bwMode="auto">
+          <a:xfrm>
+            <a:off x="2261937" y="1846440"/>
+            <a:ext cx="7523747" cy="5011560"/>
+          </a:xfrm>
+          <a:prstGeom prst="rect">
+            <a:avLst/>
+          </a:prstGeom>
+          <a:noFill/>
+          <a:ln>
+            <a:noFill/>
+          </a:ln>
         </p:spPr>
       </p:pic>
     </p:spTree>
     <p:extLst>
       <p:ext uri="{BB962C8B-B14F-4D97-AF65-F5344CB8AC3E}">
-        <p14:creationId xmlns:p14="http://schemas.microsoft.com/office/powerpoint/2010/main" val="3344790749"/>
+        <p14:creationId xmlns:p14="http://schemas.microsoft.com/office/powerpoint/2010/main" val="3261194494"/>
       </p:ext>
     </p:extLst>
   </p:cSld>
@@ -18619,7 +18512,7 @@
       </p:grpSpPr>
       <p:sp>
         <p:nvSpPr>
-          <p:cNvPr id="144" name="CustomShape 1"/>
+          <p:cNvPr id="130" name="CustomShape 1"/>
           <p:cNvSpPr/>
           <p:nvPr/>
         </p:nvSpPr>
@@ -18650,7 +18543,7 @@
         </p:style>
         <p:txBody>
           <a:bodyPr lIns="0" tIns="45000" rIns="0" bIns="0" anchor="b">
-            <a:noAutofit/>
+            <a:normAutofit/>
           </a:bodyPr>
           <a:lstStyle/>
           <a:p>
@@ -18660,32 +18553,23 @@
               </a:lnSpc>
             </a:pPr>
             <a:r>
-              <a:rPr lang="fr-FR" sz="5000" b="0" strike="noStrike" spc="-1" dirty="0" smtClean="0">
+              <a:rPr lang="fr-FR" sz="5000" b="0" strike="noStrike" spc="-1">
                 <a:solidFill>
                   <a:srgbClr val="455F51"/>
                 </a:solidFill>
                 <a:latin typeface="Century Gothic"/>
               </a:rPr>
-              <a:t> </a:t>
-            </a:r>
-            <a:r>
-              <a:rPr lang="fr-FR" sz="5000" b="0" strike="noStrike" spc="-1" dirty="0" smtClean="0">
-                <a:solidFill>
-                  <a:srgbClr val="455F51"/>
-                </a:solidFill>
-                <a:latin typeface="Century Gothic"/>
-              </a:rPr>
-              <a:t>Matrice SWOT</a:t>
-            </a:r>
-            <a:endParaRPr lang="fr-FR" sz="5000" b="0" strike="noStrike" spc="-1" dirty="0">
-              <a:latin typeface="Arial"/>
-            </a:endParaRPr>
-          </a:p>
-        </p:txBody>
-      </p:sp>
-      <p:sp>
-        <p:nvSpPr>
-          <p:cNvPr id="145" name="CustomShape 2"/>
+              <a:t>Analyse des besoins</a:t>
+            </a:r>
+            <a:endParaRPr lang="fr-FR" sz="5000" b="0" strike="noStrike" spc="-1">
+              <a:latin typeface="Arial"/>
+            </a:endParaRPr>
+          </a:p>
+        </p:txBody>
+      </p:sp>
+      <p:sp>
+        <p:nvSpPr>
+          <p:cNvPr id="131" name="CustomShape 2"/>
           <p:cNvSpPr/>
           <p:nvPr/>
         </p:nvSpPr>
@@ -18734,51 +18618,76 @@
               <a:buFont typeface="Wingdings 2" charset="2"/>
               <a:buChar char=""/>
             </a:pPr>
+            <a:r>
+              <a:rPr lang="fr-FR" sz="2600" b="0" strike="noStrike" spc="-1" dirty="0">
+                <a:solidFill>
+                  <a:srgbClr val="000000"/>
+                </a:solidFill>
+                <a:latin typeface="Palatino Linotype"/>
+              </a:rPr>
+              <a:t>Dans un premier temps, une application rapide, pratique, et portable, utilisable depuis partout (pc, téléphone, tv).</a:t>
+            </a:r>
             <a:endParaRPr lang="fr-FR" sz="2600" b="0" strike="noStrike" spc="-1" dirty="0">
               <a:latin typeface="Arial"/>
             </a:endParaRPr>
           </a:p>
-        </p:txBody>
-      </p:sp>
-      <p:pic>
-        <p:nvPicPr>
-          <p:cNvPr id="5" name="Image 4" descr="C:\Users\dev\Desktop\SPOILER_sowt.png"/>
-          <p:cNvPicPr/>
-          <p:nvPr/>
-        </p:nvPicPr>
-        <p:blipFill>
-          <a:blip r:embed="rId3">
-            <a:extLst>
-              <a:ext uri="{28A0092B-C50C-407E-A947-70E740481C1C}">
-                <a14:useLocalDpi xmlns:a14="http://schemas.microsoft.com/office/drawing/2010/main" val="0"/>
-              </a:ext>
-            </a:extLst>
-          </a:blip>
-          <a:srcRect/>
-          <a:stretch>
-            <a:fillRect/>
-          </a:stretch>
-        </p:blipFill>
-        <p:spPr bwMode="auto">
-          <a:xfrm>
-            <a:off x="2261937" y="1846440"/>
-            <a:ext cx="7523747" cy="5011560"/>
-          </a:xfrm>
-          <a:prstGeom prst="rect">
-            <a:avLst/>
-          </a:prstGeom>
-          <a:noFill/>
-          <a:ln>
-            <a:noFill/>
-          </a:ln>
-        </p:spPr>
-      </p:pic>
+          <a:p>
+            <a:pPr marL="640080" lvl="1" indent="-246240">
+              <a:lnSpc>
+                <a:spcPct val="100000"/>
+              </a:lnSpc>
+              <a:spcBef>
+                <a:spcPts val="479"/>
+              </a:spcBef>
+              <a:buClr>
+                <a:srgbClr val="2A4F1C"/>
+              </a:buClr>
+              <a:buSzPct val="85000"/>
+              <a:buFont typeface="Wingdings 2" charset="2"/>
+              <a:buChar char=""/>
+            </a:pPr>
+            <a:r>
+              <a:rPr lang="fr-FR" sz="2400" b="0" strike="noStrike" spc="-1" dirty="0">
+                <a:solidFill>
+                  <a:srgbClr val="000000"/>
+                </a:solidFill>
+                <a:latin typeface="Palatino Linotype"/>
+              </a:rPr>
+              <a:t>Le choix des technologies est donc fait en conformité avec ceci.</a:t>
+            </a:r>
+            <a:endParaRPr lang="fr-FR" sz="2400" b="0" strike="noStrike" spc="-1" dirty="0">
+              <a:latin typeface="Arial"/>
+            </a:endParaRPr>
+          </a:p>
+          <a:p>
+            <a:pPr>
+              <a:lnSpc>
+                <a:spcPct val="100000"/>
+              </a:lnSpc>
+              <a:spcBef>
+                <a:spcPts val="519"/>
+              </a:spcBef>
+            </a:pPr>
+            <a:endParaRPr lang="fr-FR" sz="2400" b="0" strike="noStrike" spc="-1" dirty="0">
+              <a:latin typeface="Arial"/>
+            </a:endParaRPr>
+          </a:p>
+          <a:p>
+            <a:pPr>
+              <a:lnSpc>
+                <a:spcPct val="100000"/>
+              </a:lnSpc>
+              <a:spcBef>
+                <a:spcPts val="519"/>
+              </a:spcBef>
+            </a:pPr>
+            <a:endParaRPr lang="fr-FR" sz="2400" b="0" strike="noStrike" spc="-1" dirty="0">
+              <a:latin typeface="Arial"/>
+            </a:endParaRPr>
+          </a:p>
+        </p:txBody>
+      </p:sp>
     </p:spTree>
-    <p:extLst>
-      <p:ext uri="{BB962C8B-B14F-4D97-AF65-F5344CB8AC3E}">
-        <p14:creationId xmlns:p14="http://schemas.microsoft.com/office/powerpoint/2010/main" val="3261194494"/>
-      </p:ext>
-    </p:extLst>
   </p:cSld>
   <p:clrMapOvr>
     <a:masterClrMapping/>
@@ -18789,7 +18698,7 @@
         <p:fade/>
       </p:transition>
     </mc:Choice>
-    <mc:Fallback xmlns="">
+    <mc:Fallback xmlns:p15="http://schemas.microsoft.com/office/powerpoint/2012/main" xmlns="">
       <p:transition spd="med">
         <p:fade/>
       </p:transition>

</xml_diff>

<commit_message>
le bon commit de 17h
</commit_message>
<xml_diff>
--- a/Présentation du titre pro/Dossier Professionnel v1.pptx
+++ b/Présentation du titre pro/Dossier Professionnel v1.pptx
@@ -803,15 +803,7 @@
             </a:pPr>
             <a:r>
               <a:rPr lang="fr-FR" sz="2000" baseline="0" dirty="0" smtClean="0"/>
-              <a:t>Ajouter la partie </a:t>
-            </a:r>
-            <a:r>
-              <a:rPr lang="fr-FR" sz="2000" baseline="0" dirty="0" smtClean="0"/>
-              <a:t>création </a:t>
-            </a:r>
-            <a:r>
-              <a:rPr lang="fr-FR" sz="2000" baseline="0" dirty="0" smtClean="0"/>
-              <a:t>du profil dev a l’</a:t>
+              <a:t>Ajouter la partie création du profil dev a l’</a:t>
             </a:r>
             <a:r>
               <a:rPr lang="fr-FR" sz="2000" baseline="0" dirty="0" err="1" smtClean="0"/>
@@ -821,7 +813,6 @@
               <a:rPr lang="fr-FR" sz="2000" baseline="0" dirty="0" smtClean="0"/>
               <a:t> </a:t>
             </a:r>
-            <a:endParaRPr lang="fr-FR" sz="2000" baseline="0" dirty="0" smtClean="0"/>
           </a:p>
           <a:p>
             <a:pPr marL="0" marR="0" indent="0" algn="l" defTabSz="914400" rtl="0" eaLnBrk="1" fontAlgn="auto" latinLnBrk="0" hangingPunct="1">
@@ -4094,13 +4085,7 @@
               <a:rPr lang="fr-FR" sz="2000" b="0" strike="noStrike" spc="-1" baseline="0" dirty="0" smtClean="0">
                 <a:latin typeface="Arial"/>
               </a:rPr>
-              <a:t> option </a:t>
-            </a:r>
-            <a:r>
-              <a:rPr lang="fr-FR" sz="2000" b="0" strike="noStrike" spc="-1" baseline="0" dirty="0" smtClean="0">
-                <a:latin typeface="Arial"/>
-              </a:rPr>
-              <a:t>obligatoire</a:t>
+              <a:t> option obligatoire</a:t>
             </a:r>
           </a:p>
           <a:p>
@@ -4321,8 +4306,21 @@
           <a:p>
             <a:r>
               <a:rPr lang="fr-FR" dirty="0" smtClean="0"/>
-              <a:t>Modèle Conceptuel des Données modéliser des objet a stocker aussi appeler attribut </a:t>
-            </a:r>
+              <a:t>Modèle Conceptuel des Données modéliser des objet a stocker aussi appeler attribut (représentation</a:t>
+            </a:r>
+            <a:r>
+              <a:rPr lang="fr-FR" baseline="0" dirty="0" smtClean="0"/>
+              <a:t> d’une </a:t>
+            </a:r>
+            <a:r>
+              <a:rPr lang="fr-FR" baseline="0" dirty="0" err="1" smtClean="0"/>
+              <a:t>bdd</a:t>
+            </a:r>
+            <a:r>
+              <a:rPr lang="fr-FR" baseline="0" dirty="0" smtClean="0"/>
+              <a:t>)</a:t>
+            </a:r>
+            <a:endParaRPr lang="fr-FR" dirty="0" smtClean="0"/>
           </a:p>
           <a:p>
             <a:r>
@@ -4527,11 +4525,7 @@
           <a:p>
             <a:r>
               <a:rPr lang="fr-FR" baseline="0" dirty="0" smtClean="0"/>
-              <a:t>Modifier les scenario du diagramme séquentiel </a:t>
-            </a:r>
-            <a:r>
-              <a:rPr lang="fr-FR" baseline="0" dirty="0" smtClean="0"/>
-              <a:t>(scénario d’erreur lorsque le </a:t>
+              <a:t>Modifier les scenario du diagramme séquentiel (scénario d’erreur lorsque le </a:t>
             </a:r>
             <a:r>
               <a:rPr lang="fr-FR" baseline="0" dirty="0" err="1" smtClean="0"/>
@@ -4567,6 +4561,20 @@
             <a:r>
               <a:rPr lang="fr-FR" baseline="0" dirty="0" smtClean="0"/>
               <a:t> faire les boucle </a:t>
+            </a:r>
+          </a:p>
+          <a:p>
+            <a:r>
+              <a:rPr lang="fr-FR" baseline="0" dirty="0" smtClean="0"/>
+              <a:t>Dia séquence </a:t>
+            </a:r>
+            <a:r>
+              <a:rPr lang="fr-FR" baseline="0" dirty="0" err="1" smtClean="0"/>
+              <a:t>Representation</a:t>
+            </a:r>
+            <a:r>
+              <a:rPr lang="fr-FR" baseline="0" dirty="0" smtClean="0"/>
+              <a:t> dans le temps</a:t>
             </a:r>
             <a:endParaRPr lang="fr-FR" dirty="0"/>
           </a:p>
@@ -11383,7 +11391,7 @@
         <p:fade/>
       </p:transition>
     </mc:Choice>
-    <mc:Fallback xmlns:p15="http://schemas.microsoft.com/office/powerpoint/2012/main" xmlns="">
+    <mc:Fallback xmlns="" xmlns:p15="http://schemas.microsoft.com/office/powerpoint/2012/main">
       <p:transition spd="med">
         <p:fade/>
       </p:transition>
@@ -14111,7 +14119,7 @@
         <p:fade/>
       </p:transition>
     </mc:Choice>
-    <mc:Fallback xmlns:p15="http://schemas.microsoft.com/office/powerpoint/2012/main" xmlns="">
+    <mc:Fallback xmlns="" xmlns:p15="http://schemas.microsoft.com/office/powerpoint/2012/main">
       <p:transition spd="med">
         <p:fade/>
       </p:transition>
@@ -14829,7 +14837,7 @@
         <p:fade/>
       </p:transition>
     </mc:Choice>
-    <mc:Fallback xmlns:p15="http://schemas.microsoft.com/office/powerpoint/2012/main" xmlns="">
+    <mc:Fallback xmlns="" xmlns:p15="http://schemas.microsoft.com/office/powerpoint/2012/main">
       <p:transition spd="med">
         <p:fade/>
       </p:transition>
@@ -14996,7 +15004,7 @@
         <p:fade/>
       </p:transition>
     </mc:Choice>
-    <mc:Fallback xmlns:p15="http://schemas.microsoft.com/office/powerpoint/2012/main" xmlns="">
+    <mc:Fallback xmlns="" xmlns:p15="http://schemas.microsoft.com/office/powerpoint/2012/main">
       <p:transition spd="med">
         <p:fade/>
       </p:transition>
@@ -15063,7 +15071,7 @@
         <p:fade/>
       </p:transition>
     </mc:Choice>
-    <mc:Fallback xmlns:p15="http://schemas.microsoft.com/office/powerpoint/2012/main" xmlns="">
+    <mc:Fallback xmlns="" xmlns:p15="http://schemas.microsoft.com/office/powerpoint/2012/main">
       <p:transition spd="med">
         <p:fade/>
       </p:transition>
@@ -15278,7 +15286,7 @@
         <p:fade/>
       </p:transition>
     </mc:Choice>
-    <mc:Fallback xmlns:p15="http://schemas.microsoft.com/office/powerpoint/2012/main" xmlns="">
+    <mc:Fallback xmlns="" xmlns:p15="http://schemas.microsoft.com/office/powerpoint/2012/main">
       <p:transition spd="med">
         <p:fade/>
       </p:transition>
@@ -15562,7 +15570,7 @@
         <p:fade/>
       </p:transition>
     </mc:Choice>
-    <mc:Fallback xmlns:p15="http://schemas.microsoft.com/office/powerpoint/2012/main" xmlns="">
+    <mc:Fallback xmlns="" xmlns:p15="http://schemas.microsoft.com/office/powerpoint/2012/main">
       <p:transition spd="med">
         <p:fade/>
       </p:transition>
@@ -15752,7 +15760,7 @@
         <p:fade/>
       </p:transition>
     </mc:Choice>
-    <mc:Fallback xmlns:p15="http://schemas.microsoft.com/office/powerpoint/2012/main" xmlns="">
+    <mc:Fallback xmlns="" xmlns:p15="http://schemas.microsoft.com/office/powerpoint/2012/main">
       <p:transition spd="med">
         <p:fade/>
       </p:transition>
@@ -15940,7 +15948,7 @@
         <p:fade/>
       </p:transition>
     </mc:Choice>
-    <mc:Fallback xmlns:p15="http://schemas.microsoft.com/office/powerpoint/2012/main" xmlns="">
+    <mc:Fallback xmlns="" xmlns:p15="http://schemas.microsoft.com/office/powerpoint/2012/main">
       <p:transition spd="med">
         <p:fade/>
       </p:transition>
@@ -16540,7 +16548,7 @@
         <p:fade/>
       </p:transition>
     </mc:Choice>
-    <mc:Fallback xmlns:p15="http://schemas.microsoft.com/office/powerpoint/2012/main" xmlns="">
+    <mc:Fallback xmlns="" xmlns:p15="http://schemas.microsoft.com/office/powerpoint/2012/main">
       <p:transition spd="med">
         <p:fade/>
       </p:transition>
@@ -16696,7 +16704,7 @@
         <p:fade/>
       </p:transition>
     </mc:Choice>
-    <mc:Fallback xmlns:p15="http://schemas.microsoft.com/office/powerpoint/2012/main" xmlns="">
+    <mc:Fallback xmlns="" xmlns:p15="http://schemas.microsoft.com/office/powerpoint/2012/main">
       <p:transition spd="med">
         <p:fade/>
       </p:transition>
@@ -16763,7 +16771,7 @@
         <p:fade/>
       </p:transition>
     </mc:Choice>
-    <mc:Fallback xmlns:p15="http://schemas.microsoft.com/office/powerpoint/2012/main" xmlns="">
+    <mc:Fallback xmlns="" xmlns:p15="http://schemas.microsoft.com/office/powerpoint/2012/main">
       <p:transition spd="med">
         <p:fade/>
       </p:transition>
@@ -16887,7 +16895,7 @@
         <p:fade/>
       </p:transition>
     </mc:Choice>
-    <mc:Fallback xmlns:p15="http://schemas.microsoft.com/office/powerpoint/2012/main" xmlns="">
+    <mc:Fallback xmlns="" xmlns:p15="http://schemas.microsoft.com/office/powerpoint/2012/main">
       <p:transition spd="med">
         <p:fade/>
       </p:transition>
@@ -17166,7 +17174,7 @@
         <p:fade/>
       </p:transition>
     </mc:Choice>
-    <mc:Fallback xmlns:p15="http://schemas.microsoft.com/office/powerpoint/2012/main" xmlns="">
+    <mc:Fallback xmlns="" xmlns:p15="http://schemas.microsoft.com/office/powerpoint/2012/main">
       <p:transition spd="med">
         <p:fade/>
       </p:transition>
@@ -17636,7 +17644,7 @@
         <p:fade/>
       </p:transition>
     </mc:Choice>
-    <mc:Fallback xmlns:p15="http://schemas.microsoft.com/office/powerpoint/2012/main" xmlns="">
+    <mc:Fallback xmlns="" xmlns:p15="http://schemas.microsoft.com/office/powerpoint/2012/main">
       <p:transition spd="med">
         <p:fade/>
       </p:transition>
@@ -18698,7 +18706,7 @@
         <p:fade/>
       </p:transition>
     </mc:Choice>
-    <mc:Fallback xmlns:p15="http://schemas.microsoft.com/office/powerpoint/2012/main" xmlns="">
+    <mc:Fallback xmlns="" xmlns:p15="http://schemas.microsoft.com/office/powerpoint/2012/main">
       <p:transition spd="med">
         <p:fade/>
       </p:transition>

</xml_diff>

<commit_message>
commit projet fil rouge django
</commit_message>
<xml_diff>
--- a/Présentation du titre pro/Dossier Professionnel v1.pptx
+++ b/Présentation du titre pro/Dossier Professionnel v1.pptx
@@ -3837,10 +3837,10 @@
                 <a:ea typeface="+mn-ea"/>
                 <a:cs typeface="+mn-cs"/>
               </a:rPr>
-              <a:t> le front end &amp; python/</a:t>
-            </a:r>
-            <a:r>
-              <a:rPr lang="fr-FR" sz="1200" kern="1200" baseline="0" dirty="0" err="1" smtClean="0">
+              <a:t> le front end </a:t>
+            </a:r>
+            <a:r>
+              <a:rPr lang="fr-FR" sz="1200" kern="1200" baseline="0" smtClean="0">
                 <a:solidFill>
                   <a:schemeClr val="tx1"/>
                 </a:solidFill>
@@ -3849,7 +3849,19 @@
                 <a:ea typeface="+mn-ea"/>
                 <a:cs typeface="+mn-cs"/>
               </a:rPr>
-              <a:t>mysql</a:t>
+              <a:t>&amp; </a:t>
+            </a:r>
+            <a:r>
+              <a:rPr lang="fr-FR" sz="1200" kern="1200" baseline="0" smtClean="0">
+                <a:solidFill>
+                  <a:schemeClr val="tx1"/>
+                </a:solidFill>
+                <a:effectLst/>
+                <a:latin typeface="+mn-lt"/>
+                <a:ea typeface="+mn-ea"/>
+                <a:cs typeface="+mn-cs"/>
+              </a:rPr>
+              <a:t>python/Django </a:t>
             </a:r>
             <a:r>
               <a:rPr lang="fr-FR" sz="1200" kern="1200" baseline="0" dirty="0" smtClean="0">
@@ -3861,7 +3873,7 @@
                 <a:ea typeface="+mn-ea"/>
                 <a:cs typeface="+mn-cs"/>
               </a:rPr>
-              <a:t> pour le back end</a:t>
+              <a:t>pour le back end</a:t>
             </a:r>
             <a:endParaRPr lang="fr-FR" sz="2000" b="0" strike="noStrike" spc="-1" dirty="0">
               <a:latin typeface="Arial"/>
@@ -5499,10 +5511,9 @@
           <a:lstStyle/>
           <a:p>
             <a:r>
-              <a:rPr lang="fr-FR" smtClean="0"/>
+              <a:rPr lang="fr-FR" dirty="0" smtClean="0"/>
               <a:t> </a:t>
             </a:r>
-            <a:endParaRPr lang="fr-FR" dirty="0" smtClean="0"/>
           </a:p>
           <a:p>
             <a:endParaRPr lang="fr-FR" dirty="0"/>
@@ -6098,11 +6109,7 @@
             </a:r>
             <a:r>
               <a:rPr lang="fr-FR" baseline="0" dirty="0" smtClean="0"/>
-              <a:t> </a:t>
-            </a:r>
-            <a:r>
-              <a:rPr lang="fr-FR" baseline="0" smtClean="0"/>
-              <a:t>les source </a:t>
+              <a:t> les source </a:t>
             </a:r>
             <a:endParaRPr lang="fr-FR" dirty="0"/>
           </a:p>
@@ -13002,7 +13009,7 @@
       </p:sp>
       <p:pic>
         <p:nvPicPr>
-          <p:cNvPr id="2" name="Image 1"/>
+          <p:cNvPr id="3" name="Image 2"/>
           <p:cNvPicPr>
             <a:picLocks noChangeAspect="1"/>
           </p:cNvPicPr>
@@ -13022,7 +13029,7 @@
         </p:blipFill>
         <p:spPr>
           <a:xfrm>
-            <a:off x="609480" y="1935360"/>
+            <a:off x="6095520" y="1935360"/>
             <a:ext cx="4953000" cy="6667500"/>
           </a:xfrm>
           <a:prstGeom prst="rect">
@@ -13032,14 +13039,14 @@
       </p:pic>
       <p:pic>
         <p:nvPicPr>
-          <p:cNvPr id="3" name="Image 2"/>
+          <p:cNvPr id="4" name="Image 3"/>
           <p:cNvPicPr>
             <a:picLocks noChangeAspect="1"/>
           </p:cNvPicPr>
           <p:nvPr/>
         </p:nvPicPr>
         <p:blipFill>
-          <a:blip r:embed="rId4">
+          <a:blip r:embed="rId4" cstate="print">
             <a:extLst>
               <a:ext uri="{28A0092B-C50C-407E-A947-70E740481C1C}">
                 <a14:useLocalDpi xmlns:a14="http://schemas.microsoft.com/office/drawing/2010/main" val="0"/>
@@ -13052,8 +13059,8 @@
         </p:blipFill>
         <p:spPr>
           <a:xfrm>
-            <a:off x="6095520" y="1935360"/>
-            <a:ext cx="4953000" cy="6667500"/>
+            <a:off x="609480" y="1840110"/>
+            <a:ext cx="4848606" cy="6762750"/>
           </a:xfrm>
           <a:prstGeom prst="rect">
             <a:avLst/>
@@ -13484,7 +13491,7 @@
       </p:sp>
       <p:pic>
         <p:nvPicPr>
-          <p:cNvPr id="5" name="Image 4"/>
+          <p:cNvPr id="6" name="Image 5"/>
           <p:cNvPicPr>
             <a:picLocks noChangeAspect="1"/>
           </p:cNvPicPr>
@@ -13504,8 +13511,8 @@
         </p:blipFill>
         <p:spPr>
           <a:xfrm>
-            <a:off x="609480" y="1935360"/>
-            <a:ext cx="4953000" cy="6667500"/>
+            <a:off x="6190770" y="1935360"/>
+            <a:ext cx="4762500" cy="6667500"/>
           </a:xfrm>
           <a:prstGeom prst="rect">
             <a:avLst/>
@@ -13514,14 +13521,14 @@
       </p:pic>
       <p:pic>
         <p:nvPicPr>
-          <p:cNvPr id="6" name="Image 5"/>
+          <p:cNvPr id="2" name="Image 1"/>
           <p:cNvPicPr>
             <a:picLocks noChangeAspect="1"/>
           </p:cNvPicPr>
           <p:nvPr/>
         </p:nvPicPr>
         <p:blipFill>
-          <a:blip r:embed="rId4">
+          <a:blip r:embed="rId4" cstate="print">
             <a:extLst>
               <a:ext uri="{28A0092B-C50C-407E-A947-70E740481C1C}">
                 <a14:useLocalDpi xmlns:a14="http://schemas.microsoft.com/office/drawing/2010/main" val="0"/>
@@ -13534,8 +13541,8 @@
         </p:blipFill>
         <p:spPr>
           <a:xfrm>
-            <a:off x="6190770" y="1935360"/>
-            <a:ext cx="4762500" cy="6667500"/>
+            <a:off x="609480" y="1935360"/>
+            <a:ext cx="4848606" cy="6667500"/>
           </a:xfrm>
           <a:prstGeom prst="rect">
             <a:avLst/>
@@ -14301,7 +14308,7 @@
       </p:sp>
       <p:pic>
         <p:nvPicPr>
-          <p:cNvPr id="2" name="Image 1"/>
+          <p:cNvPr id="3" name="Image 2"/>
           <p:cNvPicPr>
             <a:picLocks noChangeAspect="1"/>
           </p:cNvPicPr>
@@ -14321,8 +14328,8 @@
         </p:blipFill>
         <p:spPr>
           <a:xfrm>
-            <a:off x="527957" y="1846440"/>
-            <a:ext cx="4953000" cy="6667500"/>
+            <a:off x="6150008" y="1935360"/>
+            <a:ext cx="4762500" cy="6667500"/>
           </a:xfrm>
           <a:prstGeom prst="rect">
             <a:avLst/>
@@ -14331,14 +14338,14 @@
       </p:pic>
       <p:pic>
         <p:nvPicPr>
-          <p:cNvPr id="3" name="Image 2"/>
+          <p:cNvPr id="4" name="Image 3"/>
           <p:cNvPicPr>
             <a:picLocks noChangeAspect="1"/>
           </p:cNvPicPr>
           <p:nvPr/>
         </p:nvPicPr>
         <p:blipFill>
-          <a:blip r:embed="rId4">
+          <a:blip r:embed="rId4" cstate="print">
             <a:extLst>
               <a:ext uri="{28A0092B-C50C-407E-A947-70E740481C1C}">
                 <a14:useLocalDpi xmlns:a14="http://schemas.microsoft.com/office/drawing/2010/main" val="0"/>
@@ -14351,8 +14358,8 @@
         </p:blipFill>
         <p:spPr>
           <a:xfrm>
-            <a:off x="6150008" y="1935360"/>
-            <a:ext cx="4762500" cy="6667500"/>
+            <a:off x="609480" y="1935360"/>
+            <a:ext cx="4848606" cy="6667500"/>
           </a:xfrm>
           <a:prstGeom prst="rect">
             <a:avLst/>

</xml_diff>